<commit_message>
tweaks here and there
</commit_message>
<xml_diff>
--- a/Bi-weekly Update  07192023 SX.pptx
+++ b/Bi-weekly Update  07192023 SX.pptx
@@ -6,16 +6,17 @@
     <p:sldMasterId id="2147483677" r:id="rId2"/>
   </p:sldMasterIdLst>
   <p:notesMasterIdLst>
-    <p:notesMasterId r:id="rId7"/>
+    <p:notesMasterId r:id="rId8"/>
   </p:notesMasterIdLst>
   <p:handoutMasterIdLst>
-    <p:handoutMasterId r:id="rId8"/>
+    <p:handoutMasterId r:id="rId9"/>
   </p:handoutMasterIdLst>
   <p:sldIdLst>
     <p:sldId id="388" r:id="rId3"/>
     <p:sldId id="427" r:id="rId4"/>
     <p:sldId id="428" r:id="rId5"/>
     <p:sldId id="429" r:id="rId6"/>
+    <p:sldId id="430" r:id="rId7"/>
   </p:sldIdLst>
   <p:sldSz cx="9144000" cy="6858000" type="screen4x3"/>
   <p:notesSz cx="7019925" cy="9305925"/>
@@ -966,19 +967,7 @@
             <a:rPr lang="en-US" sz="1600" dirty="0">
               <a:latin typeface="Trebuchet MS" panose="020B0603020202020204" pitchFamily="34" charset="0"/>
             </a:rPr>
-            <a:t>Transition from web </a:t>
-          </a:r>
-          <a:r>
-            <a:rPr lang="en-US" sz="1600" dirty="0" smtClean="0">
-              <a:latin typeface="Trebuchet MS" panose="020B0603020202020204" pitchFamily="34" charset="0"/>
-            </a:rPr>
-            <a:t>scraping </a:t>
-          </a:r>
-          <a:r>
-            <a:rPr lang="en-US" sz="1600" dirty="0">
-              <a:latin typeface="Trebuchet MS" panose="020B0603020202020204" pitchFamily="34" charset="0"/>
-            </a:rPr>
-            <a:t>to API pull - </a:t>
+            <a:t>Transition from web scraping to API pull - </a:t>
           </a:r>
           <a:r>
             <a:rPr lang="en-US" sz="1600" b="1" dirty="0">
@@ -1083,13 +1072,6 @@
         </dgm:presLayoutVars>
       </dgm:prSet>
       <dgm:spPr/>
-      <dgm:t>
-        <a:bodyPr/>
-        <a:lstStyle/>
-        <a:p>
-          <a:endParaRPr lang="en-US"/>
-        </a:p>
-      </dgm:t>
     </dgm:pt>
     <dgm:pt modelId="{F60AE307-2D68-47F5-B72E-6174DF7F5509}" type="pres">
       <dgm:prSet presAssocID="{0BD5331F-1879-479A-A5B8-E9779065EED2}" presName="circleA" presStyleLbl="node1" presStyleIdx="0" presStyleCnt="3"/>
@@ -1114,13 +1096,6 @@
         </dgm:presLayoutVars>
       </dgm:prSet>
       <dgm:spPr/>
-      <dgm:t>
-        <a:bodyPr/>
-        <a:lstStyle/>
-        <a:p>
-          <a:endParaRPr lang="en-US"/>
-        </a:p>
-      </dgm:t>
     </dgm:pt>
     <dgm:pt modelId="{76306022-DAAF-4268-BE0B-ACA354089ABA}" type="pres">
       <dgm:prSet presAssocID="{BC4136A3-3915-40FE-8D36-F121C7AE9960}" presName="circleB" presStyleLbl="node1" presStyleIdx="1" presStyleCnt="3"/>
@@ -1145,13 +1120,6 @@
         </dgm:presLayoutVars>
       </dgm:prSet>
       <dgm:spPr/>
-      <dgm:t>
-        <a:bodyPr/>
-        <a:lstStyle/>
-        <a:p>
-          <a:endParaRPr lang="en-US"/>
-        </a:p>
-      </dgm:t>
     </dgm:pt>
     <dgm:pt modelId="{AB342BD0-562B-4E9E-809D-29555924ABAD}" type="pres">
       <dgm:prSet presAssocID="{13D7A595-F8F5-4BCC-BF7E-02301C828D5E}" presName="circleA" presStyleLbl="node1" presStyleIdx="2" presStyleCnt="3"/>
@@ -1163,13 +1131,13 @@
     </dgm:pt>
   </dgm:ptLst>
   <dgm:cxnLst>
+    <dgm:cxn modelId="{E51D171A-8D5D-4EE1-8853-47E3C1CAD6E5}" srcId="{64A5F292-70D5-4147-B758-4ABE9957B6FD}" destId="{13D7A595-F8F5-4BCC-BF7E-02301C828D5E}" srcOrd="2" destOrd="0" parTransId="{64D1CB0C-3B1E-4A2E-9D4B-FA6A7D082DCA}" sibTransId="{11FA5B42-F43D-44CB-B77B-BF8EA1F566AB}"/>
+    <dgm:cxn modelId="{995D7C3D-6A8A-445D-B38F-F870F8066B11}" srcId="{64A5F292-70D5-4147-B758-4ABE9957B6FD}" destId="{BC4136A3-3915-40FE-8D36-F121C7AE9960}" srcOrd="1" destOrd="0" parTransId="{FCE8B248-925D-448C-AE6B-0708A2298DB4}" sibTransId="{21B1216E-E356-49CD-8D57-D8D33C384550}"/>
+    <dgm:cxn modelId="{B4573157-1355-4F7B-9CBF-03FEA16B1461}" type="presOf" srcId="{0BD5331F-1879-479A-A5B8-E9779065EED2}" destId="{9BA723B8-E2EF-4250-AF5E-30E01DFA5C2B}" srcOrd="0" destOrd="0" presId="urn:microsoft.com/office/officeart/2005/8/layout/hProcess11"/>
+    <dgm:cxn modelId="{3BD271AA-0843-4791-B8BA-12D016E84E18}" type="presOf" srcId="{BC4136A3-3915-40FE-8D36-F121C7AE9960}" destId="{CBFF8D98-0F9E-43BC-BAAB-FE88DC9967D7}" srcOrd="0" destOrd="0" presId="urn:microsoft.com/office/officeart/2005/8/layout/hProcess11"/>
+    <dgm:cxn modelId="{434EE1C5-B599-496F-9F6E-F0491C7714BD}" type="presOf" srcId="{64A5F292-70D5-4147-B758-4ABE9957B6FD}" destId="{87C2BDE4-7880-44B7-A59C-FEB2EB47A340}" srcOrd="0" destOrd="0" presId="urn:microsoft.com/office/officeart/2005/8/layout/hProcess11"/>
+    <dgm:cxn modelId="{D67CD6D4-A468-45FE-AAAD-FBE69CBC8F38}" srcId="{64A5F292-70D5-4147-B758-4ABE9957B6FD}" destId="{0BD5331F-1879-479A-A5B8-E9779065EED2}" srcOrd="0" destOrd="0" parTransId="{B5C1231D-1630-4F85-B35C-77A4825C9A00}" sibTransId="{F8E59EE5-39BC-41A3-A68D-240288A7772A}"/>
     <dgm:cxn modelId="{0DEFA5DA-3054-4018-8273-E8D31CF3B61C}" type="presOf" srcId="{13D7A595-F8F5-4BCC-BF7E-02301C828D5E}" destId="{CC79A4F8-9686-42B2-A197-B45E7FB9E4F1}" srcOrd="0" destOrd="0" presId="urn:microsoft.com/office/officeart/2005/8/layout/hProcess11"/>
-    <dgm:cxn modelId="{3BD271AA-0843-4791-B8BA-12D016E84E18}" type="presOf" srcId="{BC4136A3-3915-40FE-8D36-F121C7AE9960}" destId="{CBFF8D98-0F9E-43BC-BAAB-FE88DC9967D7}" srcOrd="0" destOrd="0" presId="urn:microsoft.com/office/officeart/2005/8/layout/hProcess11"/>
-    <dgm:cxn modelId="{B4573157-1355-4F7B-9CBF-03FEA16B1461}" type="presOf" srcId="{0BD5331F-1879-479A-A5B8-E9779065EED2}" destId="{9BA723B8-E2EF-4250-AF5E-30E01DFA5C2B}" srcOrd="0" destOrd="0" presId="urn:microsoft.com/office/officeart/2005/8/layout/hProcess11"/>
-    <dgm:cxn modelId="{E51D171A-8D5D-4EE1-8853-47E3C1CAD6E5}" srcId="{64A5F292-70D5-4147-B758-4ABE9957B6FD}" destId="{13D7A595-F8F5-4BCC-BF7E-02301C828D5E}" srcOrd="2" destOrd="0" parTransId="{64D1CB0C-3B1E-4A2E-9D4B-FA6A7D082DCA}" sibTransId="{11FA5B42-F43D-44CB-B77B-BF8EA1F566AB}"/>
-    <dgm:cxn modelId="{D67CD6D4-A468-45FE-AAAD-FBE69CBC8F38}" srcId="{64A5F292-70D5-4147-B758-4ABE9957B6FD}" destId="{0BD5331F-1879-479A-A5B8-E9779065EED2}" srcOrd="0" destOrd="0" parTransId="{B5C1231D-1630-4F85-B35C-77A4825C9A00}" sibTransId="{F8E59EE5-39BC-41A3-A68D-240288A7772A}"/>
-    <dgm:cxn modelId="{995D7C3D-6A8A-445D-B38F-F870F8066B11}" srcId="{64A5F292-70D5-4147-B758-4ABE9957B6FD}" destId="{BC4136A3-3915-40FE-8D36-F121C7AE9960}" srcOrd="1" destOrd="0" parTransId="{FCE8B248-925D-448C-AE6B-0708A2298DB4}" sibTransId="{21B1216E-E356-49CD-8D57-D8D33C384550}"/>
-    <dgm:cxn modelId="{434EE1C5-B599-496F-9F6E-F0491C7714BD}" type="presOf" srcId="{64A5F292-70D5-4147-B758-4ABE9957B6FD}" destId="{87C2BDE4-7880-44B7-A59C-FEB2EB47A340}" srcOrd="0" destOrd="0" presId="urn:microsoft.com/office/officeart/2005/8/layout/hProcess11"/>
     <dgm:cxn modelId="{CFF3F9E6-2A82-4BAF-B48C-2BDFCAA41B8A}" type="presParOf" srcId="{87C2BDE4-7880-44B7-A59C-FEB2EB47A340}" destId="{3E50CD98-D3A9-4957-BEDF-A6D1D7AC3063}" srcOrd="0" destOrd="0" presId="urn:microsoft.com/office/officeart/2005/8/layout/hProcess11"/>
     <dgm:cxn modelId="{83F8B323-FD4F-4AE6-9E7D-7B469743A3F4}" type="presParOf" srcId="{87C2BDE4-7880-44B7-A59C-FEB2EB47A340}" destId="{02D26E23-9729-4712-8169-CC1D020E8538}" srcOrd="1" destOrd="0" presId="urn:microsoft.com/office/officeart/2005/8/layout/hProcess11"/>
     <dgm:cxn modelId="{6FDEDECA-6F7B-49A6-AEBE-8E2F183B7EDE}" type="presParOf" srcId="{02D26E23-9729-4712-8169-CC1D020E8538}" destId="{C0757234-4347-45C1-9042-964F298E2E7B}" srcOrd="0" destOrd="0" presId="urn:microsoft.com/office/officeart/2005/8/layout/hProcess11"/>
@@ -1282,7 +1250,7 @@
         </a:bodyPr>
         <a:lstStyle/>
         <a:p>
-          <a:pPr lvl="0" algn="l" defTabSz="711200">
+          <a:pPr marL="0" lvl="0" indent="0" algn="l" defTabSz="711200">
             <a:lnSpc>
               <a:spcPct val="90000"/>
             </a:lnSpc>
@@ -1292,6 +1260,7 @@
             <a:spcAft>
               <a:spcPct val="35000"/>
             </a:spcAft>
+            <a:buNone/>
           </a:pPr>
           <a:r>
             <a:rPr lang="en-US" sz="1600" kern="1200" dirty="0">
@@ -1407,7 +1376,7 @@
         </a:bodyPr>
         <a:lstStyle/>
         <a:p>
-          <a:pPr lvl="0" algn="ctr" defTabSz="711200">
+          <a:pPr marL="0" lvl="0" indent="0" algn="ctr" defTabSz="711200">
             <a:lnSpc>
               <a:spcPct val="90000"/>
             </a:lnSpc>
@@ -1417,24 +1386,13 @@
             <a:spcAft>
               <a:spcPct val="35000"/>
             </a:spcAft>
+            <a:buNone/>
           </a:pPr>
           <a:r>
             <a:rPr lang="en-US" sz="1600" kern="1200" dirty="0">
               <a:latin typeface="Trebuchet MS" panose="020B0603020202020204" pitchFamily="34" charset="0"/>
             </a:rPr>
-            <a:t>Transition from web </a:t>
-          </a:r>
-          <a:r>
-            <a:rPr lang="en-US" sz="1600" kern="1200" dirty="0" smtClean="0">
-              <a:latin typeface="Trebuchet MS" panose="020B0603020202020204" pitchFamily="34" charset="0"/>
-            </a:rPr>
-            <a:t>scraping </a:t>
-          </a:r>
-          <a:r>
-            <a:rPr lang="en-US" sz="1600" kern="1200" dirty="0">
-              <a:latin typeface="Trebuchet MS" panose="020B0603020202020204" pitchFamily="34" charset="0"/>
-            </a:rPr>
-            <a:t>to API pull - </a:t>
+            <a:t>Transition from web scraping to API pull - </a:t>
           </a:r>
           <a:r>
             <a:rPr lang="en-US" sz="1600" b="1" kern="1200" dirty="0">
@@ -1535,7 +1493,7 @@
         </a:bodyPr>
         <a:lstStyle/>
         <a:p>
-          <a:pPr lvl="0" algn="ctr" defTabSz="711200">
+          <a:pPr marL="0" lvl="0" indent="0" algn="ctr" defTabSz="711200">
             <a:lnSpc>
               <a:spcPct val="90000"/>
             </a:lnSpc>
@@ -1545,6 +1503,7 @@
             <a:spcAft>
               <a:spcPct val="35000"/>
             </a:spcAft>
+            <a:buNone/>
           </a:pPr>
           <a:r>
             <a:rPr lang="en-US" sz="1600" kern="1200" dirty="0">
@@ -3006,7 +2965,7 @@
           <a:p>
             <a:fld id="{DD4B4FC3-663B-4837-BE3C-9748504111CD}" type="datetimeFigureOut">
               <a:rPr lang="en-US" smtClean="0"/>
-              <a:t>7/18/2023</a:t>
+              <a:t>7/19/2023</a:t>
             </a:fld>
             <a:endParaRPr lang="en-US"/>
           </a:p>
@@ -3171,7 +3130,7 @@
           <a:p>
             <a:fld id="{4739E05F-45CD-4689-845F-4C80707953D1}" type="datetimeFigureOut">
               <a:rPr lang="en-US" smtClean="0"/>
-              <a:t>7/18/2023</a:t>
+              <a:t>7/19/2023</a:t>
             </a:fld>
             <a:endParaRPr lang="en-US" dirty="0"/>
           </a:p>
@@ -8496,15 +8455,7 @@
           <a:p>
             <a:r>
               <a:rPr lang="en-US" dirty="0"/>
-              <a:t>Stephen </a:t>
-            </a:r>
-            <a:r>
-              <a:rPr lang="en-US" dirty="0" smtClean="0"/>
-              <a:t>Xu &amp; </a:t>
-            </a:r>
-            <a:r>
-              <a:rPr lang="en-US" dirty="0"/>
-              <a:t>Pranil Walke</a:t>
+              <a:t>Stephen Xu &amp; Pranil Walke</a:t>
             </a:r>
           </a:p>
         </p:txBody>
@@ -8586,13 +8537,6 @@
   <p:clrMapOvr>
     <a:masterClrMapping/>
   </p:clrMapOvr>
-  <p:timing>
-    <p:tnLst>
-      <p:par>
-        <p:cTn id="1" dur="indefinite" restart="never" nodeType="tmRoot"/>
-      </p:par>
-    </p:tnLst>
-  </p:timing>
 </p:sld>
 </file>
 
@@ -8785,13 +8729,7 @@
               <a:rPr lang="en-US" sz="2400" dirty="0">
                 <a:cs typeface="Arial" panose="020B0604020202020204" pitchFamily="34" charset="0"/>
               </a:rPr>
-              <a:t>Moving away from excel based tool to new automated </a:t>
-            </a:r>
-            <a:r>
-              <a:rPr lang="en-US" sz="2400" dirty="0" smtClean="0">
-                <a:cs typeface="Arial" panose="020B0604020202020204" pitchFamily="34" charset="0"/>
-              </a:rPr>
-              <a:t>Python</a:t>
+              <a:t>Moving away from excel based tool to new automated Python</a:t>
             </a:r>
             <a:endParaRPr lang="en-US" sz="2400" dirty="0"/>
           </a:p>
@@ -9051,18 +8989,11 @@
                     <a:p>
                       <a:pPr algn="ctr" fontAlgn="b"/>
                       <a:r>
-                        <a:rPr lang="en-US" sz="1200" u="none" strike="noStrike" dirty="0" smtClean="0">
-                          <a:effectLst/>
-                          <a:latin typeface="Trebuchet MS" panose="020B0603020202020204" pitchFamily="34" charset="0"/>
-                        </a:rPr>
-                        <a:t>Detailed </a:t>
-                      </a:r>
-                      <a:r>
                         <a:rPr lang="en-US" sz="1200" u="none" strike="noStrike" dirty="0">
                           <a:effectLst/>
                           <a:latin typeface="Trebuchet MS" panose="020B0603020202020204" pitchFamily="34" charset="0"/>
                         </a:rPr>
-                        <a:t>Documentation</a:t>
+                        <a:t>Detailed Documentation</a:t>
                       </a:r>
                       <a:endParaRPr lang="en-US" sz="1200" b="0" i="0" u="none" strike="noStrike" dirty="0">
                         <a:solidFill>
@@ -9118,22 +9049,10 @@
                           <a:ea typeface="+mn-ea"/>
                           <a:cs typeface="+mn-cs"/>
                         </a:rPr>
-                        <a:t>Detailed </a:t>
+                        <a:t>Detailed emailing</a:t>
                       </a:r>
                       <a:r>
-                        <a:rPr lang="en-US" sz="1200" b="0" i="0" u="none" strike="noStrike" kern="1200" dirty="0" smtClean="0">
-                          <a:solidFill>
-                            <a:srgbClr val="000000"/>
-                          </a:solidFill>
-                          <a:effectLst/>
-                          <a:latin typeface="Trebuchet MS" panose="020B0603020202020204" pitchFamily="34" charset="0"/>
-                          <a:ea typeface="+mn-ea"/>
-                          <a:cs typeface="+mn-cs"/>
-                        </a:rPr>
-                        <a:t>emailing</a:t>
-                      </a:r>
-                      <a:r>
-                        <a:rPr lang="en-US" sz="1200" b="0" i="0" u="none" strike="noStrike" kern="1200" baseline="0" dirty="0" smtClean="0">
+                        <a:rPr lang="en-US" sz="1200" b="0" i="0" u="none" strike="noStrike" kern="1200" baseline="0" dirty="0">
                           <a:solidFill>
                             <a:srgbClr val="000000"/>
                           </a:solidFill>
@@ -9145,18 +9064,6 @@
                         <a:t> capability</a:t>
                       </a:r>
                       <a:r>
-                        <a:rPr lang="en-US" sz="1200" b="0" i="0" u="none" strike="noStrike" kern="1200" dirty="0" smtClean="0">
-                          <a:solidFill>
-                            <a:srgbClr val="000000"/>
-                          </a:solidFill>
-                          <a:effectLst/>
-                          <a:latin typeface="Trebuchet MS" panose="020B0603020202020204" pitchFamily="34" charset="0"/>
-                          <a:ea typeface="+mn-ea"/>
-                          <a:cs typeface="+mn-cs"/>
-                        </a:rPr>
-                        <a:t> </a:t>
-                      </a:r>
-                      <a:r>
                         <a:rPr lang="en-US" sz="1200" b="0" i="0" u="none" strike="noStrike" kern="1200" dirty="0">
                           <a:solidFill>
                             <a:srgbClr val="000000"/>
@@ -9166,7 +9073,7 @@
                           <a:ea typeface="+mn-ea"/>
                           <a:cs typeface="+mn-cs"/>
                         </a:rPr>
-                        <a:t>to help with troubleshooting</a:t>
+                        <a:t> to help with troubleshooting</a:t>
                       </a:r>
                     </a:p>
                   </a:txBody>
@@ -9186,7 +9093,7 @@
                     <a:p>
                       <a:pPr algn="ctr" fontAlgn="b"/>
                       <a:r>
-                        <a:rPr lang="en-US" sz="1200" b="0" i="0" u="none" strike="noStrike" dirty="0" smtClean="0">
+                        <a:rPr lang="en-US" sz="1200" b="0" i="0" u="none" strike="noStrike" dirty="0">
                           <a:solidFill>
                             <a:srgbClr val="000000"/>
                           </a:solidFill>
@@ -9195,13 +9102,6 @@
                         </a:rPr>
                         <a:t>Doesn’t work for many folders</a:t>
                       </a:r>
-                      <a:endParaRPr lang="en-US" sz="1200" b="0" i="0" u="none" strike="noStrike" dirty="0">
-                        <a:solidFill>
-                          <a:srgbClr val="000000"/>
-                        </a:solidFill>
-                        <a:effectLst/>
-                        <a:latin typeface="Trebuchet MS" panose="020B0603020202020204" pitchFamily="34" charset="0"/>
-                      </a:endParaRPr>
                     </a:p>
                   </a:txBody>
                   <a:tcPr marL="9525" marR="9525" marT="9525" marB="0" anchor="ctr"/>
@@ -9213,7 +9113,7 @@
                     <a:p>
                       <a:pPr algn="ctr" fontAlgn="b"/>
                       <a:r>
-                        <a:rPr lang="en-US" sz="1200" b="0" i="0" u="none" strike="noStrike" dirty="0" smtClean="0">
+                        <a:rPr lang="en-US" sz="1200" b="0" i="0" u="none" strike="noStrike" dirty="0">
                           <a:solidFill>
                             <a:srgbClr val="000000"/>
                           </a:solidFill>
@@ -9223,7 +9123,7 @@
                         <a:t>Should</a:t>
                       </a:r>
                       <a:r>
-                        <a:rPr lang="en-US" sz="1200" b="0" i="0" u="none" strike="noStrike" baseline="0" dirty="0" smtClean="0">
+                        <a:rPr lang="en-US" sz="1200" b="0" i="0" u="none" strike="noStrike" baseline="0" dirty="0">
                           <a:solidFill>
                             <a:srgbClr val="000000"/>
                           </a:solidFill>
@@ -9257,7 +9157,7 @@
                     <a:p>
                       <a:pPr algn="ctr" fontAlgn="b"/>
                       <a:r>
-                        <a:rPr lang="en-US" sz="1200" u="none" strike="noStrike" dirty="0" smtClean="0">
+                        <a:rPr lang="en-US" sz="1200" u="none" strike="noStrike" dirty="0">
                           <a:effectLst/>
                           <a:latin typeface="Trebuchet MS" panose="020B0603020202020204" pitchFamily="34" charset="0"/>
                         </a:rPr>
@@ -9281,21 +9181,14 @@
                     <a:p>
                       <a:pPr algn="ctr" fontAlgn="b"/>
                       <a:r>
-                        <a:rPr lang="en-US" sz="1200" u="none" strike="noStrike" dirty="0" smtClean="0">
+                        <a:rPr lang="en-US" sz="1200" u="none" strike="noStrike" dirty="0">
                           <a:effectLst/>
                           <a:latin typeface="Trebuchet MS" panose="020B0603020202020204" pitchFamily="34" charset="0"/>
                         </a:rPr>
-                        <a:t>Fast: </a:t>
+                        <a:t>Fast: Aim</a:t>
                       </a:r>
                       <a:r>
-                        <a:rPr lang="en-US" sz="1200" u="none" strike="noStrike" dirty="0" smtClean="0">
-                          <a:effectLst/>
-                          <a:latin typeface="Trebuchet MS" panose="020B0603020202020204" pitchFamily="34" charset="0"/>
-                        </a:rPr>
-                        <a:t>Aim</a:t>
-                      </a:r>
-                      <a:r>
-                        <a:rPr lang="en-US" sz="1200" u="none" strike="noStrike" baseline="0" dirty="0" smtClean="0">
+                        <a:rPr lang="en-US" sz="1200" u="none" strike="noStrike" baseline="0" dirty="0">
                           <a:effectLst/>
                           <a:latin typeface="Trebuchet MS" panose="020B0603020202020204" pitchFamily="34" charset="0"/>
                         </a:rPr>
@@ -9332,13 +9225,6 @@
   <p:clrMapOvr>
     <a:overrideClrMapping bg1="lt1" tx1="dk1" bg2="lt2" tx2="dk2" accent1="accent1" accent2="accent2" accent3="accent3" accent4="accent4" accent5="accent5" accent6="accent6" hlink="hlink" folHlink="folHlink"/>
   </p:clrMapOvr>
-  <p:timing>
-    <p:tnLst>
-      <p:par>
-        <p:cTn id="1" dur="indefinite" restart="never" nodeType="tmRoot"/>
-      </p:par>
-    </p:tnLst>
-  </p:timing>
 </p:sld>
 </file>
 
@@ -9380,10 +9266,9 @@
           <a:lstStyle/>
           <a:p>
             <a:r>
-              <a:rPr lang="en-US" dirty="0" smtClean="0"/>
+              <a:rPr lang="en-US" dirty="0"/>
               <a:t>New Proposed Download Workflow</a:t>
             </a:r>
-            <a:endParaRPr lang="en-US" dirty="0"/>
           </a:p>
         </p:txBody>
       </p:sp>
@@ -9406,7 +9291,7 @@
               <a:defRPr/>
             </a:pPr>
             <a:r>
-              <a:rPr lang="en-US" sz="800" smtClean="0">
+              <a:rPr lang="en-US" sz="800">
                 <a:solidFill>
                   <a:srgbClr val="C00000"/>
                 </a:solidFill>
@@ -9432,1015 +9317,36 @@
           </a:p>
         </p:txBody>
       </p:sp>
-      <p:sp>
-        <p:nvSpPr>
-          <p:cNvPr id="13" name="Oval 12"/>
-          <p:cNvSpPr/>
-          <p:nvPr/>
-        </p:nvSpPr>
-        <p:spPr>
-          <a:xfrm>
-            <a:off x="3724134" y="1068901"/>
-            <a:ext cx="1802325" cy="639332"/>
-          </a:xfrm>
-          <a:prstGeom prst="ellipse">
-            <a:avLst/>
-          </a:prstGeom>
-          <a:solidFill>
-            <a:schemeClr val="bg2"/>
-          </a:solidFill>
-          <a:ln>
-            <a:noFill/>
-          </a:ln>
-        </p:spPr>
-        <p:style>
-          <a:lnRef idx="2">
-            <a:schemeClr val="accent1">
-              <a:shade val="50000"/>
-            </a:schemeClr>
-          </a:lnRef>
-          <a:fillRef idx="1">
-            <a:schemeClr val="accent1"/>
-          </a:fillRef>
-          <a:effectRef idx="0">
-            <a:schemeClr val="accent1"/>
-          </a:effectRef>
-          <a:fontRef idx="minor">
-            <a:schemeClr val="lt1"/>
-          </a:fontRef>
-        </p:style>
-        <p:txBody>
-          <a:bodyPr rtlCol="0" anchor="ctr"/>
-          <a:lstStyle/>
-          <a:p>
-            <a:pPr algn="ctr"/>
-            <a:r>
-              <a:rPr lang="en-US" sz="1400" dirty="0" smtClean="0"/>
-              <a:t>Pre-Processing</a:t>
-            </a:r>
-            <a:endParaRPr lang="en-US" sz="1400" dirty="0"/>
-          </a:p>
-        </p:txBody>
-      </p:sp>
-      <p:sp>
-        <p:nvSpPr>
-          <p:cNvPr id="15" name="Oval 14"/>
-          <p:cNvSpPr/>
-          <p:nvPr/>
-        </p:nvSpPr>
-        <p:spPr>
-          <a:xfrm>
-            <a:off x="1037691" y="2235080"/>
-            <a:ext cx="1012985" cy="690076"/>
-          </a:xfrm>
-          <a:prstGeom prst="ellipse">
-            <a:avLst/>
-          </a:prstGeom>
-          <a:solidFill>
-            <a:schemeClr val="bg2"/>
-          </a:solidFill>
-          <a:ln>
-            <a:noFill/>
-          </a:ln>
-        </p:spPr>
-        <p:style>
-          <a:lnRef idx="2">
-            <a:schemeClr val="accent1">
-              <a:shade val="50000"/>
-            </a:schemeClr>
-          </a:lnRef>
-          <a:fillRef idx="1">
-            <a:schemeClr val="accent1"/>
-          </a:fillRef>
-          <a:effectRef idx="0">
-            <a:schemeClr val="accent1"/>
-          </a:effectRef>
-          <a:fontRef idx="minor">
-            <a:schemeClr val="lt1"/>
-          </a:fontRef>
-        </p:style>
-        <p:txBody>
-          <a:bodyPr rtlCol="0" anchor="ctr"/>
-          <a:lstStyle/>
-          <a:p>
-            <a:pPr algn="ctr"/>
-            <a:r>
-              <a:rPr lang="en-US" sz="800" dirty="0" smtClean="0"/>
-              <a:t>02_AAFRWP</a:t>
-            </a:r>
-            <a:endParaRPr lang="en-US" sz="800" dirty="0"/>
-          </a:p>
-        </p:txBody>
-      </p:sp>
-      <p:sp>
-        <p:nvSpPr>
-          <p:cNvPr id="29" name="Oval 28"/>
-          <p:cNvSpPr/>
-          <p:nvPr/>
-        </p:nvSpPr>
-        <p:spPr>
-          <a:xfrm>
-            <a:off x="2307631" y="2225403"/>
-            <a:ext cx="760502" cy="690076"/>
-          </a:xfrm>
-          <a:prstGeom prst="ellipse">
-            <a:avLst/>
-          </a:prstGeom>
-          <a:solidFill>
-            <a:schemeClr val="bg2"/>
-          </a:solidFill>
-          <a:ln>
-            <a:noFill/>
-          </a:ln>
-        </p:spPr>
-        <p:style>
-          <a:lnRef idx="2">
-            <a:schemeClr val="accent1">
-              <a:shade val="50000"/>
-            </a:schemeClr>
-          </a:lnRef>
-          <a:fillRef idx="1">
-            <a:schemeClr val="accent1"/>
-          </a:fillRef>
-          <a:effectRef idx="0">
-            <a:schemeClr val="accent1"/>
-          </a:effectRef>
-          <a:fontRef idx="minor">
-            <a:schemeClr val="lt1"/>
-          </a:fontRef>
-        </p:style>
-        <p:txBody>
-          <a:bodyPr rtlCol="0" anchor="ctr"/>
-          <a:lstStyle/>
-          <a:p>
-            <a:pPr algn="ctr"/>
-            <a:r>
-              <a:rPr lang="en-US" sz="900" dirty="0" smtClean="0"/>
-              <a:t>03_ASC</a:t>
-            </a:r>
-            <a:endParaRPr lang="en-US" sz="900" dirty="0"/>
-          </a:p>
-        </p:txBody>
-      </p:sp>
-      <p:sp>
-        <p:nvSpPr>
-          <p:cNvPr id="30" name="Oval 29"/>
-          <p:cNvSpPr/>
-          <p:nvPr/>
-        </p:nvSpPr>
-        <p:spPr>
-          <a:xfrm>
-            <a:off x="3348929" y="2230109"/>
-            <a:ext cx="870756" cy="760519"/>
-          </a:xfrm>
-          <a:prstGeom prst="ellipse">
-            <a:avLst/>
-          </a:prstGeom>
-          <a:solidFill>
-            <a:schemeClr val="bg2"/>
-          </a:solidFill>
-          <a:ln>
-            <a:noFill/>
-          </a:ln>
-        </p:spPr>
-        <p:style>
-          <a:lnRef idx="2">
-            <a:schemeClr val="accent1">
-              <a:shade val="50000"/>
-            </a:schemeClr>
-          </a:lnRef>
-          <a:fillRef idx="1">
-            <a:schemeClr val="accent1"/>
-          </a:fillRef>
-          <a:effectRef idx="0">
-            <a:schemeClr val="accent1"/>
-          </a:effectRef>
-          <a:fontRef idx="minor">
-            <a:schemeClr val="lt1"/>
-          </a:fontRef>
-        </p:style>
-        <p:txBody>
-          <a:bodyPr rtlCol="0" anchor="ctr"/>
-          <a:lstStyle/>
-          <a:p>
-            <a:pPr algn="ctr"/>
-            <a:r>
-              <a:rPr lang="en-US" sz="900" dirty="0" smtClean="0"/>
-              <a:t>04_BLPE</a:t>
-            </a:r>
-            <a:endParaRPr lang="en-US" sz="900" dirty="0"/>
-          </a:p>
-        </p:txBody>
-      </p:sp>
-      <p:sp>
-        <p:nvSpPr>
-          <p:cNvPr id="31" name="Oval 30"/>
-          <p:cNvSpPr/>
-          <p:nvPr/>
-        </p:nvSpPr>
-        <p:spPr>
-          <a:xfrm>
-            <a:off x="6637883" y="2216493"/>
-            <a:ext cx="943647" cy="807867"/>
-          </a:xfrm>
-          <a:prstGeom prst="ellipse">
-            <a:avLst/>
-          </a:prstGeom>
-          <a:solidFill>
-            <a:schemeClr val="bg2"/>
-          </a:solidFill>
-          <a:ln>
-            <a:noFill/>
-          </a:ln>
-        </p:spPr>
-        <p:style>
-          <a:lnRef idx="2">
-            <a:schemeClr val="accent1">
-              <a:shade val="50000"/>
-            </a:schemeClr>
-          </a:lnRef>
-          <a:fillRef idx="1">
-            <a:schemeClr val="accent1"/>
-          </a:fillRef>
-          <a:effectRef idx="0">
-            <a:schemeClr val="accent1"/>
-          </a:effectRef>
-          <a:fontRef idx="minor">
-            <a:schemeClr val="lt1"/>
-          </a:fontRef>
-        </p:style>
-        <p:txBody>
-          <a:bodyPr rtlCol="0" anchor="ctr"/>
-          <a:lstStyle/>
-          <a:p>
-            <a:pPr algn="ctr"/>
-            <a:r>
-              <a:rPr lang="en-US" sz="900" dirty="0" smtClean="0"/>
-              <a:t>130-SSPSF</a:t>
-            </a:r>
-            <a:endParaRPr lang="en-US" sz="900" dirty="0"/>
-          </a:p>
-        </p:txBody>
-      </p:sp>
-      <p:cxnSp>
-        <p:nvCxnSpPr>
-          <p:cNvPr id="33" name="Straight Arrow Connector 32"/>
-          <p:cNvCxnSpPr/>
-          <p:nvPr/>
-        </p:nvCxnSpPr>
-        <p:spPr>
-          <a:xfrm flipH="1">
-            <a:off x="1790531" y="1577679"/>
-            <a:ext cx="1893363" cy="609635"/>
-          </a:xfrm>
-          <a:prstGeom prst="straightConnector1">
-            <a:avLst/>
-          </a:prstGeom>
-          <a:ln>
-            <a:tailEnd type="triangle"/>
-          </a:ln>
-        </p:spPr>
-        <p:style>
-          <a:lnRef idx="1">
-            <a:schemeClr val="accent1"/>
-          </a:lnRef>
-          <a:fillRef idx="0">
-            <a:schemeClr val="accent1"/>
-          </a:fillRef>
-          <a:effectRef idx="0">
-            <a:schemeClr val="accent1"/>
-          </a:effectRef>
-          <a:fontRef idx="minor">
-            <a:schemeClr val="tx1"/>
-          </a:fontRef>
-        </p:style>
-      </p:cxnSp>
-      <p:cxnSp>
-        <p:nvCxnSpPr>
-          <p:cNvPr id="35" name="Straight Arrow Connector 34"/>
-          <p:cNvCxnSpPr/>
-          <p:nvPr/>
-        </p:nvCxnSpPr>
-        <p:spPr>
-          <a:xfrm flipH="1">
-            <a:off x="2872894" y="1712592"/>
-            <a:ext cx="1083076" cy="508732"/>
-          </a:xfrm>
-          <a:prstGeom prst="straightConnector1">
-            <a:avLst/>
-          </a:prstGeom>
-          <a:ln>
-            <a:tailEnd type="triangle"/>
-          </a:ln>
-        </p:spPr>
-        <p:style>
-          <a:lnRef idx="1">
-            <a:schemeClr val="accent1"/>
-          </a:lnRef>
-          <a:fillRef idx="0">
-            <a:schemeClr val="accent1"/>
-          </a:fillRef>
-          <a:effectRef idx="0">
-            <a:schemeClr val="accent1"/>
-          </a:effectRef>
-          <a:fontRef idx="minor">
-            <a:schemeClr val="tx1"/>
-          </a:fontRef>
-        </p:style>
-      </p:cxnSp>
-      <p:cxnSp>
-        <p:nvCxnSpPr>
-          <p:cNvPr id="37" name="Straight Arrow Connector 36"/>
-          <p:cNvCxnSpPr/>
-          <p:nvPr/>
-        </p:nvCxnSpPr>
-        <p:spPr>
-          <a:xfrm flipH="1">
-            <a:off x="3970144" y="1801919"/>
-            <a:ext cx="232183" cy="428115"/>
-          </a:xfrm>
-          <a:prstGeom prst="straightConnector1">
-            <a:avLst/>
-          </a:prstGeom>
-          <a:ln>
-            <a:tailEnd type="triangle"/>
-          </a:ln>
-        </p:spPr>
-        <p:style>
-          <a:lnRef idx="1">
-            <a:schemeClr val="accent1"/>
-          </a:lnRef>
-          <a:fillRef idx="0">
-            <a:schemeClr val="accent1"/>
-          </a:fillRef>
-          <a:effectRef idx="0">
-            <a:schemeClr val="accent1"/>
-          </a:effectRef>
-          <a:fontRef idx="minor">
-            <a:schemeClr val="tx1"/>
-          </a:fontRef>
-        </p:style>
-      </p:cxnSp>
-      <p:cxnSp>
-        <p:nvCxnSpPr>
-          <p:cNvPr id="39" name="Straight Arrow Connector 38"/>
-          <p:cNvCxnSpPr/>
-          <p:nvPr/>
-        </p:nvCxnSpPr>
-        <p:spPr>
-          <a:xfrm>
-            <a:off x="5526459" y="1717953"/>
-            <a:ext cx="1179295" cy="509695"/>
-          </a:xfrm>
-          <a:prstGeom prst="straightConnector1">
-            <a:avLst/>
-          </a:prstGeom>
-          <a:ln>
-            <a:tailEnd type="triangle"/>
-          </a:ln>
-        </p:spPr>
-        <p:style>
-          <a:lnRef idx="1">
-            <a:schemeClr val="accent1"/>
-          </a:lnRef>
-          <a:fillRef idx="0">
-            <a:schemeClr val="accent1"/>
-          </a:fillRef>
-          <a:effectRef idx="0">
-            <a:schemeClr val="accent1"/>
-          </a:effectRef>
-          <a:fontRef idx="minor">
-            <a:schemeClr val="tx1"/>
-          </a:fontRef>
-        </p:style>
-      </p:cxnSp>
-      <p:sp>
-        <p:nvSpPr>
-          <p:cNvPr id="40" name="TextBox 39"/>
-          <p:cNvSpPr txBox="1"/>
-          <p:nvPr/>
-        </p:nvSpPr>
-        <p:spPr>
-          <a:xfrm>
-            <a:off x="4740676" y="2476870"/>
-            <a:ext cx="1072584" cy="547490"/>
-          </a:xfrm>
-          <a:prstGeom prst="rect">
-            <a:avLst/>
-          </a:prstGeom>
-        </p:spPr>
-        <p:txBody>
-          <a:bodyPr vert="horz" wrap="square" lIns="0" tIns="0" rIns="0" bIns="0" rtlCol="0">
-            <a:noAutofit/>
-          </a:bodyPr>
-          <a:lstStyle/>
-          <a:p>
-            <a:endParaRPr lang="en-US" sz="2400" dirty="0" err="1" smtClean="0">
-              <a:latin typeface="Trebuchet MS" panose="020B0603020202020204" pitchFamily="34" charset="0"/>
-            </a:endParaRPr>
-          </a:p>
-        </p:txBody>
-      </p:sp>
-      <p:sp>
-        <p:nvSpPr>
-          <p:cNvPr id="41" name="TextBox 40"/>
-          <p:cNvSpPr txBox="1"/>
-          <p:nvPr/>
-        </p:nvSpPr>
-        <p:spPr>
-          <a:xfrm>
-            <a:off x="5393498" y="2170960"/>
-            <a:ext cx="368609" cy="362599"/>
-          </a:xfrm>
-          <a:prstGeom prst="rect">
-            <a:avLst/>
-          </a:prstGeom>
-        </p:spPr>
-        <p:txBody>
-          <a:bodyPr vert="horz" wrap="square" lIns="0" tIns="0" rIns="0" bIns="0" rtlCol="0">
-            <a:noAutofit/>
-          </a:bodyPr>
-          <a:lstStyle/>
-          <a:p>
-            <a:r>
-              <a:rPr lang="en-US" sz="3600" dirty="0" smtClean="0">
-                <a:latin typeface="Trebuchet MS" panose="020B0603020202020204" pitchFamily="34" charset="0"/>
-              </a:rPr>
-              <a:t>…</a:t>
-            </a:r>
-          </a:p>
-        </p:txBody>
-      </p:sp>
-      <p:sp>
-        <p:nvSpPr>
-          <p:cNvPr id="42" name="Flowchart: Connector 41"/>
-          <p:cNvSpPr/>
-          <p:nvPr/>
-        </p:nvSpPr>
-        <p:spPr>
-          <a:xfrm>
-            <a:off x="3773552" y="3693953"/>
-            <a:ext cx="1472593" cy="806175"/>
-          </a:xfrm>
-          <a:prstGeom prst="flowChartConnector">
-            <a:avLst/>
-          </a:prstGeom>
-          <a:solidFill>
-            <a:schemeClr val="bg2"/>
-          </a:solidFill>
-          <a:ln>
-            <a:noFill/>
-          </a:ln>
-        </p:spPr>
-        <p:style>
-          <a:lnRef idx="2">
-            <a:schemeClr val="accent1">
-              <a:shade val="50000"/>
-            </a:schemeClr>
-          </a:lnRef>
-          <a:fillRef idx="1">
-            <a:schemeClr val="accent1"/>
-          </a:fillRef>
-          <a:effectRef idx="0">
-            <a:schemeClr val="accent1"/>
-          </a:effectRef>
-          <a:fontRef idx="minor">
-            <a:schemeClr val="lt1"/>
-          </a:fontRef>
-        </p:style>
-        <p:txBody>
-          <a:bodyPr rtlCol="0" anchor="ctr"/>
-          <a:lstStyle/>
-          <a:p>
-            <a:pPr algn="ctr"/>
-            <a:r>
-              <a:rPr lang="en-US" sz="1400" dirty="0" smtClean="0"/>
-              <a:t>Error Handling</a:t>
-            </a:r>
-            <a:endParaRPr lang="en-US" sz="1400" dirty="0"/>
-          </a:p>
-        </p:txBody>
-      </p:sp>
-      <p:cxnSp>
-        <p:nvCxnSpPr>
-          <p:cNvPr id="44" name="Straight Arrow Connector 43"/>
-          <p:cNvCxnSpPr/>
-          <p:nvPr/>
-        </p:nvCxnSpPr>
-        <p:spPr>
-          <a:xfrm>
-            <a:off x="1890944" y="3098307"/>
-            <a:ext cx="1792950" cy="710213"/>
-          </a:xfrm>
-          <a:prstGeom prst="straightConnector1">
-            <a:avLst/>
-          </a:prstGeom>
-          <a:ln>
-            <a:tailEnd type="triangle"/>
-          </a:ln>
-        </p:spPr>
-        <p:style>
-          <a:lnRef idx="1">
-            <a:schemeClr val="accent1"/>
-          </a:lnRef>
-          <a:fillRef idx="0">
-            <a:schemeClr val="accent1"/>
-          </a:fillRef>
-          <a:effectRef idx="0">
-            <a:schemeClr val="accent1"/>
-          </a:effectRef>
-          <a:fontRef idx="minor">
-            <a:schemeClr val="tx1"/>
-          </a:fontRef>
-        </p:style>
-      </p:cxnSp>
-      <p:cxnSp>
-        <p:nvCxnSpPr>
-          <p:cNvPr id="46" name="Straight Arrow Connector 45"/>
-          <p:cNvCxnSpPr/>
-          <p:nvPr/>
-        </p:nvCxnSpPr>
-        <p:spPr>
-          <a:xfrm>
-            <a:off x="3014733" y="3070392"/>
-            <a:ext cx="865387" cy="532147"/>
-          </a:xfrm>
-          <a:prstGeom prst="straightConnector1">
-            <a:avLst/>
-          </a:prstGeom>
-          <a:ln>
-            <a:tailEnd type="triangle"/>
-          </a:ln>
-        </p:spPr>
-        <p:style>
-          <a:lnRef idx="1">
-            <a:schemeClr val="accent1"/>
-          </a:lnRef>
-          <a:fillRef idx="0">
-            <a:schemeClr val="accent1"/>
-          </a:fillRef>
-          <a:effectRef idx="0">
-            <a:schemeClr val="accent1"/>
-          </a:effectRef>
-          <a:fontRef idx="minor">
-            <a:schemeClr val="tx1"/>
-          </a:fontRef>
-        </p:style>
-      </p:cxnSp>
-      <p:cxnSp>
-        <p:nvCxnSpPr>
-          <p:cNvPr id="48" name="Straight Arrow Connector 47"/>
-          <p:cNvCxnSpPr/>
-          <p:nvPr/>
-        </p:nvCxnSpPr>
-        <p:spPr>
-          <a:xfrm>
-            <a:off x="4099565" y="3070392"/>
-            <a:ext cx="240461" cy="506007"/>
-          </a:xfrm>
-          <a:prstGeom prst="straightConnector1">
-            <a:avLst/>
-          </a:prstGeom>
-          <a:ln>
-            <a:tailEnd type="triangle"/>
-          </a:ln>
-        </p:spPr>
-        <p:style>
-          <a:lnRef idx="1">
-            <a:schemeClr val="accent1"/>
-          </a:lnRef>
-          <a:fillRef idx="0">
-            <a:schemeClr val="accent1"/>
-          </a:fillRef>
-          <a:effectRef idx="0">
-            <a:schemeClr val="accent1"/>
-          </a:effectRef>
-          <a:fontRef idx="minor">
-            <a:schemeClr val="tx1"/>
-          </a:fontRef>
-        </p:style>
-      </p:cxnSp>
-      <p:cxnSp>
-        <p:nvCxnSpPr>
-          <p:cNvPr id="50" name="Straight Arrow Connector 49"/>
-          <p:cNvCxnSpPr/>
-          <p:nvPr/>
-        </p:nvCxnSpPr>
-        <p:spPr>
-          <a:xfrm flipH="1">
-            <a:off x="5044308" y="3098307"/>
-            <a:ext cx="1610738" cy="612559"/>
-          </a:xfrm>
-          <a:prstGeom prst="straightConnector1">
-            <a:avLst/>
-          </a:prstGeom>
-          <a:ln>
-            <a:tailEnd type="triangle"/>
-          </a:ln>
-        </p:spPr>
-        <p:style>
-          <a:lnRef idx="1">
-            <a:schemeClr val="accent1"/>
-          </a:lnRef>
-          <a:fillRef idx="0">
-            <a:schemeClr val="accent1"/>
-          </a:fillRef>
-          <a:effectRef idx="0">
-            <a:schemeClr val="accent1"/>
-          </a:effectRef>
-          <a:fontRef idx="minor">
-            <a:schemeClr val="tx1"/>
-          </a:fontRef>
-        </p:style>
-      </p:cxnSp>
-      <p:sp>
-        <p:nvSpPr>
-          <p:cNvPr id="51" name="TextBox 50"/>
-          <p:cNvSpPr txBox="1"/>
-          <p:nvPr/>
-        </p:nvSpPr>
-        <p:spPr>
-          <a:xfrm>
-            <a:off x="6098959" y="1376039"/>
-            <a:ext cx="2485748" cy="535636"/>
-          </a:xfrm>
-          <a:prstGeom prst="rect">
-            <a:avLst/>
-          </a:prstGeom>
-        </p:spPr>
-        <p:txBody>
-          <a:bodyPr vert="horz" wrap="square" lIns="0" tIns="0" rIns="0" bIns="0" rtlCol="0">
-            <a:noAutofit/>
-          </a:bodyPr>
-          <a:lstStyle/>
-          <a:p>
-            <a:endParaRPr lang="en-US" sz="2400" dirty="0" err="1" smtClean="0">
-              <a:latin typeface="Trebuchet MS" panose="020B0603020202020204" pitchFamily="34" charset="0"/>
-            </a:endParaRPr>
-          </a:p>
-        </p:txBody>
-      </p:sp>
-      <p:sp>
-        <p:nvSpPr>
-          <p:cNvPr id="52" name="TextBox 51"/>
-          <p:cNvSpPr txBox="1"/>
-          <p:nvPr/>
-        </p:nvSpPr>
-        <p:spPr>
-          <a:xfrm>
-            <a:off x="6637883" y="1427231"/>
-            <a:ext cx="1601381" cy="682067"/>
-          </a:xfrm>
-          <a:prstGeom prst="rect">
-            <a:avLst/>
-          </a:prstGeom>
-        </p:spPr>
-        <p:txBody>
-          <a:bodyPr vert="horz" wrap="square" lIns="0" tIns="0" rIns="0" bIns="0" rtlCol="0">
-            <a:noAutofit/>
-          </a:bodyPr>
-          <a:lstStyle/>
-          <a:p>
-            <a:pPr marL="228600" indent="-228600">
-              <a:buAutoNum type="arabicPeriod"/>
-            </a:pPr>
-            <a:r>
-              <a:rPr lang="en-US" sz="1100" dirty="0" smtClean="0">
-                <a:latin typeface="Trebuchet MS" panose="020B0603020202020204" pitchFamily="34" charset="0"/>
-              </a:rPr>
-              <a:t>Attempt concurrent downloads to all folders</a:t>
-            </a:r>
-          </a:p>
-          <a:p>
-            <a:r>
-              <a:rPr lang="en-US" sz="1100" dirty="0" smtClean="0">
-                <a:latin typeface="Trebuchet MS" panose="020B0603020202020204" pitchFamily="34" charset="0"/>
-              </a:rPr>
-              <a:t>        </a:t>
-            </a:r>
-            <a:r>
-              <a:rPr lang="en-US" sz="1050" dirty="0" smtClean="0">
-                <a:latin typeface="Trebuchet MS" panose="020B0603020202020204" pitchFamily="34" charset="0"/>
-              </a:rPr>
-              <a:t>- 300 seconds</a:t>
-            </a:r>
-          </a:p>
-        </p:txBody>
-      </p:sp>
-      <p:sp>
-        <p:nvSpPr>
-          <p:cNvPr id="53" name="TextBox 52"/>
-          <p:cNvSpPr txBox="1"/>
-          <p:nvPr/>
-        </p:nvSpPr>
-        <p:spPr>
-          <a:xfrm>
-            <a:off x="6507332" y="3474197"/>
-            <a:ext cx="1890944" cy="396467"/>
-          </a:xfrm>
-          <a:prstGeom prst="rect">
-            <a:avLst/>
-          </a:prstGeom>
-        </p:spPr>
-        <p:txBody>
-          <a:bodyPr vert="horz" wrap="square" lIns="0" tIns="0" rIns="0" bIns="0" rtlCol="0">
-            <a:noAutofit/>
-          </a:bodyPr>
-          <a:lstStyle/>
-          <a:p>
-            <a:endParaRPr lang="en-US" sz="2400" dirty="0" err="1" smtClean="0">
-              <a:latin typeface="Trebuchet MS" panose="020B0603020202020204" pitchFamily="34" charset="0"/>
-            </a:endParaRPr>
-          </a:p>
-        </p:txBody>
-      </p:sp>
-      <p:sp>
-        <p:nvSpPr>
-          <p:cNvPr id="54" name="TextBox 53"/>
-          <p:cNvSpPr txBox="1"/>
-          <p:nvPr/>
-        </p:nvSpPr>
-        <p:spPr>
-          <a:xfrm>
-            <a:off x="6373608" y="3498552"/>
-            <a:ext cx="1713390" cy="582567"/>
-          </a:xfrm>
-          <a:prstGeom prst="rect">
-            <a:avLst/>
-          </a:prstGeom>
-        </p:spPr>
-        <p:txBody>
-          <a:bodyPr vert="horz" wrap="square" lIns="0" tIns="0" rIns="0" bIns="0" rtlCol="0">
-            <a:noAutofit/>
-          </a:bodyPr>
-          <a:lstStyle/>
-          <a:p>
-            <a:r>
-              <a:rPr lang="en-US" sz="1100" dirty="0" smtClean="0">
-                <a:latin typeface="Trebuchet MS" panose="020B0603020202020204" pitchFamily="34" charset="0"/>
-              </a:rPr>
-              <a:t>2. Try to fix all folders that failed to download</a:t>
-            </a:r>
-          </a:p>
-          <a:p>
-            <a:r>
-              <a:rPr lang="en-US" sz="1050" dirty="0">
-                <a:latin typeface="Trebuchet MS" panose="020B0603020202020204" pitchFamily="34" charset="0"/>
-              </a:rPr>
-              <a:t> </a:t>
-            </a:r>
-            <a:r>
-              <a:rPr lang="en-US" sz="1050" dirty="0" smtClean="0">
-                <a:latin typeface="Trebuchet MS" panose="020B0603020202020204" pitchFamily="34" charset="0"/>
-              </a:rPr>
-              <a:t>        - 200 seconds</a:t>
-            </a:r>
-          </a:p>
-        </p:txBody>
-      </p:sp>
-      <p:cxnSp>
-        <p:nvCxnSpPr>
-          <p:cNvPr id="56" name="Straight Arrow Connector 55"/>
-          <p:cNvCxnSpPr/>
-          <p:nvPr/>
-        </p:nvCxnSpPr>
-        <p:spPr>
-          <a:xfrm>
-            <a:off x="4509848" y="4607510"/>
-            <a:ext cx="0" cy="719092"/>
-          </a:xfrm>
-          <a:prstGeom prst="straightConnector1">
-            <a:avLst/>
-          </a:prstGeom>
-          <a:ln>
-            <a:tailEnd type="triangle"/>
-          </a:ln>
-        </p:spPr>
-        <p:style>
-          <a:lnRef idx="1">
-            <a:schemeClr val="accent1"/>
-          </a:lnRef>
-          <a:fillRef idx="0">
-            <a:schemeClr val="accent1"/>
-          </a:fillRef>
-          <a:effectRef idx="0">
-            <a:schemeClr val="accent1"/>
-          </a:effectRef>
-          <a:fontRef idx="minor">
-            <a:schemeClr val="tx1"/>
-          </a:fontRef>
-        </p:style>
-      </p:cxnSp>
-      <p:sp>
-        <p:nvSpPr>
-          <p:cNvPr id="57" name="Flowchart: Connector 56"/>
-          <p:cNvSpPr/>
-          <p:nvPr/>
-        </p:nvSpPr>
-        <p:spPr>
-          <a:xfrm>
-            <a:off x="3803854" y="5459917"/>
-            <a:ext cx="1364779" cy="919934"/>
-          </a:xfrm>
-          <a:prstGeom prst="flowChartConnector">
-            <a:avLst/>
-          </a:prstGeom>
-          <a:solidFill>
-            <a:schemeClr val="accent6"/>
-          </a:solidFill>
-          <a:ln>
-            <a:noFill/>
-          </a:ln>
-        </p:spPr>
-        <p:style>
-          <a:lnRef idx="2">
-            <a:schemeClr val="accent1">
-              <a:shade val="50000"/>
-            </a:schemeClr>
-          </a:lnRef>
-          <a:fillRef idx="1">
-            <a:schemeClr val="accent1"/>
-          </a:fillRef>
-          <a:effectRef idx="0">
-            <a:schemeClr val="accent1"/>
-          </a:effectRef>
-          <a:fontRef idx="minor">
-            <a:schemeClr val="lt1"/>
-          </a:fontRef>
-        </p:style>
-        <p:txBody>
-          <a:bodyPr rtlCol="0" anchor="ctr"/>
-          <a:lstStyle/>
-          <a:p>
-            <a:pPr algn="ctr"/>
-            <a:r>
-              <a:rPr lang="en-US" sz="1400" dirty="0" smtClean="0"/>
-              <a:t>Send final summary email </a:t>
-            </a:r>
-            <a:endParaRPr lang="en-US" sz="1400" dirty="0"/>
-          </a:p>
-        </p:txBody>
-      </p:sp>
-      <p:sp>
-        <p:nvSpPr>
-          <p:cNvPr id="59" name="TextBox 58"/>
-          <p:cNvSpPr txBox="1"/>
-          <p:nvPr/>
-        </p:nvSpPr>
-        <p:spPr>
-          <a:xfrm>
-            <a:off x="5880749" y="4767625"/>
-            <a:ext cx="1826843" cy="905206"/>
-          </a:xfrm>
-          <a:prstGeom prst="rect">
-            <a:avLst/>
-          </a:prstGeom>
-        </p:spPr>
-        <p:txBody>
-          <a:bodyPr vert="horz" wrap="square" lIns="0" tIns="0" rIns="0" bIns="0" rtlCol="0">
-            <a:noAutofit/>
-          </a:bodyPr>
-          <a:lstStyle/>
-          <a:p>
-            <a:r>
-              <a:rPr lang="en-US" sz="1100" dirty="0" smtClean="0">
-                <a:latin typeface="Trebuchet MS" panose="020B0603020202020204" pitchFamily="34" charset="0"/>
-              </a:rPr>
-              <a:t>3. Write to a raw log file and send an email that parses the file to determine if the downloads were successful</a:t>
-            </a:r>
-          </a:p>
-          <a:p>
-            <a:r>
-              <a:rPr lang="en-US" sz="1050" dirty="0">
-                <a:latin typeface="Trebuchet MS" panose="020B0603020202020204" pitchFamily="34" charset="0"/>
-              </a:rPr>
-              <a:t> </a:t>
-            </a:r>
-            <a:r>
-              <a:rPr lang="en-US" sz="1050" dirty="0" smtClean="0">
-                <a:latin typeface="Trebuchet MS" panose="020B0603020202020204" pitchFamily="34" charset="0"/>
-              </a:rPr>
-              <a:t>          - 30 seconds</a:t>
-            </a:r>
-          </a:p>
-        </p:txBody>
-      </p:sp>
       <p:pic>
         <p:nvPicPr>
-          <p:cNvPr id="62" name="Picture 61"/>
+          <p:cNvPr id="5" name="Picture 4"/>
           <p:cNvPicPr>
             <a:picLocks noChangeAspect="1"/>
           </p:cNvPicPr>
           <p:nvPr/>
         </p:nvPicPr>
         <p:blipFill>
-          <a:blip r:embed="rId2"/>
+          <a:blip r:embed="rId2">
+            <a:extLst>
+              <a:ext uri="{28A0092B-C50C-407E-A947-70E740481C1C}">
+                <a14:useLocalDpi xmlns:a14="http://schemas.microsoft.com/office/drawing/2010/main" val="0"/>
+              </a:ext>
+            </a:extLst>
+          </a:blip>
           <a:stretch>
             <a:fillRect/>
           </a:stretch>
         </p:blipFill>
         <p:spPr>
           <a:xfrm>
-            <a:off x="6313975" y="1541889"/>
-            <a:ext cx="303417" cy="303417"/>
+            <a:off x="976544" y="847984"/>
+            <a:ext cx="7830104" cy="5773463"/>
           </a:xfrm>
           <a:prstGeom prst="rect">
             <a:avLst/>
           </a:prstGeom>
         </p:spPr>
       </p:pic>
-      <p:pic>
-        <p:nvPicPr>
-          <p:cNvPr id="63" name="Picture 62"/>
-          <p:cNvPicPr>
-            <a:picLocks noChangeAspect="1"/>
-          </p:cNvPicPr>
-          <p:nvPr/>
-        </p:nvPicPr>
-        <p:blipFill>
-          <a:blip r:embed="rId2"/>
-          <a:stretch>
-            <a:fillRect/>
-          </a:stretch>
-        </p:blipFill>
-        <p:spPr>
-          <a:xfrm>
-            <a:off x="3454117" y="3945331"/>
-            <a:ext cx="303417" cy="303417"/>
-          </a:xfrm>
-          <a:prstGeom prst="rect">
-            <a:avLst/>
-          </a:prstGeom>
-        </p:spPr>
-      </p:pic>
-      <p:pic>
-        <p:nvPicPr>
-          <p:cNvPr id="64" name="Picture 63"/>
-          <p:cNvPicPr>
-            <a:picLocks noChangeAspect="1"/>
-          </p:cNvPicPr>
-          <p:nvPr/>
-        </p:nvPicPr>
-        <p:blipFill>
-          <a:blip r:embed="rId2"/>
-          <a:stretch>
-            <a:fillRect/>
-          </a:stretch>
-        </p:blipFill>
-        <p:spPr>
-          <a:xfrm>
-            <a:off x="3455994" y="5795728"/>
-            <a:ext cx="303417" cy="303417"/>
-          </a:xfrm>
-          <a:prstGeom prst="rect">
-            <a:avLst/>
-          </a:prstGeom>
-        </p:spPr>
-      </p:pic>
-      <p:sp>
-        <p:nvSpPr>
-          <p:cNvPr id="2" name="TextBox 1"/>
-          <p:cNvSpPr txBox="1"/>
-          <p:nvPr/>
-        </p:nvSpPr>
-        <p:spPr>
-          <a:xfrm>
-            <a:off x="1997118" y="1037682"/>
-            <a:ext cx="1269506" cy="737323"/>
-          </a:xfrm>
-          <a:prstGeom prst="rect">
-            <a:avLst/>
-          </a:prstGeom>
-        </p:spPr>
-        <p:txBody>
-          <a:bodyPr vert="horz" wrap="square" lIns="0" tIns="0" rIns="0" bIns="0" rtlCol="0">
-            <a:noAutofit/>
-          </a:bodyPr>
-          <a:lstStyle/>
-          <a:p>
-            <a:r>
-              <a:rPr lang="en-US" sz="1050" dirty="0" smtClean="0">
-                <a:latin typeface="Trebuchet MS" panose="020B0603020202020204" pitchFamily="34" charset="0"/>
-              </a:rPr>
-              <a:t>0. Simple pre-processing of the data</a:t>
-            </a:r>
-          </a:p>
-          <a:p>
-            <a:r>
-              <a:rPr lang="en-US" sz="1050" dirty="0" smtClean="0">
-                <a:latin typeface="Trebuchet MS" panose="020B0603020202020204" pitchFamily="34" charset="0"/>
-              </a:rPr>
-              <a:t>      - </a:t>
-            </a:r>
-            <a:r>
-              <a:rPr lang="en-US" sz="1000" dirty="0" smtClean="0">
-                <a:latin typeface="Trebuchet MS" panose="020B0603020202020204" pitchFamily="34" charset="0"/>
-              </a:rPr>
-              <a:t>10 seconds</a:t>
-            </a:r>
-          </a:p>
-        </p:txBody>
-      </p:sp>
     </p:spTree>
     <p:extLst>
       <p:ext uri="{BB962C8B-B14F-4D97-AF65-F5344CB8AC3E}">
@@ -10451,13 +9357,6 @@
   <p:clrMapOvr>
     <a:masterClrMapping/>
   </p:clrMapOvr>
-  <p:timing>
-    <p:tnLst>
-      <p:par>
-        <p:cTn id="1" dur="indefinite" restart="never" nodeType="tmRoot"/>
-      </p:par>
-    </p:tnLst>
-  </p:timing>
 </p:sld>
 </file>
 
@@ -10496,8 +9395,8 @@
         </p:blipFill>
         <p:spPr>
           <a:xfrm>
-            <a:off x="330411" y="1402673"/>
-            <a:ext cx="4428126" cy="4358936"/>
+            <a:off x="381024" y="1114996"/>
+            <a:ext cx="4993964" cy="4915933"/>
           </a:xfrm>
           <a:prstGeom prst="rect">
             <a:avLst/>
@@ -10520,10 +9419,9 @@
           <a:lstStyle/>
           <a:p>
             <a:r>
-              <a:rPr lang="en-US" dirty="0" smtClean="0"/>
+              <a:rPr lang="en-US" dirty="0"/>
               <a:t>Error Checking Report Layout</a:t>
             </a:r>
-            <a:endParaRPr lang="en-US" dirty="0"/>
           </a:p>
         </p:txBody>
       </p:sp>
@@ -10546,7 +9444,7 @@
               <a:defRPr/>
             </a:pPr>
             <a:r>
-              <a:rPr lang="en-US" sz="800" smtClean="0">
+              <a:rPr lang="en-US" sz="800">
                 <a:solidFill>
                   <a:srgbClr val="C00000"/>
                 </a:solidFill>
@@ -10580,7 +9478,7 @@
         </p:nvSpPr>
         <p:spPr>
           <a:xfrm>
-            <a:off x="4834237" y="1558031"/>
+            <a:off x="5050260" y="1617655"/>
             <a:ext cx="3835154" cy="3910613"/>
           </a:xfrm>
           <a:prstGeom prst="rect">
@@ -10601,7 +9499,7 @@
               <a:buChar char="•"/>
             </a:pPr>
             <a:r>
-              <a:rPr lang="en-US" sz="1600" dirty="0" smtClean="0">
+              <a:rPr lang="en-US" sz="1600" dirty="0">
                 <a:latin typeface="Trebuchet MS" panose="020B0603020202020204" pitchFamily="34" charset="0"/>
               </a:rPr>
               <a:t>Automated to send immediately after the data gets downloaded (roughly 6:25 AM)</a:t>
@@ -10616,7 +9514,7 @@
               <a:buChar char="•"/>
             </a:pPr>
             <a:r>
-              <a:rPr lang="en-US" sz="1600" dirty="0" smtClean="0">
+              <a:rPr lang="en-US" sz="1600" dirty="0">
                 <a:latin typeface="Trebuchet MS" panose="020B0603020202020204" pitchFamily="34" charset="0"/>
               </a:rPr>
               <a:t>Summarizes the following:</a:t>
@@ -10631,7 +9529,7 @@
               <a:buChar char="•"/>
             </a:pPr>
             <a:r>
-              <a:rPr lang="en-US" sz="1400" dirty="0" smtClean="0">
+              <a:rPr lang="en-US" sz="1400" dirty="0">
                 <a:latin typeface="Trebuchet MS" panose="020B0603020202020204" pitchFamily="34" charset="0"/>
               </a:rPr>
               <a:t>Lower and upper bounds for date queries</a:t>
@@ -10646,7 +9544,7 @@
               <a:buChar char="•"/>
             </a:pPr>
             <a:r>
-              <a:rPr lang="en-US" sz="1400" dirty="0" smtClean="0">
+              <a:rPr lang="en-US" sz="1400" dirty="0">
                 <a:latin typeface="Trebuchet MS" panose="020B0603020202020204" pitchFamily="34" charset="0"/>
               </a:rPr>
               <a:t>Total download time recorded</a:t>
@@ -10661,7 +9559,7 @@
               <a:buChar char="•"/>
             </a:pPr>
             <a:r>
-              <a:rPr lang="en-US" sz="1400" dirty="0" smtClean="0">
+              <a:rPr lang="en-US" sz="1400" dirty="0">
                 <a:latin typeface="Trebuchet MS" panose="020B0603020202020204" pitchFamily="34" charset="0"/>
               </a:rPr>
               <a:t>Identifies which folders have no available data</a:t>
@@ -10676,7 +9574,7 @@
               <a:buChar char="•"/>
             </a:pPr>
             <a:r>
-              <a:rPr lang="en-US" sz="1400" dirty="0" smtClean="0">
+              <a:rPr lang="en-US" sz="1400" dirty="0">
                 <a:latin typeface="Trebuchet MS" panose="020B0603020202020204" pitchFamily="34" charset="0"/>
               </a:rPr>
               <a:t>Notes which folders were not successfully downloaded to</a:t>
@@ -10691,22 +9589,10 @@
               <a:buChar char="•"/>
             </a:pPr>
             <a:r>
-              <a:rPr lang="en-US" sz="1600" dirty="0" smtClean="0">
-                <a:latin typeface="Trebuchet MS" panose="020B0603020202020204" pitchFamily="34" charset="0"/>
-              </a:rPr>
-              <a:t>Offers an easy solution via the Command </a:t>
-            </a:r>
-            <a:r>
               <a:rPr lang="en-US" sz="1600" dirty="0">
                 <a:latin typeface="Trebuchet MS" panose="020B0603020202020204" pitchFamily="34" charset="0"/>
               </a:rPr>
-              <a:t>L</a:t>
-            </a:r>
-            <a:r>
-              <a:rPr lang="en-US" sz="1600" dirty="0" smtClean="0">
-                <a:latin typeface="Trebuchet MS" panose="020B0603020202020204" pitchFamily="34" charset="0"/>
-              </a:rPr>
-              <a:t>ine to manually download missing data</a:t>
+              <a:t>Offers an easy solution via the Command Line to manually download missing data</a:t>
             </a:r>
           </a:p>
           <a:p>
@@ -10718,7 +9604,7 @@
               <a:buChar char="•"/>
             </a:pPr>
             <a:r>
-              <a:rPr lang="en-US" sz="1600" dirty="0" smtClean="0">
+              <a:rPr lang="en-US" sz="1600" dirty="0">
                 <a:latin typeface="Trebuchet MS" panose="020B0603020202020204" pitchFamily="34" charset="0"/>
               </a:rPr>
               <a:t>Provides further Troubleshooting Tips and Tricks</a:t>
@@ -10729,7 +9615,7 @@
               <a:buFont typeface="Arial" panose="020B0604020202020204" pitchFamily="34" charset="0"/>
               <a:buChar char="•"/>
             </a:pPr>
-            <a:endParaRPr lang="en-US" sz="1400" dirty="0" smtClean="0">
+            <a:endParaRPr lang="en-US" sz="1400" dirty="0">
               <a:latin typeface="Trebuchet MS" panose="020B0603020202020204" pitchFamily="34" charset="0"/>
             </a:endParaRPr>
           </a:p>
@@ -10738,7 +9624,7 @@
               <a:buFont typeface="Arial" panose="020B0604020202020204" pitchFamily="34" charset="0"/>
               <a:buChar char="•"/>
             </a:pPr>
-            <a:endParaRPr lang="en-US" sz="1400" dirty="0" err="1" smtClean="0">
+            <a:endParaRPr lang="en-US" sz="1400" dirty="0" err="1">
               <a:latin typeface="Trebuchet MS" panose="020B0603020202020204" pitchFamily="34" charset="0"/>
             </a:endParaRPr>
           </a:p>
@@ -10754,13 +9640,127 @@
   <p:clrMapOvr>
     <a:masterClrMapping/>
   </p:clrMapOvr>
-  <p:timing>
-    <p:tnLst>
-      <p:par>
-        <p:cTn id="1" dur="indefinite" restart="never" nodeType="tmRoot"/>
-      </p:par>
-    </p:tnLst>
-  </p:timing>
+</p:sld>
+</file>
+
+<file path=ppt/slides/slide5.xml><?xml version="1.0" encoding="utf-8"?>
+<p:sld xmlns:a="http://schemas.openxmlformats.org/drawingml/2006/main" xmlns:r="http://schemas.openxmlformats.org/officeDocument/2006/relationships" xmlns:p="http://schemas.openxmlformats.org/presentationml/2006/main">
+  <p:cSld>
+    <p:spTree>
+      <p:nvGrpSpPr>
+        <p:cNvPr id="1" name=""/>
+        <p:cNvGrpSpPr/>
+        <p:nvPr/>
+      </p:nvGrpSpPr>
+      <p:grpSpPr>
+        <a:xfrm>
+          <a:off x="0" y="0"/>
+          <a:ext cx="0" cy="0"/>
+          <a:chOff x="0" y="0"/>
+          <a:chExt cx="0" cy="0"/>
+        </a:xfrm>
+      </p:grpSpPr>
+      <p:sp>
+        <p:nvSpPr>
+          <p:cNvPr id="3" name="Title 2"/>
+          <p:cNvSpPr>
+            <a:spLocks noGrp="1"/>
+          </p:cNvSpPr>
+          <p:nvPr>
+            <p:ph type="title"/>
+          </p:nvPr>
+        </p:nvSpPr>
+        <p:spPr/>
+        <p:txBody>
+          <a:bodyPr/>
+          <a:lstStyle/>
+          <a:p>
+            <a:r>
+              <a:rPr lang="en-US" dirty="0"/>
+              <a:t>Delta Table Workflow</a:t>
+            </a:r>
+          </a:p>
+        </p:txBody>
+      </p:sp>
+      <p:sp>
+        <p:nvSpPr>
+          <p:cNvPr id="4" name="Slide Number Placeholder 3"/>
+          <p:cNvSpPr>
+            <a:spLocks noGrp="1"/>
+          </p:cNvSpPr>
+          <p:nvPr>
+            <p:ph type="sldNum" sz="quarter" idx="12"/>
+          </p:nvPr>
+        </p:nvSpPr>
+        <p:spPr/>
+        <p:txBody>
+          <a:bodyPr/>
+          <a:lstStyle/>
+          <a:p>
+            <a:pPr>
+              <a:defRPr/>
+            </a:pPr>
+            <a:r>
+              <a:rPr lang="en-US" sz="800">
+                <a:solidFill>
+                  <a:srgbClr val="C00000"/>
+                </a:solidFill>
+              </a:rPr>
+              <a:t>HIGHLY CONFIDENTIAL </a:t>
+            </a:r>
+            <a:fld id="{EC4D6EA5-BC0F-4B07-ABF1-A957CA1E5A93}" type="slidenum">
+              <a:rPr lang="en-US" smtClean="0">
+                <a:solidFill>
+                  <a:prstClr val="black"/>
+                </a:solidFill>
+              </a:rPr>
+              <a:pPr>
+                <a:defRPr/>
+              </a:pPr>
+              <a:t>5</a:t>
+            </a:fld>
+            <a:endParaRPr lang="en-US" dirty="0">
+              <a:solidFill>
+                <a:prstClr val="black"/>
+              </a:solidFill>
+            </a:endParaRPr>
+          </a:p>
+        </p:txBody>
+      </p:sp>
+      <p:pic>
+        <p:nvPicPr>
+          <p:cNvPr id="7" name="Picture 6"/>
+          <p:cNvPicPr>
+            <a:picLocks noChangeAspect="1"/>
+          </p:cNvPicPr>
+          <p:nvPr/>
+        </p:nvPicPr>
+        <p:blipFill>
+          <a:blip r:embed="rId2"/>
+          <a:stretch>
+            <a:fillRect/>
+          </a:stretch>
+        </p:blipFill>
+        <p:spPr>
+          <a:xfrm>
+            <a:off x="5886038" y="1078236"/>
+            <a:ext cx="2655447" cy="5353235"/>
+          </a:xfrm>
+          <a:prstGeom prst="rect">
+            <a:avLst/>
+          </a:prstGeom>
+        </p:spPr>
+      </p:pic>
+    </p:spTree>
+    <p:extLst>
+      <p:ext uri="{BB962C8B-B14F-4D97-AF65-F5344CB8AC3E}">
+        <p14:creationId xmlns:p14="http://schemas.microsoft.com/office/powerpoint/2010/main" val="375268835"/>
+      </p:ext>
+    </p:extLst>
+  </p:cSld>
+  <p:clrMapOvr>
+    <a:masterClrMapping/>
+  </p:clrMapOvr>
 </p:sld>
 </file>
 

</xml_diff>

<commit_message>
close to end of day 4/34
</commit_message>
<xml_diff>
--- a/Bi-weekly Update  07192023 SX.pptx
+++ b/Bi-weekly Update  07192023 SX.pptx
@@ -6,17 +6,18 @@
     <p:sldMasterId id="2147483677" r:id="rId2"/>
   </p:sldMasterIdLst>
   <p:notesMasterIdLst>
-    <p:notesMasterId r:id="rId8"/>
+    <p:notesMasterId r:id="rId9"/>
   </p:notesMasterIdLst>
   <p:handoutMasterIdLst>
-    <p:handoutMasterId r:id="rId9"/>
+    <p:handoutMasterId r:id="rId10"/>
   </p:handoutMasterIdLst>
   <p:sldIdLst>
     <p:sldId id="388" r:id="rId3"/>
     <p:sldId id="427" r:id="rId4"/>
     <p:sldId id="428" r:id="rId5"/>
     <p:sldId id="429" r:id="rId6"/>
-    <p:sldId id="430" r:id="rId7"/>
+    <p:sldId id="432" r:id="rId7"/>
+    <p:sldId id="431" r:id="rId8"/>
   </p:sldIdLst>
   <p:sldSz cx="9144000" cy="6858000" type="screen4x3"/>
   <p:notesSz cx="7019925" cy="9305925"/>
@@ -149,6 +150,753 @@
 </file>
 
 <file path=ppt/diagrams/colors1.xml><?xml version="1.0" encoding="utf-8"?>
+<dgm:colorsDef xmlns:dgm="http://schemas.openxmlformats.org/drawingml/2006/diagram" xmlns:a="http://schemas.openxmlformats.org/drawingml/2006/main" uniqueId="urn:microsoft.com/office/officeart/2005/8/colors/accent1_2">
+  <dgm:title val=""/>
+  <dgm:desc val=""/>
+  <dgm:catLst>
+    <dgm:cat type="accent1" pri="11200"/>
+  </dgm:catLst>
+  <dgm:styleLbl name="node0">
+    <dgm:fillClrLst meth="repeat">
+      <a:schemeClr val="accent1"/>
+    </dgm:fillClrLst>
+    <dgm:linClrLst meth="repeat">
+      <a:schemeClr val="lt1"/>
+    </dgm:linClrLst>
+    <dgm:effectClrLst/>
+    <dgm:txLinClrLst/>
+    <dgm:txFillClrLst/>
+    <dgm:txEffectClrLst/>
+  </dgm:styleLbl>
+  <dgm:styleLbl name="alignNode1">
+    <dgm:fillClrLst meth="repeat">
+      <a:schemeClr val="accent1"/>
+    </dgm:fillClrLst>
+    <dgm:linClrLst meth="repeat">
+      <a:schemeClr val="accent1"/>
+    </dgm:linClrLst>
+    <dgm:effectClrLst/>
+    <dgm:txLinClrLst/>
+    <dgm:txFillClrLst/>
+    <dgm:txEffectClrLst/>
+  </dgm:styleLbl>
+  <dgm:styleLbl name="node1">
+    <dgm:fillClrLst meth="repeat">
+      <a:schemeClr val="accent1"/>
+    </dgm:fillClrLst>
+    <dgm:linClrLst meth="repeat">
+      <a:schemeClr val="lt1"/>
+    </dgm:linClrLst>
+    <dgm:effectClrLst/>
+    <dgm:txLinClrLst/>
+    <dgm:txFillClrLst/>
+    <dgm:txEffectClrLst/>
+  </dgm:styleLbl>
+  <dgm:styleLbl name="lnNode1">
+    <dgm:fillClrLst meth="repeat">
+      <a:schemeClr val="accent1"/>
+    </dgm:fillClrLst>
+    <dgm:linClrLst meth="repeat">
+      <a:schemeClr val="lt1"/>
+    </dgm:linClrLst>
+    <dgm:effectClrLst/>
+    <dgm:txLinClrLst/>
+    <dgm:txFillClrLst/>
+    <dgm:txEffectClrLst/>
+  </dgm:styleLbl>
+  <dgm:styleLbl name="vennNode1">
+    <dgm:fillClrLst meth="repeat">
+      <a:schemeClr val="accent1">
+        <a:alpha val="50000"/>
+      </a:schemeClr>
+    </dgm:fillClrLst>
+    <dgm:linClrLst meth="repeat">
+      <a:schemeClr val="lt1"/>
+    </dgm:linClrLst>
+    <dgm:effectClrLst/>
+    <dgm:txLinClrLst/>
+    <dgm:txFillClrLst/>
+    <dgm:txEffectClrLst/>
+  </dgm:styleLbl>
+  <dgm:styleLbl name="node2">
+    <dgm:fillClrLst meth="repeat">
+      <a:schemeClr val="accent1"/>
+    </dgm:fillClrLst>
+    <dgm:linClrLst meth="repeat">
+      <a:schemeClr val="lt1"/>
+    </dgm:linClrLst>
+    <dgm:effectClrLst/>
+    <dgm:txLinClrLst/>
+    <dgm:txFillClrLst/>
+    <dgm:txEffectClrLst/>
+  </dgm:styleLbl>
+  <dgm:styleLbl name="node3">
+    <dgm:fillClrLst meth="repeat">
+      <a:schemeClr val="accent1"/>
+    </dgm:fillClrLst>
+    <dgm:linClrLst meth="repeat">
+      <a:schemeClr val="lt1"/>
+    </dgm:linClrLst>
+    <dgm:effectClrLst/>
+    <dgm:txLinClrLst/>
+    <dgm:txFillClrLst/>
+    <dgm:txEffectClrLst/>
+  </dgm:styleLbl>
+  <dgm:styleLbl name="node4">
+    <dgm:fillClrLst meth="repeat">
+      <a:schemeClr val="accent1"/>
+    </dgm:fillClrLst>
+    <dgm:linClrLst meth="repeat">
+      <a:schemeClr val="lt1"/>
+    </dgm:linClrLst>
+    <dgm:effectClrLst/>
+    <dgm:txLinClrLst/>
+    <dgm:txFillClrLst/>
+    <dgm:txEffectClrLst/>
+  </dgm:styleLbl>
+  <dgm:styleLbl name="fgImgPlace1">
+    <dgm:fillClrLst meth="repeat">
+      <a:schemeClr val="accent1">
+        <a:tint val="50000"/>
+      </a:schemeClr>
+    </dgm:fillClrLst>
+    <dgm:linClrLst meth="repeat">
+      <a:schemeClr val="lt1"/>
+    </dgm:linClrLst>
+    <dgm:effectClrLst/>
+    <dgm:txLinClrLst/>
+    <dgm:txFillClrLst meth="repeat">
+      <a:schemeClr val="lt1"/>
+    </dgm:txFillClrLst>
+    <dgm:txEffectClrLst/>
+  </dgm:styleLbl>
+  <dgm:styleLbl name="alignImgPlace1">
+    <dgm:fillClrLst meth="repeat">
+      <a:schemeClr val="accent1">
+        <a:tint val="50000"/>
+      </a:schemeClr>
+    </dgm:fillClrLst>
+    <dgm:linClrLst meth="repeat">
+      <a:schemeClr val="lt1"/>
+    </dgm:linClrLst>
+    <dgm:effectClrLst/>
+    <dgm:txLinClrLst/>
+    <dgm:txFillClrLst meth="repeat">
+      <a:schemeClr val="lt1"/>
+    </dgm:txFillClrLst>
+    <dgm:txEffectClrLst/>
+  </dgm:styleLbl>
+  <dgm:styleLbl name="bgImgPlace1">
+    <dgm:fillClrLst meth="repeat">
+      <a:schemeClr val="accent1">
+        <a:tint val="50000"/>
+      </a:schemeClr>
+    </dgm:fillClrLst>
+    <dgm:linClrLst meth="repeat">
+      <a:schemeClr val="lt1"/>
+    </dgm:linClrLst>
+    <dgm:effectClrLst/>
+    <dgm:txLinClrLst/>
+    <dgm:txFillClrLst meth="repeat">
+      <a:schemeClr val="lt1"/>
+    </dgm:txFillClrLst>
+    <dgm:txEffectClrLst/>
+  </dgm:styleLbl>
+  <dgm:styleLbl name="sibTrans2D1">
+    <dgm:fillClrLst meth="repeat">
+      <a:schemeClr val="accent1">
+        <a:tint val="60000"/>
+      </a:schemeClr>
+    </dgm:fillClrLst>
+    <dgm:linClrLst meth="repeat">
+      <a:schemeClr val="accent1">
+        <a:tint val="60000"/>
+      </a:schemeClr>
+    </dgm:linClrLst>
+    <dgm:effectClrLst/>
+    <dgm:txLinClrLst/>
+    <dgm:txFillClrLst/>
+    <dgm:txEffectClrLst/>
+  </dgm:styleLbl>
+  <dgm:styleLbl name="fgSibTrans2D1">
+    <dgm:fillClrLst meth="repeat">
+      <a:schemeClr val="accent1">
+        <a:tint val="60000"/>
+      </a:schemeClr>
+    </dgm:fillClrLst>
+    <dgm:linClrLst meth="repeat">
+      <a:schemeClr val="accent1">
+        <a:tint val="60000"/>
+      </a:schemeClr>
+    </dgm:linClrLst>
+    <dgm:effectClrLst/>
+    <dgm:txLinClrLst/>
+    <dgm:txFillClrLst/>
+    <dgm:txEffectClrLst/>
+  </dgm:styleLbl>
+  <dgm:styleLbl name="bgSibTrans2D1">
+    <dgm:fillClrLst meth="repeat">
+      <a:schemeClr val="accent1">
+        <a:tint val="60000"/>
+      </a:schemeClr>
+    </dgm:fillClrLst>
+    <dgm:linClrLst meth="repeat">
+      <a:schemeClr val="accent1">
+        <a:tint val="60000"/>
+      </a:schemeClr>
+    </dgm:linClrLst>
+    <dgm:effectClrLst/>
+    <dgm:txLinClrLst/>
+    <dgm:txFillClrLst/>
+    <dgm:txEffectClrLst/>
+  </dgm:styleLbl>
+  <dgm:styleLbl name="sibTrans1D1">
+    <dgm:fillClrLst meth="repeat">
+      <a:schemeClr val="accent1"/>
+    </dgm:fillClrLst>
+    <dgm:linClrLst meth="repeat">
+      <a:schemeClr val="accent1"/>
+    </dgm:linClrLst>
+    <dgm:effectClrLst/>
+    <dgm:txLinClrLst/>
+    <dgm:txFillClrLst meth="repeat">
+      <a:schemeClr val="tx1"/>
+    </dgm:txFillClrLst>
+    <dgm:txEffectClrLst/>
+  </dgm:styleLbl>
+  <dgm:styleLbl name="callout">
+    <dgm:fillClrLst meth="repeat">
+      <a:schemeClr val="accent1"/>
+    </dgm:fillClrLst>
+    <dgm:linClrLst meth="repeat">
+      <a:schemeClr val="accent1">
+        <a:tint val="50000"/>
+      </a:schemeClr>
+    </dgm:linClrLst>
+    <dgm:effectClrLst/>
+    <dgm:txLinClrLst/>
+    <dgm:txFillClrLst meth="repeat">
+      <a:schemeClr val="tx1"/>
+    </dgm:txFillClrLst>
+    <dgm:txEffectClrLst/>
+  </dgm:styleLbl>
+  <dgm:styleLbl name="asst0">
+    <dgm:fillClrLst meth="repeat">
+      <a:schemeClr val="accent1"/>
+    </dgm:fillClrLst>
+    <dgm:linClrLst meth="repeat">
+      <a:schemeClr val="lt1"/>
+    </dgm:linClrLst>
+    <dgm:effectClrLst/>
+    <dgm:txLinClrLst/>
+    <dgm:txFillClrLst/>
+    <dgm:txEffectClrLst/>
+  </dgm:styleLbl>
+  <dgm:styleLbl name="asst1">
+    <dgm:fillClrLst meth="repeat">
+      <a:schemeClr val="accent1"/>
+    </dgm:fillClrLst>
+    <dgm:linClrLst meth="repeat">
+      <a:schemeClr val="lt1"/>
+    </dgm:linClrLst>
+    <dgm:effectClrLst/>
+    <dgm:txLinClrLst/>
+    <dgm:txFillClrLst/>
+    <dgm:txEffectClrLst/>
+  </dgm:styleLbl>
+  <dgm:styleLbl name="asst2">
+    <dgm:fillClrLst meth="repeat">
+      <a:schemeClr val="accent1"/>
+    </dgm:fillClrLst>
+    <dgm:linClrLst meth="repeat">
+      <a:schemeClr val="lt1"/>
+    </dgm:linClrLst>
+    <dgm:effectClrLst/>
+    <dgm:txLinClrLst/>
+    <dgm:txFillClrLst/>
+    <dgm:txEffectClrLst/>
+  </dgm:styleLbl>
+  <dgm:styleLbl name="asst3">
+    <dgm:fillClrLst meth="repeat">
+      <a:schemeClr val="accent1"/>
+    </dgm:fillClrLst>
+    <dgm:linClrLst meth="repeat">
+      <a:schemeClr val="lt1"/>
+    </dgm:linClrLst>
+    <dgm:effectClrLst/>
+    <dgm:txLinClrLst/>
+    <dgm:txFillClrLst/>
+    <dgm:txEffectClrLst/>
+  </dgm:styleLbl>
+  <dgm:styleLbl name="asst4">
+    <dgm:fillClrLst meth="repeat">
+      <a:schemeClr val="accent1"/>
+    </dgm:fillClrLst>
+    <dgm:linClrLst meth="repeat">
+      <a:schemeClr val="lt1"/>
+    </dgm:linClrLst>
+    <dgm:effectClrLst/>
+    <dgm:txLinClrLst/>
+    <dgm:txFillClrLst/>
+    <dgm:txEffectClrLst/>
+  </dgm:styleLbl>
+  <dgm:styleLbl name="parChTrans2D1">
+    <dgm:fillClrLst meth="repeat">
+      <a:schemeClr val="accent1">
+        <a:tint val="60000"/>
+      </a:schemeClr>
+    </dgm:fillClrLst>
+    <dgm:linClrLst meth="repeat">
+      <a:schemeClr val="accent1">
+        <a:tint val="60000"/>
+      </a:schemeClr>
+    </dgm:linClrLst>
+    <dgm:effectClrLst/>
+    <dgm:txLinClrLst/>
+    <dgm:txFillClrLst meth="repeat">
+      <a:schemeClr val="lt1"/>
+    </dgm:txFillClrLst>
+    <dgm:txEffectClrLst/>
+  </dgm:styleLbl>
+  <dgm:styleLbl name="parChTrans2D2">
+    <dgm:fillClrLst meth="repeat">
+      <a:schemeClr val="accent1"/>
+    </dgm:fillClrLst>
+    <dgm:linClrLst meth="repeat">
+      <a:schemeClr val="accent1"/>
+    </dgm:linClrLst>
+    <dgm:effectClrLst/>
+    <dgm:txLinClrLst/>
+    <dgm:txFillClrLst meth="repeat">
+      <a:schemeClr val="lt1"/>
+    </dgm:txFillClrLst>
+    <dgm:txEffectClrLst/>
+  </dgm:styleLbl>
+  <dgm:styleLbl name="parChTrans2D3">
+    <dgm:fillClrLst meth="repeat">
+      <a:schemeClr val="accent1"/>
+    </dgm:fillClrLst>
+    <dgm:linClrLst meth="repeat">
+      <a:schemeClr val="accent1"/>
+    </dgm:linClrLst>
+    <dgm:effectClrLst/>
+    <dgm:txLinClrLst/>
+    <dgm:txFillClrLst meth="repeat">
+      <a:schemeClr val="lt1"/>
+    </dgm:txFillClrLst>
+    <dgm:txEffectClrLst/>
+  </dgm:styleLbl>
+  <dgm:styleLbl name="parChTrans2D4">
+    <dgm:fillClrLst meth="repeat">
+      <a:schemeClr val="accent1"/>
+    </dgm:fillClrLst>
+    <dgm:linClrLst meth="repeat">
+      <a:schemeClr val="accent1"/>
+    </dgm:linClrLst>
+    <dgm:effectClrLst/>
+    <dgm:txLinClrLst/>
+    <dgm:txFillClrLst meth="repeat">
+      <a:schemeClr val="lt1"/>
+    </dgm:txFillClrLst>
+    <dgm:txEffectClrLst/>
+  </dgm:styleLbl>
+  <dgm:styleLbl name="parChTrans1D1">
+    <dgm:fillClrLst meth="repeat">
+      <a:schemeClr val="accent1"/>
+    </dgm:fillClrLst>
+    <dgm:linClrLst meth="repeat">
+      <a:schemeClr val="accent1">
+        <a:shade val="60000"/>
+      </a:schemeClr>
+    </dgm:linClrLst>
+    <dgm:effectClrLst/>
+    <dgm:txLinClrLst/>
+    <dgm:txFillClrLst meth="repeat">
+      <a:schemeClr val="tx1"/>
+    </dgm:txFillClrLst>
+    <dgm:txEffectClrLst/>
+  </dgm:styleLbl>
+  <dgm:styleLbl name="parChTrans1D2">
+    <dgm:fillClrLst meth="repeat">
+      <a:schemeClr val="accent1"/>
+    </dgm:fillClrLst>
+    <dgm:linClrLst meth="repeat">
+      <a:schemeClr val="accent1">
+        <a:shade val="60000"/>
+      </a:schemeClr>
+    </dgm:linClrLst>
+    <dgm:effectClrLst/>
+    <dgm:txLinClrLst/>
+    <dgm:txFillClrLst meth="repeat">
+      <a:schemeClr val="tx1"/>
+    </dgm:txFillClrLst>
+    <dgm:txEffectClrLst/>
+  </dgm:styleLbl>
+  <dgm:styleLbl name="parChTrans1D3">
+    <dgm:fillClrLst meth="repeat">
+      <a:schemeClr val="accent1"/>
+    </dgm:fillClrLst>
+    <dgm:linClrLst meth="repeat">
+      <a:schemeClr val="accent1">
+        <a:shade val="80000"/>
+      </a:schemeClr>
+    </dgm:linClrLst>
+    <dgm:effectClrLst/>
+    <dgm:txLinClrLst/>
+    <dgm:txFillClrLst meth="repeat">
+      <a:schemeClr val="tx1"/>
+    </dgm:txFillClrLst>
+    <dgm:txEffectClrLst/>
+  </dgm:styleLbl>
+  <dgm:styleLbl name="parChTrans1D4">
+    <dgm:fillClrLst meth="repeat">
+      <a:schemeClr val="accent1"/>
+    </dgm:fillClrLst>
+    <dgm:linClrLst meth="repeat">
+      <a:schemeClr val="accent1">
+        <a:shade val="80000"/>
+      </a:schemeClr>
+    </dgm:linClrLst>
+    <dgm:effectClrLst/>
+    <dgm:txLinClrLst/>
+    <dgm:txFillClrLst meth="repeat">
+      <a:schemeClr val="tx1"/>
+    </dgm:txFillClrLst>
+    <dgm:txEffectClrLst/>
+  </dgm:styleLbl>
+  <dgm:styleLbl name="fgAcc1">
+    <dgm:fillClrLst meth="repeat">
+      <a:schemeClr val="lt1">
+        <a:alpha val="90000"/>
+      </a:schemeClr>
+    </dgm:fillClrLst>
+    <dgm:linClrLst meth="repeat">
+      <a:schemeClr val="accent1"/>
+    </dgm:linClrLst>
+    <dgm:effectClrLst/>
+    <dgm:txLinClrLst/>
+    <dgm:txFillClrLst meth="repeat">
+      <a:schemeClr val="dk1"/>
+    </dgm:txFillClrLst>
+    <dgm:txEffectClrLst/>
+  </dgm:styleLbl>
+  <dgm:styleLbl name="conFgAcc1">
+    <dgm:fillClrLst meth="repeat">
+      <a:schemeClr val="lt1">
+        <a:alpha val="90000"/>
+      </a:schemeClr>
+    </dgm:fillClrLst>
+    <dgm:linClrLst meth="repeat">
+      <a:schemeClr val="accent1"/>
+    </dgm:linClrLst>
+    <dgm:effectClrLst/>
+    <dgm:txLinClrLst/>
+    <dgm:txFillClrLst meth="repeat">
+      <a:schemeClr val="dk1"/>
+    </dgm:txFillClrLst>
+    <dgm:txEffectClrLst/>
+  </dgm:styleLbl>
+  <dgm:styleLbl name="alignAcc1">
+    <dgm:fillClrLst meth="repeat">
+      <a:schemeClr val="lt1">
+        <a:alpha val="90000"/>
+      </a:schemeClr>
+    </dgm:fillClrLst>
+    <dgm:linClrLst meth="repeat">
+      <a:schemeClr val="accent1"/>
+    </dgm:linClrLst>
+    <dgm:effectClrLst/>
+    <dgm:txLinClrLst/>
+    <dgm:txFillClrLst meth="repeat">
+      <a:schemeClr val="dk1"/>
+    </dgm:txFillClrLst>
+    <dgm:txEffectClrLst/>
+  </dgm:styleLbl>
+  <dgm:styleLbl name="trAlignAcc1">
+    <dgm:fillClrLst meth="repeat">
+      <a:schemeClr val="lt1">
+        <a:alpha val="40000"/>
+      </a:schemeClr>
+    </dgm:fillClrLst>
+    <dgm:linClrLst meth="repeat">
+      <a:schemeClr val="accent1"/>
+    </dgm:linClrLst>
+    <dgm:effectClrLst/>
+    <dgm:txLinClrLst/>
+    <dgm:txFillClrLst meth="repeat">
+      <a:schemeClr val="dk1"/>
+    </dgm:txFillClrLst>
+    <dgm:txEffectClrLst/>
+  </dgm:styleLbl>
+  <dgm:styleLbl name="bgAcc1">
+    <dgm:fillClrLst meth="repeat">
+      <a:schemeClr val="lt1">
+        <a:alpha val="90000"/>
+      </a:schemeClr>
+    </dgm:fillClrLst>
+    <dgm:linClrLst meth="repeat">
+      <a:schemeClr val="accent1"/>
+    </dgm:linClrLst>
+    <dgm:effectClrLst/>
+    <dgm:txLinClrLst/>
+    <dgm:txFillClrLst meth="repeat">
+      <a:schemeClr val="dk1"/>
+    </dgm:txFillClrLst>
+    <dgm:txEffectClrLst/>
+  </dgm:styleLbl>
+  <dgm:styleLbl name="solidFgAcc1">
+    <dgm:fillClrLst meth="repeat">
+      <a:schemeClr val="lt1"/>
+    </dgm:fillClrLst>
+    <dgm:linClrLst meth="repeat">
+      <a:schemeClr val="accent1"/>
+    </dgm:linClrLst>
+    <dgm:effectClrLst/>
+    <dgm:txLinClrLst/>
+    <dgm:txFillClrLst meth="repeat">
+      <a:schemeClr val="dk1"/>
+    </dgm:txFillClrLst>
+    <dgm:txEffectClrLst/>
+  </dgm:styleLbl>
+  <dgm:styleLbl name="solidAlignAcc1">
+    <dgm:fillClrLst meth="repeat">
+      <a:schemeClr val="lt1"/>
+    </dgm:fillClrLst>
+    <dgm:linClrLst meth="repeat">
+      <a:schemeClr val="accent1"/>
+    </dgm:linClrLst>
+    <dgm:effectClrLst/>
+    <dgm:txLinClrLst/>
+    <dgm:txFillClrLst meth="repeat">
+      <a:schemeClr val="dk1"/>
+    </dgm:txFillClrLst>
+    <dgm:txEffectClrLst/>
+  </dgm:styleLbl>
+  <dgm:styleLbl name="solidBgAcc1">
+    <dgm:fillClrLst meth="repeat">
+      <a:schemeClr val="lt1"/>
+    </dgm:fillClrLst>
+    <dgm:linClrLst meth="repeat">
+      <a:schemeClr val="accent1"/>
+    </dgm:linClrLst>
+    <dgm:effectClrLst/>
+    <dgm:txLinClrLst/>
+    <dgm:txFillClrLst meth="repeat">
+      <a:schemeClr val="dk1"/>
+    </dgm:txFillClrLst>
+    <dgm:txEffectClrLst/>
+  </dgm:styleLbl>
+  <dgm:styleLbl name="fgAccFollowNode1">
+    <dgm:fillClrLst meth="repeat">
+      <a:schemeClr val="accent1">
+        <a:alpha val="90000"/>
+        <a:tint val="40000"/>
+      </a:schemeClr>
+    </dgm:fillClrLst>
+    <dgm:linClrLst meth="repeat">
+      <a:schemeClr val="accent1">
+        <a:alpha val="90000"/>
+        <a:tint val="40000"/>
+      </a:schemeClr>
+    </dgm:linClrLst>
+    <dgm:effectClrLst/>
+    <dgm:txLinClrLst/>
+    <dgm:txFillClrLst meth="repeat">
+      <a:schemeClr val="dk1"/>
+    </dgm:txFillClrLst>
+    <dgm:txEffectClrLst/>
+  </dgm:styleLbl>
+  <dgm:styleLbl name="alignAccFollowNode1">
+    <dgm:fillClrLst meth="repeat">
+      <a:schemeClr val="accent1">
+        <a:alpha val="90000"/>
+        <a:tint val="40000"/>
+      </a:schemeClr>
+    </dgm:fillClrLst>
+    <dgm:linClrLst meth="repeat">
+      <a:schemeClr val="accent1">
+        <a:alpha val="90000"/>
+        <a:tint val="40000"/>
+      </a:schemeClr>
+    </dgm:linClrLst>
+    <dgm:effectClrLst/>
+    <dgm:txLinClrLst/>
+    <dgm:txFillClrLst meth="repeat">
+      <a:schemeClr val="dk1"/>
+    </dgm:txFillClrLst>
+    <dgm:txEffectClrLst/>
+  </dgm:styleLbl>
+  <dgm:styleLbl name="bgAccFollowNode1">
+    <dgm:fillClrLst meth="repeat">
+      <a:schemeClr val="accent1">
+        <a:alpha val="90000"/>
+        <a:tint val="40000"/>
+      </a:schemeClr>
+    </dgm:fillClrLst>
+    <dgm:linClrLst meth="repeat">
+      <a:schemeClr val="accent1">
+        <a:alpha val="90000"/>
+        <a:tint val="40000"/>
+      </a:schemeClr>
+    </dgm:linClrLst>
+    <dgm:effectClrLst/>
+    <dgm:txLinClrLst/>
+    <dgm:txFillClrLst meth="repeat">
+      <a:schemeClr val="dk1"/>
+    </dgm:txFillClrLst>
+    <dgm:txEffectClrLst/>
+  </dgm:styleLbl>
+  <dgm:styleLbl name="fgAcc0">
+    <dgm:fillClrLst meth="repeat">
+      <a:schemeClr val="lt1">
+        <a:alpha val="90000"/>
+      </a:schemeClr>
+    </dgm:fillClrLst>
+    <dgm:linClrLst meth="repeat">
+      <a:schemeClr val="accent1"/>
+    </dgm:linClrLst>
+    <dgm:effectClrLst/>
+    <dgm:txLinClrLst/>
+    <dgm:txFillClrLst meth="repeat">
+      <a:schemeClr val="dk1"/>
+    </dgm:txFillClrLst>
+    <dgm:txEffectClrLst/>
+  </dgm:styleLbl>
+  <dgm:styleLbl name="fgAcc2">
+    <dgm:fillClrLst meth="repeat">
+      <a:schemeClr val="lt1">
+        <a:alpha val="90000"/>
+      </a:schemeClr>
+    </dgm:fillClrLst>
+    <dgm:linClrLst meth="repeat">
+      <a:schemeClr val="accent1"/>
+    </dgm:linClrLst>
+    <dgm:effectClrLst/>
+    <dgm:txLinClrLst/>
+    <dgm:txFillClrLst meth="repeat">
+      <a:schemeClr val="dk1"/>
+    </dgm:txFillClrLst>
+    <dgm:txEffectClrLst/>
+  </dgm:styleLbl>
+  <dgm:styleLbl name="fgAcc3">
+    <dgm:fillClrLst meth="repeat">
+      <a:schemeClr val="lt1">
+        <a:alpha val="90000"/>
+      </a:schemeClr>
+    </dgm:fillClrLst>
+    <dgm:linClrLst meth="repeat">
+      <a:schemeClr val="accent1"/>
+    </dgm:linClrLst>
+    <dgm:effectClrLst/>
+    <dgm:txLinClrLst/>
+    <dgm:txFillClrLst meth="repeat">
+      <a:schemeClr val="dk1"/>
+    </dgm:txFillClrLst>
+    <dgm:txEffectClrLst/>
+  </dgm:styleLbl>
+  <dgm:styleLbl name="fgAcc4">
+    <dgm:fillClrLst meth="repeat">
+      <a:schemeClr val="lt1">
+        <a:alpha val="90000"/>
+      </a:schemeClr>
+    </dgm:fillClrLst>
+    <dgm:linClrLst meth="repeat">
+      <a:schemeClr val="accent1"/>
+    </dgm:linClrLst>
+    <dgm:effectClrLst/>
+    <dgm:txLinClrLst/>
+    <dgm:txFillClrLst meth="repeat">
+      <a:schemeClr val="dk1"/>
+    </dgm:txFillClrLst>
+    <dgm:txEffectClrLst/>
+  </dgm:styleLbl>
+  <dgm:styleLbl name="bgShp">
+    <dgm:fillClrLst meth="repeat">
+      <a:schemeClr val="accent1">
+        <a:tint val="40000"/>
+      </a:schemeClr>
+    </dgm:fillClrLst>
+    <dgm:linClrLst meth="repeat">
+      <a:schemeClr val="accent1"/>
+    </dgm:linClrLst>
+    <dgm:effectClrLst/>
+    <dgm:txLinClrLst/>
+    <dgm:txFillClrLst meth="repeat">
+      <a:schemeClr val="dk1"/>
+    </dgm:txFillClrLst>
+    <dgm:txEffectClrLst/>
+  </dgm:styleLbl>
+  <dgm:styleLbl name="dkBgShp">
+    <dgm:fillClrLst meth="repeat">
+      <a:schemeClr val="accent1">
+        <a:shade val="80000"/>
+      </a:schemeClr>
+    </dgm:fillClrLst>
+    <dgm:linClrLst meth="repeat">
+      <a:schemeClr val="accent1"/>
+    </dgm:linClrLst>
+    <dgm:effectClrLst/>
+    <dgm:txLinClrLst/>
+    <dgm:txFillClrLst meth="repeat">
+      <a:schemeClr val="lt1"/>
+    </dgm:txFillClrLst>
+    <dgm:txEffectClrLst/>
+  </dgm:styleLbl>
+  <dgm:styleLbl name="trBgShp">
+    <dgm:fillClrLst meth="repeat">
+      <a:schemeClr val="accent1">
+        <a:tint val="50000"/>
+        <a:alpha val="40000"/>
+      </a:schemeClr>
+    </dgm:fillClrLst>
+    <dgm:linClrLst meth="repeat">
+      <a:schemeClr val="accent1"/>
+    </dgm:linClrLst>
+    <dgm:effectClrLst/>
+    <dgm:txLinClrLst/>
+    <dgm:txFillClrLst meth="repeat">
+      <a:schemeClr val="lt1"/>
+    </dgm:txFillClrLst>
+    <dgm:txEffectClrLst/>
+  </dgm:styleLbl>
+  <dgm:styleLbl name="fgShp">
+    <dgm:fillClrLst meth="repeat">
+      <a:schemeClr val="accent1">
+        <a:tint val="60000"/>
+      </a:schemeClr>
+    </dgm:fillClrLst>
+    <dgm:linClrLst meth="repeat">
+      <a:schemeClr val="lt1"/>
+    </dgm:linClrLst>
+    <dgm:effectClrLst/>
+    <dgm:txLinClrLst/>
+    <dgm:txFillClrLst meth="repeat">
+      <a:schemeClr val="dk1"/>
+    </dgm:txFillClrLst>
+    <dgm:txEffectClrLst/>
+  </dgm:styleLbl>
+  <dgm:styleLbl name="revTx">
+    <dgm:fillClrLst meth="repeat">
+      <a:schemeClr val="lt1">
+        <a:alpha val="0"/>
+      </a:schemeClr>
+    </dgm:fillClrLst>
+    <dgm:linClrLst meth="repeat">
+      <a:schemeClr val="dk1">
+        <a:alpha val="0"/>
+      </a:schemeClr>
+    </dgm:linClrLst>
+    <dgm:effectClrLst/>
+    <dgm:txLinClrLst/>
+    <dgm:txFillClrLst meth="repeat">
+      <a:schemeClr val="tx1"/>
+    </dgm:txFillClrLst>
+    <dgm:txEffectClrLst/>
+  </dgm:styleLbl>
+</dgm:colorsDef>
+</file>
+
+<file path=ppt/diagrams/colors2.xml><?xml version="1.0" encoding="utf-8"?>
 <dgm:colorsDef xmlns:dgm="http://schemas.openxmlformats.org/drawingml/2006/diagram" xmlns:a="http://schemas.openxmlformats.org/drawingml/2006/main" uniqueId="urn:microsoft.com/office/officeart/2005/8/colors/accent1_2">
   <dgm:title val=""/>
   <dgm:desc val=""/>
@@ -1165,7 +1913,689 @@
 </dgm:dataModel>
 </file>
 
+<file path=ppt/diagrams/data2.xml><?xml version="1.0" encoding="utf-8"?>
+<dgm:dataModel xmlns:dgm="http://schemas.openxmlformats.org/drawingml/2006/diagram" xmlns:a="http://schemas.openxmlformats.org/drawingml/2006/main">
+  <dgm:ptLst>
+    <dgm:pt modelId="{64A5F292-70D5-4147-B758-4ABE9957B6FD}" type="doc">
+      <dgm:prSet loTypeId="urn:microsoft.com/office/officeart/2005/8/layout/hProcess11" loCatId="process" qsTypeId="urn:microsoft.com/office/officeart/2005/8/quickstyle/simple1" qsCatId="simple" csTypeId="urn:microsoft.com/office/officeart/2005/8/colors/accent1_2" csCatId="accent1" phldr="1"/>
+      <dgm:spPr/>
+    </dgm:pt>
+    <dgm:pt modelId="{0BD5331F-1879-479A-A5B8-E9779065EED2}">
+      <dgm:prSet phldrT="[Text]" custT="1"/>
+      <dgm:spPr/>
+      <dgm:t>
+        <a:bodyPr/>
+        <a:lstStyle/>
+        <a:p>
+          <a:pPr algn="l"/>
+          <a:r>
+            <a:rPr lang="en-US" sz="1600" dirty="0">
+              <a:solidFill>
+                <a:srgbClr val="000000"/>
+              </a:solidFill>
+              <a:latin typeface="Trebuchet MS" panose="020B0603020202020204" pitchFamily="34" charset="0"/>
+            </a:rPr>
+            <a:t>Original version created in </a:t>
+          </a:r>
+          <a:r>
+            <a:rPr lang="en-US" sz="1600" b="1" dirty="0">
+              <a:solidFill>
+                <a:srgbClr val="000000"/>
+              </a:solidFill>
+              <a:latin typeface="Trebuchet MS" panose="020B0603020202020204" pitchFamily="34" charset="0"/>
+            </a:rPr>
+            <a:t>2015</a:t>
+          </a:r>
+          <a:endParaRPr lang="en-US" sz="1600" b="1" dirty="0">
+            <a:latin typeface="Trebuchet MS" panose="020B0603020202020204" pitchFamily="34" charset="0"/>
+          </a:endParaRPr>
+        </a:p>
+      </dgm:t>
+    </dgm:pt>
+    <dgm:pt modelId="{B5C1231D-1630-4F85-B35C-77A4825C9A00}" type="parTrans" cxnId="{D67CD6D4-A468-45FE-AAAD-FBE69CBC8F38}">
+      <dgm:prSet/>
+      <dgm:spPr/>
+      <dgm:t>
+        <a:bodyPr/>
+        <a:lstStyle/>
+        <a:p>
+          <a:endParaRPr lang="en-US"/>
+        </a:p>
+      </dgm:t>
+    </dgm:pt>
+    <dgm:pt modelId="{F8E59EE5-39BC-41A3-A68D-240288A7772A}" type="sibTrans" cxnId="{D67CD6D4-A468-45FE-AAAD-FBE69CBC8F38}">
+      <dgm:prSet/>
+      <dgm:spPr/>
+      <dgm:t>
+        <a:bodyPr/>
+        <a:lstStyle/>
+        <a:p>
+          <a:endParaRPr lang="en-US"/>
+        </a:p>
+      </dgm:t>
+    </dgm:pt>
+    <dgm:pt modelId="{BC4136A3-3915-40FE-8D36-F121C7AE9960}">
+      <dgm:prSet phldrT="[Text]" custT="1"/>
+      <dgm:spPr/>
+      <dgm:t>
+        <a:bodyPr/>
+        <a:lstStyle/>
+        <a:p>
+          <a:r>
+            <a:rPr lang="en-US" sz="1600" dirty="0">
+              <a:latin typeface="Trebuchet MS" panose="020B0603020202020204" pitchFamily="34" charset="0"/>
+            </a:rPr>
+            <a:t>Transition from web scraping to API pull - </a:t>
+          </a:r>
+          <a:r>
+            <a:rPr lang="en-US" sz="1600" b="1" dirty="0">
+              <a:latin typeface="Trebuchet MS" panose="020B0603020202020204" pitchFamily="34" charset="0"/>
+            </a:rPr>
+            <a:t>2021</a:t>
+          </a:r>
+        </a:p>
+      </dgm:t>
+    </dgm:pt>
+    <dgm:pt modelId="{FCE8B248-925D-448C-AE6B-0708A2298DB4}" type="parTrans" cxnId="{995D7C3D-6A8A-445D-B38F-F870F8066B11}">
+      <dgm:prSet/>
+      <dgm:spPr/>
+      <dgm:t>
+        <a:bodyPr/>
+        <a:lstStyle/>
+        <a:p>
+          <a:endParaRPr lang="en-US"/>
+        </a:p>
+      </dgm:t>
+    </dgm:pt>
+    <dgm:pt modelId="{21B1216E-E356-49CD-8D57-D8D33C384550}" type="sibTrans" cxnId="{995D7C3D-6A8A-445D-B38F-F870F8066B11}">
+      <dgm:prSet/>
+      <dgm:spPr/>
+      <dgm:t>
+        <a:bodyPr/>
+        <a:lstStyle/>
+        <a:p>
+          <a:endParaRPr lang="en-US"/>
+        </a:p>
+      </dgm:t>
+    </dgm:pt>
+    <dgm:pt modelId="{13D7A595-F8F5-4BCC-BF7E-02301C828D5E}">
+      <dgm:prSet phldrT="[Text]" custT="1"/>
+      <dgm:spPr/>
+      <dgm:t>
+        <a:bodyPr/>
+        <a:lstStyle/>
+        <a:p>
+          <a:r>
+            <a:rPr lang="en-US" sz="1600" dirty="0">
+              <a:latin typeface="Trebuchet MS" panose="020B0603020202020204" pitchFamily="34" charset="0"/>
+            </a:rPr>
+            <a:t>“Planned” Retirement -</a:t>
+          </a:r>
+          <a:r>
+            <a:rPr lang="en-US" sz="1600" b="1" dirty="0">
+              <a:latin typeface="Trebuchet MS" panose="020B0603020202020204" pitchFamily="34" charset="0"/>
+            </a:rPr>
+            <a:t>2023</a:t>
+          </a:r>
+        </a:p>
+      </dgm:t>
+    </dgm:pt>
+    <dgm:pt modelId="{64D1CB0C-3B1E-4A2E-9D4B-FA6A7D082DCA}" type="parTrans" cxnId="{E51D171A-8D5D-4EE1-8853-47E3C1CAD6E5}">
+      <dgm:prSet/>
+      <dgm:spPr/>
+      <dgm:t>
+        <a:bodyPr/>
+        <a:lstStyle/>
+        <a:p>
+          <a:endParaRPr lang="en-US"/>
+        </a:p>
+      </dgm:t>
+    </dgm:pt>
+    <dgm:pt modelId="{11FA5B42-F43D-44CB-B77B-BF8EA1F566AB}" type="sibTrans" cxnId="{E51D171A-8D5D-4EE1-8853-47E3C1CAD6E5}">
+      <dgm:prSet/>
+      <dgm:spPr/>
+      <dgm:t>
+        <a:bodyPr/>
+        <a:lstStyle/>
+        <a:p>
+          <a:endParaRPr lang="en-US"/>
+        </a:p>
+      </dgm:t>
+    </dgm:pt>
+    <dgm:pt modelId="{87C2BDE4-7880-44B7-A59C-FEB2EB47A340}" type="pres">
+      <dgm:prSet presAssocID="{64A5F292-70D5-4147-B758-4ABE9957B6FD}" presName="Name0" presStyleCnt="0">
+        <dgm:presLayoutVars>
+          <dgm:dir/>
+          <dgm:resizeHandles val="exact"/>
+        </dgm:presLayoutVars>
+      </dgm:prSet>
+      <dgm:spPr/>
+    </dgm:pt>
+    <dgm:pt modelId="{3E50CD98-D3A9-4957-BEDF-A6D1D7AC3063}" type="pres">
+      <dgm:prSet presAssocID="{64A5F292-70D5-4147-B758-4ABE9957B6FD}" presName="arrow" presStyleLbl="bgShp" presStyleIdx="0" presStyleCnt="1"/>
+      <dgm:spPr/>
+    </dgm:pt>
+    <dgm:pt modelId="{02D26E23-9729-4712-8169-CC1D020E8538}" type="pres">
+      <dgm:prSet presAssocID="{64A5F292-70D5-4147-B758-4ABE9957B6FD}" presName="points" presStyleCnt="0"/>
+      <dgm:spPr/>
+    </dgm:pt>
+    <dgm:pt modelId="{C0757234-4347-45C1-9042-964F298E2E7B}" type="pres">
+      <dgm:prSet presAssocID="{0BD5331F-1879-479A-A5B8-E9779065EED2}" presName="compositeA" presStyleCnt="0"/>
+      <dgm:spPr/>
+    </dgm:pt>
+    <dgm:pt modelId="{9BA723B8-E2EF-4250-AF5E-30E01DFA5C2B}" type="pres">
+      <dgm:prSet presAssocID="{0BD5331F-1879-479A-A5B8-E9779065EED2}" presName="textA" presStyleLbl="revTx" presStyleIdx="0" presStyleCnt="3">
+        <dgm:presLayoutVars>
+          <dgm:bulletEnabled val="1"/>
+        </dgm:presLayoutVars>
+      </dgm:prSet>
+      <dgm:spPr/>
+    </dgm:pt>
+    <dgm:pt modelId="{F60AE307-2D68-47F5-B72E-6174DF7F5509}" type="pres">
+      <dgm:prSet presAssocID="{0BD5331F-1879-479A-A5B8-E9779065EED2}" presName="circleA" presStyleLbl="node1" presStyleIdx="0" presStyleCnt="3"/>
+      <dgm:spPr/>
+    </dgm:pt>
+    <dgm:pt modelId="{92FD4DE9-A64D-4DDC-85A6-B45AA5F4FD62}" type="pres">
+      <dgm:prSet presAssocID="{0BD5331F-1879-479A-A5B8-E9779065EED2}" presName="spaceA" presStyleCnt="0"/>
+      <dgm:spPr/>
+    </dgm:pt>
+    <dgm:pt modelId="{3C063373-BE6B-4260-B282-145A3A7AE6E8}" type="pres">
+      <dgm:prSet presAssocID="{F8E59EE5-39BC-41A3-A68D-240288A7772A}" presName="space" presStyleCnt="0"/>
+      <dgm:spPr/>
+    </dgm:pt>
+    <dgm:pt modelId="{A725D713-DDC6-4ED0-ABA7-06442E053166}" type="pres">
+      <dgm:prSet presAssocID="{BC4136A3-3915-40FE-8D36-F121C7AE9960}" presName="compositeB" presStyleCnt="0"/>
+      <dgm:spPr/>
+    </dgm:pt>
+    <dgm:pt modelId="{CBFF8D98-0F9E-43BC-BAAB-FE88DC9967D7}" type="pres">
+      <dgm:prSet presAssocID="{BC4136A3-3915-40FE-8D36-F121C7AE9960}" presName="textB" presStyleLbl="revTx" presStyleIdx="1" presStyleCnt="3">
+        <dgm:presLayoutVars>
+          <dgm:bulletEnabled val="1"/>
+        </dgm:presLayoutVars>
+      </dgm:prSet>
+      <dgm:spPr/>
+    </dgm:pt>
+    <dgm:pt modelId="{76306022-DAAF-4268-BE0B-ACA354089ABA}" type="pres">
+      <dgm:prSet presAssocID="{BC4136A3-3915-40FE-8D36-F121C7AE9960}" presName="circleB" presStyleLbl="node1" presStyleIdx="1" presStyleCnt="3"/>
+      <dgm:spPr/>
+    </dgm:pt>
+    <dgm:pt modelId="{9A56F859-0D97-4C84-A48F-CC0BFA415046}" type="pres">
+      <dgm:prSet presAssocID="{BC4136A3-3915-40FE-8D36-F121C7AE9960}" presName="spaceB" presStyleCnt="0"/>
+      <dgm:spPr/>
+    </dgm:pt>
+    <dgm:pt modelId="{F626255A-9BC1-4D36-804F-7968FF2AAB62}" type="pres">
+      <dgm:prSet presAssocID="{21B1216E-E356-49CD-8D57-D8D33C384550}" presName="space" presStyleCnt="0"/>
+      <dgm:spPr/>
+    </dgm:pt>
+    <dgm:pt modelId="{A6C868B8-3030-446A-B1EA-A9B6789E7501}" type="pres">
+      <dgm:prSet presAssocID="{13D7A595-F8F5-4BCC-BF7E-02301C828D5E}" presName="compositeA" presStyleCnt="0"/>
+      <dgm:spPr/>
+    </dgm:pt>
+    <dgm:pt modelId="{CC79A4F8-9686-42B2-A197-B45E7FB9E4F1}" type="pres">
+      <dgm:prSet presAssocID="{13D7A595-F8F5-4BCC-BF7E-02301C828D5E}" presName="textA" presStyleLbl="revTx" presStyleIdx="2" presStyleCnt="3">
+        <dgm:presLayoutVars>
+          <dgm:bulletEnabled val="1"/>
+        </dgm:presLayoutVars>
+      </dgm:prSet>
+      <dgm:spPr/>
+    </dgm:pt>
+    <dgm:pt modelId="{AB342BD0-562B-4E9E-809D-29555924ABAD}" type="pres">
+      <dgm:prSet presAssocID="{13D7A595-F8F5-4BCC-BF7E-02301C828D5E}" presName="circleA" presStyleLbl="node1" presStyleIdx="2" presStyleCnt="3"/>
+      <dgm:spPr/>
+    </dgm:pt>
+    <dgm:pt modelId="{EC9B0B10-B20E-460E-A0C9-8675FE30FBC7}" type="pres">
+      <dgm:prSet presAssocID="{13D7A595-F8F5-4BCC-BF7E-02301C828D5E}" presName="spaceA" presStyleCnt="0"/>
+      <dgm:spPr/>
+    </dgm:pt>
+  </dgm:ptLst>
+  <dgm:cxnLst>
+    <dgm:cxn modelId="{E51D171A-8D5D-4EE1-8853-47E3C1CAD6E5}" srcId="{64A5F292-70D5-4147-B758-4ABE9957B6FD}" destId="{13D7A595-F8F5-4BCC-BF7E-02301C828D5E}" srcOrd="2" destOrd="0" parTransId="{64D1CB0C-3B1E-4A2E-9D4B-FA6A7D082DCA}" sibTransId="{11FA5B42-F43D-44CB-B77B-BF8EA1F566AB}"/>
+    <dgm:cxn modelId="{995D7C3D-6A8A-445D-B38F-F870F8066B11}" srcId="{64A5F292-70D5-4147-B758-4ABE9957B6FD}" destId="{BC4136A3-3915-40FE-8D36-F121C7AE9960}" srcOrd="1" destOrd="0" parTransId="{FCE8B248-925D-448C-AE6B-0708A2298DB4}" sibTransId="{21B1216E-E356-49CD-8D57-D8D33C384550}"/>
+    <dgm:cxn modelId="{B4573157-1355-4F7B-9CBF-03FEA16B1461}" type="presOf" srcId="{0BD5331F-1879-479A-A5B8-E9779065EED2}" destId="{9BA723B8-E2EF-4250-AF5E-30E01DFA5C2B}" srcOrd="0" destOrd="0" presId="urn:microsoft.com/office/officeart/2005/8/layout/hProcess11"/>
+    <dgm:cxn modelId="{3BD271AA-0843-4791-B8BA-12D016E84E18}" type="presOf" srcId="{BC4136A3-3915-40FE-8D36-F121C7AE9960}" destId="{CBFF8D98-0F9E-43BC-BAAB-FE88DC9967D7}" srcOrd="0" destOrd="0" presId="urn:microsoft.com/office/officeart/2005/8/layout/hProcess11"/>
+    <dgm:cxn modelId="{434EE1C5-B599-496F-9F6E-F0491C7714BD}" type="presOf" srcId="{64A5F292-70D5-4147-B758-4ABE9957B6FD}" destId="{87C2BDE4-7880-44B7-A59C-FEB2EB47A340}" srcOrd="0" destOrd="0" presId="urn:microsoft.com/office/officeart/2005/8/layout/hProcess11"/>
+    <dgm:cxn modelId="{D67CD6D4-A468-45FE-AAAD-FBE69CBC8F38}" srcId="{64A5F292-70D5-4147-B758-4ABE9957B6FD}" destId="{0BD5331F-1879-479A-A5B8-E9779065EED2}" srcOrd="0" destOrd="0" parTransId="{B5C1231D-1630-4F85-B35C-77A4825C9A00}" sibTransId="{F8E59EE5-39BC-41A3-A68D-240288A7772A}"/>
+    <dgm:cxn modelId="{0DEFA5DA-3054-4018-8273-E8D31CF3B61C}" type="presOf" srcId="{13D7A595-F8F5-4BCC-BF7E-02301C828D5E}" destId="{CC79A4F8-9686-42B2-A197-B45E7FB9E4F1}" srcOrd="0" destOrd="0" presId="urn:microsoft.com/office/officeart/2005/8/layout/hProcess11"/>
+    <dgm:cxn modelId="{CFF3F9E6-2A82-4BAF-B48C-2BDFCAA41B8A}" type="presParOf" srcId="{87C2BDE4-7880-44B7-A59C-FEB2EB47A340}" destId="{3E50CD98-D3A9-4957-BEDF-A6D1D7AC3063}" srcOrd="0" destOrd="0" presId="urn:microsoft.com/office/officeart/2005/8/layout/hProcess11"/>
+    <dgm:cxn modelId="{83F8B323-FD4F-4AE6-9E7D-7B469743A3F4}" type="presParOf" srcId="{87C2BDE4-7880-44B7-A59C-FEB2EB47A340}" destId="{02D26E23-9729-4712-8169-CC1D020E8538}" srcOrd="1" destOrd="0" presId="urn:microsoft.com/office/officeart/2005/8/layout/hProcess11"/>
+    <dgm:cxn modelId="{6FDEDECA-6F7B-49A6-AEBE-8E2F183B7EDE}" type="presParOf" srcId="{02D26E23-9729-4712-8169-CC1D020E8538}" destId="{C0757234-4347-45C1-9042-964F298E2E7B}" srcOrd="0" destOrd="0" presId="urn:microsoft.com/office/officeart/2005/8/layout/hProcess11"/>
+    <dgm:cxn modelId="{EF67D6AD-A0C2-4D24-BCA5-CB59F07B99EF}" type="presParOf" srcId="{C0757234-4347-45C1-9042-964F298E2E7B}" destId="{9BA723B8-E2EF-4250-AF5E-30E01DFA5C2B}" srcOrd="0" destOrd="0" presId="urn:microsoft.com/office/officeart/2005/8/layout/hProcess11"/>
+    <dgm:cxn modelId="{C7ABDEE2-22A9-4F3C-868E-BDB665736C97}" type="presParOf" srcId="{C0757234-4347-45C1-9042-964F298E2E7B}" destId="{F60AE307-2D68-47F5-B72E-6174DF7F5509}" srcOrd="1" destOrd="0" presId="urn:microsoft.com/office/officeart/2005/8/layout/hProcess11"/>
+    <dgm:cxn modelId="{7E2D1BC9-29FA-48B1-A352-E47C25AF7AFC}" type="presParOf" srcId="{C0757234-4347-45C1-9042-964F298E2E7B}" destId="{92FD4DE9-A64D-4DDC-85A6-B45AA5F4FD62}" srcOrd="2" destOrd="0" presId="urn:microsoft.com/office/officeart/2005/8/layout/hProcess11"/>
+    <dgm:cxn modelId="{8BDE81DB-3C2F-4EDC-A9A8-AD51D917F9A3}" type="presParOf" srcId="{02D26E23-9729-4712-8169-CC1D020E8538}" destId="{3C063373-BE6B-4260-B282-145A3A7AE6E8}" srcOrd="1" destOrd="0" presId="urn:microsoft.com/office/officeart/2005/8/layout/hProcess11"/>
+    <dgm:cxn modelId="{27305104-1A03-43DD-955A-AEA52C2F77C4}" type="presParOf" srcId="{02D26E23-9729-4712-8169-CC1D020E8538}" destId="{A725D713-DDC6-4ED0-ABA7-06442E053166}" srcOrd="2" destOrd="0" presId="urn:microsoft.com/office/officeart/2005/8/layout/hProcess11"/>
+    <dgm:cxn modelId="{FFD6F6C5-E12A-4825-BAA0-C0FBD466EC7D}" type="presParOf" srcId="{A725D713-DDC6-4ED0-ABA7-06442E053166}" destId="{CBFF8D98-0F9E-43BC-BAAB-FE88DC9967D7}" srcOrd="0" destOrd="0" presId="urn:microsoft.com/office/officeart/2005/8/layout/hProcess11"/>
+    <dgm:cxn modelId="{5439C763-007B-4904-9780-741CDB7D87A0}" type="presParOf" srcId="{A725D713-DDC6-4ED0-ABA7-06442E053166}" destId="{76306022-DAAF-4268-BE0B-ACA354089ABA}" srcOrd="1" destOrd="0" presId="urn:microsoft.com/office/officeart/2005/8/layout/hProcess11"/>
+    <dgm:cxn modelId="{C938760E-22C8-4F67-8967-988B5EE316C7}" type="presParOf" srcId="{A725D713-DDC6-4ED0-ABA7-06442E053166}" destId="{9A56F859-0D97-4C84-A48F-CC0BFA415046}" srcOrd="2" destOrd="0" presId="urn:microsoft.com/office/officeart/2005/8/layout/hProcess11"/>
+    <dgm:cxn modelId="{71338C6D-DC18-45C6-99E3-3ACDFE114AC8}" type="presParOf" srcId="{02D26E23-9729-4712-8169-CC1D020E8538}" destId="{F626255A-9BC1-4D36-804F-7968FF2AAB62}" srcOrd="3" destOrd="0" presId="urn:microsoft.com/office/officeart/2005/8/layout/hProcess11"/>
+    <dgm:cxn modelId="{24BDA549-AAA2-484A-8875-F2E9C43126F2}" type="presParOf" srcId="{02D26E23-9729-4712-8169-CC1D020E8538}" destId="{A6C868B8-3030-446A-B1EA-A9B6789E7501}" srcOrd="4" destOrd="0" presId="urn:microsoft.com/office/officeart/2005/8/layout/hProcess11"/>
+    <dgm:cxn modelId="{14BD6841-864F-4567-A0AD-8B63D2EC5DD9}" type="presParOf" srcId="{A6C868B8-3030-446A-B1EA-A9B6789E7501}" destId="{CC79A4F8-9686-42B2-A197-B45E7FB9E4F1}" srcOrd="0" destOrd="0" presId="urn:microsoft.com/office/officeart/2005/8/layout/hProcess11"/>
+    <dgm:cxn modelId="{04BDE323-BECE-46E5-AE9C-C5CE8ACDBCB6}" type="presParOf" srcId="{A6C868B8-3030-446A-B1EA-A9B6789E7501}" destId="{AB342BD0-562B-4E9E-809D-29555924ABAD}" srcOrd="1" destOrd="0" presId="urn:microsoft.com/office/officeart/2005/8/layout/hProcess11"/>
+    <dgm:cxn modelId="{79591869-98C3-4A91-8081-274965151F75}" type="presParOf" srcId="{A6C868B8-3030-446A-B1EA-A9B6789E7501}" destId="{EC9B0B10-B20E-460E-A0C9-8675FE30FBC7}" srcOrd="2" destOrd="0" presId="urn:microsoft.com/office/officeart/2005/8/layout/hProcess11"/>
+  </dgm:cxnLst>
+  <dgm:bg/>
+  <dgm:whole/>
+  <dgm:extLst>
+    <a:ext uri="http://schemas.microsoft.com/office/drawing/2008/diagram">
+      <dsp:dataModelExt xmlns:dsp="http://schemas.microsoft.com/office/drawing/2008/diagram" relId="rId8" minVer="http://schemas.openxmlformats.org/drawingml/2006/diagram"/>
+    </a:ext>
+  </dgm:extLst>
+</dgm:dataModel>
+</file>
+
 <file path=ppt/diagrams/drawing1.xml><?xml version="1.0" encoding="utf-8"?>
+<dsp:drawing xmlns:dgm="http://schemas.openxmlformats.org/drawingml/2006/diagram" xmlns:dsp="http://schemas.microsoft.com/office/drawing/2008/diagram" xmlns:a="http://schemas.openxmlformats.org/drawingml/2006/main">
+  <dsp:spTree>
+    <dsp:nvGrpSpPr>
+      <dsp:cNvPr id="0" name=""/>
+      <dsp:cNvGrpSpPr/>
+    </dsp:nvGrpSpPr>
+    <dsp:grpSpPr/>
+    <dsp:sp modelId="{3E50CD98-D3A9-4957-BEDF-A6D1D7AC3063}">
+      <dsp:nvSpPr>
+        <dsp:cNvPr id="0" name=""/>
+        <dsp:cNvSpPr/>
+      </dsp:nvSpPr>
+      <dsp:spPr>
+        <a:xfrm>
+          <a:off x="0" y="1033676"/>
+          <a:ext cx="6096000" cy="1378235"/>
+        </a:xfrm>
+        <a:prstGeom prst="notchedRightArrow">
+          <a:avLst/>
+        </a:prstGeom>
+        <a:solidFill>
+          <a:schemeClr val="accent1">
+            <a:tint val="40000"/>
+            <a:hueOff val="0"/>
+            <a:satOff val="0"/>
+            <a:lumOff val="0"/>
+            <a:alphaOff val="0"/>
+          </a:schemeClr>
+        </a:solidFill>
+        <a:ln>
+          <a:noFill/>
+        </a:ln>
+        <a:effectLst/>
+      </dsp:spPr>
+      <dsp:style>
+        <a:lnRef idx="0">
+          <a:scrgbClr r="0" g="0" b="0"/>
+        </a:lnRef>
+        <a:fillRef idx="1">
+          <a:scrgbClr r="0" g="0" b="0"/>
+        </a:fillRef>
+        <a:effectRef idx="0">
+          <a:scrgbClr r="0" g="0" b="0"/>
+        </a:effectRef>
+        <a:fontRef idx="minor"/>
+      </dsp:style>
+    </dsp:sp>
+    <dsp:sp modelId="{9BA723B8-E2EF-4250-AF5E-30E01DFA5C2B}">
+      <dsp:nvSpPr>
+        <dsp:cNvPr id="0" name=""/>
+        <dsp:cNvSpPr/>
+      </dsp:nvSpPr>
+      <dsp:spPr>
+        <a:xfrm>
+          <a:off x="2678" y="0"/>
+          <a:ext cx="1768078" cy="1378235"/>
+        </a:xfrm>
+        <a:prstGeom prst="rect">
+          <a:avLst/>
+        </a:prstGeom>
+        <a:noFill/>
+        <a:ln>
+          <a:noFill/>
+        </a:ln>
+        <a:effectLst/>
+      </dsp:spPr>
+      <dsp:style>
+        <a:lnRef idx="0">
+          <a:scrgbClr r="0" g="0" b="0"/>
+        </a:lnRef>
+        <a:fillRef idx="0">
+          <a:scrgbClr r="0" g="0" b="0"/>
+        </a:fillRef>
+        <a:effectRef idx="0">
+          <a:scrgbClr r="0" g="0" b="0"/>
+        </a:effectRef>
+        <a:fontRef idx="minor"/>
+      </dsp:style>
+      <dsp:txBody>
+        <a:bodyPr spcFirstLastPara="0" vert="horz" wrap="square" lIns="113792" tIns="113792" rIns="113792" bIns="113792" numCol="1" spcCol="1270" anchor="b" anchorCtr="0">
+          <a:noAutofit/>
+        </a:bodyPr>
+        <a:lstStyle/>
+        <a:p>
+          <a:pPr marL="0" lvl="0" indent="0" algn="l" defTabSz="711200">
+            <a:lnSpc>
+              <a:spcPct val="90000"/>
+            </a:lnSpc>
+            <a:spcBef>
+              <a:spcPct val="0"/>
+            </a:spcBef>
+            <a:spcAft>
+              <a:spcPct val="35000"/>
+            </a:spcAft>
+            <a:buNone/>
+          </a:pPr>
+          <a:r>
+            <a:rPr lang="en-US" sz="1600" kern="1200" dirty="0">
+              <a:solidFill>
+                <a:srgbClr val="000000"/>
+              </a:solidFill>
+              <a:latin typeface="Trebuchet MS" panose="020B0603020202020204" pitchFamily="34" charset="0"/>
+            </a:rPr>
+            <a:t>Original version created in </a:t>
+          </a:r>
+          <a:r>
+            <a:rPr lang="en-US" sz="1600" b="1" kern="1200" dirty="0">
+              <a:solidFill>
+                <a:srgbClr val="000000"/>
+              </a:solidFill>
+              <a:latin typeface="Trebuchet MS" panose="020B0603020202020204" pitchFamily="34" charset="0"/>
+            </a:rPr>
+            <a:t>2015</a:t>
+          </a:r>
+          <a:endParaRPr lang="en-US" sz="1600" b="1" kern="1200" dirty="0">
+            <a:latin typeface="Trebuchet MS" panose="020B0603020202020204" pitchFamily="34" charset="0"/>
+          </a:endParaRPr>
+        </a:p>
+      </dsp:txBody>
+      <dsp:txXfrm>
+        <a:off x="2678" y="0"/>
+        <a:ext cx="1768078" cy="1378235"/>
+      </dsp:txXfrm>
+    </dsp:sp>
+    <dsp:sp modelId="{F60AE307-2D68-47F5-B72E-6174DF7F5509}">
+      <dsp:nvSpPr>
+        <dsp:cNvPr id="0" name=""/>
+        <dsp:cNvSpPr/>
+      </dsp:nvSpPr>
+      <dsp:spPr>
+        <a:xfrm>
+          <a:off x="714438" y="1550514"/>
+          <a:ext cx="344558" cy="344558"/>
+        </a:xfrm>
+        <a:prstGeom prst="ellipse">
+          <a:avLst/>
+        </a:prstGeom>
+        <a:solidFill>
+          <a:schemeClr val="accent1">
+            <a:hueOff val="0"/>
+            <a:satOff val="0"/>
+            <a:lumOff val="0"/>
+            <a:alphaOff val="0"/>
+          </a:schemeClr>
+        </a:solidFill>
+        <a:ln w="25400" cap="flat" cmpd="sng" algn="ctr">
+          <a:solidFill>
+            <a:schemeClr val="lt1">
+              <a:hueOff val="0"/>
+              <a:satOff val="0"/>
+              <a:lumOff val="0"/>
+              <a:alphaOff val="0"/>
+            </a:schemeClr>
+          </a:solidFill>
+          <a:prstDash val="solid"/>
+        </a:ln>
+        <a:effectLst/>
+      </dsp:spPr>
+      <dsp:style>
+        <a:lnRef idx="2">
+          <a:scrgbClr r="0" g="0" b="0"/>
+        </a:lnRef>
+        <a:fillRef idx="1">
+          <a:scrgbClr r="0" g="0" b="0"/>
+        </a:fillRef>
+        <a:effectRef idx="0">
+          <a:scrgbClr r="0" g="0" b="0"/>
+        </a:effectRef>
+        <a:fontRef idx="minor">
+          <a:schemeClr val="lt1"/>
+        </a:fontRef>
+      </dsp:style>
+    </dsp:sp>
+    <dsp:sp modelId="{CBFF8D98-0F9E-43BC-BAAB-FE88DC9967D7}">
+      <dsp:nvSpPr>
+        <dsp:cNvPr id="0" name=""/>
+        <dsp:cNvSpPr/>
+      </dsp:nvSpPr>
+      <dsp:spPr>
+        <a:xfrm>
+          <a:off x="1859160" y="2067352"/>
+          <a:ext cx="1768078" cy="1378235"/>
+        </a:xfrm>
+        <a:prstGeom prst="rect">
+          <a:avLst/>
+        </a:prstGeom>
+        <a:noFill/>
+        <a:ln>
+          <a:noFill/>
+        </a:ln>
+        <a:effectLst/>
+      </dsp:spPr>
+      <dsp:style>
+        <a:lnRef idx="0">
+          <a:scrgbClr r="0" g="0" b="0"/>
+        </a:lnRef>
+        <a:fillRef idx="0">
+          <a:scrgbClr r="0" g="0" b="0"/>
+        </a:fillRef>
+        <a:effectRef idx="0">
+          <a:scrgbClr r="0" g="0" b="0"/>
+        </a:effectRef>
+        <a:fontRef idx="minor"/>
+      </dsp:style>
+      <dsp:txBody>
+        <a:bodyPr spcFirstLastPara="0" vert="horz" wrap="square" lIns="113792" tIns="113792" rIns="113792" bIns="113792" numCol="1" spcCol="1270" anchor="t" anchorCtr="0">
+          <a:noAutofit/>
+        </a:bodyPr>
+        <a:lstStyle/>
+        <a:p>
+          <a:pPr marL="0" lvl="0" indent="0" algn="ctr" defTabSz="711200">
+            <a:lnSpc>
+              <a:spcPct val="90000"/>
+            </a:lnSpc>
+            <a:spcBef>
+              <a:spcPct val="0"/>
+            </a:spcBef>
+            <a:spcAft>
+              <a:spcPct val="35000"/>
+            </a:spcAft>
+            <a:buNone/>
+          </a:pPr>
+          <a:r>
+            <a:rPr lang="en-US" sz="1600" kern="1200" dirty="0">
+              <a:latin typeface="Trebuchet MS" panose="020B0603020202020204" pitchFamily="34" charset="0"/>
+            </a:rPr>
+            <a:t>Transition from web scraping to API pull - </a:t>
+          </a:r>
+          <a:r>
+            <a:rPr lang="en-US" sz="1600" b="1" kern="1200" dirty="0">
+              <a:latin typeface="Trebuchet MS" panose="020B0603020202020204" pitchFamily="34" charset="0"/>
+            </a:rPr>
+            <a:t>2021</a:t>
+          </a:r>
+        </a:p>
+      </dsp:txBody>
+      <dsp:txXfrm>
+        <a:off x="1859160" y="2067352"/>
+        <a:ext cx="1768078" cy="1378235"/>
+      </dsp:txXfrm>
+    </dsp:sp>
+    <dsp:sp modelId="{76306022-DAAF-4268-BE0B-ACA354089ABA}">
+      <dsp:nvSpPr>
+        <dsp:cNvPr id="0" name=""/>
+        <dsp:cNvSpPr/>
+      </dsp:nvSpPr>
+      <dsp:spPr>
+        <a:xfrm>
+          <a:off x="2570920" y="1550514"/>
+          <a:ext cx="344558" cy="344558"/>
+        </a:xfrm>
+        <a:prstGeom prst="ellipse">
+          <a:avLst/>
+        </a:prstGeom>
+        <a:solidFill>
+          <a:schemeClr val="accent1">
+            <a:hueOff val="0"/>
+            <a:satOff val="0"/>
+            <a:lumOff val="0"/>
+            <a:alphaOff val="0"/>
+          </a:schemeClr>
+        </a:solidFill>
+        <a:ln w="25400" cap="flat" cmpd="sng" algn="ctr">
+          <a:solidFill>
+            <a:schemeClr val="lt1">
+              <a:hueOff val="0"/>
+              <a:satOff val="0"/>
+              <a:lumOff val="0"/>
+              <a:alphaOff val="0"/>
+            </a:schemeClr>
+          </a:solidFill>
+          <a:prstDash val="solid"/>
+        </a:ln>
+        <a:effectLst/>
+      </dsp:spPr>
+      <dsp:style>
+        <a:lnRef idx="2">
+          <a:scrgbClr r="0" g="0" b="0"/>
+        </a:lnRef>
+        <a:fillRef idx="1">
+          <a:scrgbClr r="0" g="0" b="0"/>
+        </a:fillRef>
+        <a:effectRef idx="0">
+          <a:scrgbClr r="0" g="0" b="0"/>
+        </a:effectRef>
+        <a:fontRef idx="minor">
+          <a:schemeClr val="lt1"/>
+        </a:fontRef>
+      </dsp:style>
+    </dsp:sp>
+    <dsp:sp modelId="{CC79A4F8-9686-42B2-A197-B45E7FB9E4F1}">
+      <dsp:nvSpPr>
+        <dsp:cNvPr id="0" name=""/>
+        <dsp:cNvSpPr/>
+      </dsp:nvSpPr>
+      <dsp:spPr>
+        <a:xfrm>
+          <a:off x="3715642" y="0"/>
+          <a:ext cx="1768078" cy="1378235"/>
+        </a:xfrm>
+        <a:prstGeom prst="rect">
+          <a:avLst/>
+        </a:prstGeom>
+        <a:noFill/>
+        <a:ln>
+          <a:noFill/>
+        </a:ln>
+        <a:effectLst/>
+      </dsp:spPr>
+      <dsp:style>
+        <a:lnRef idx="0">
+          <a:scrgbClr r="0" g="0" b="0"/>
+        </a:lnRef>
+        <a:fillRef idx="0">
+          <a:scrgbClr r="0" g="0" b="0"/>
+        </a:fillRef>
+        <a:effectRef idx="0">
+          <a:scrgbClr r="0" g="0" b="0"/>
+        </a:effectRef>
+        <a:fontRef idx="minor"/>
+      </dsp:style>
+      <dsp:txBody>
+        <a:bodyPr spcFirstLastPara="0" vert="horz" wrap="square" lIns="113792" tIns="113792" rIns="113792" bIns="113792" numCol="1" spcCol="1270" anchor="b" anchorCtr="0">
+          <a:noAutofit/>
+        </a:bodyPr>
+        <a:lstStyle/>
+        <a:p>
+          <a:pPr marL="0" lvl="0" indent="0" algn="ctr" defTabSz="711200">
+            <a:lnSpc>
+              <a:spcPct val="90000"/>
+            </a:lnSpc>
+            <a:spcBef>
+              <a:spcPct val="0"/>
+            </a:spcBef>
+            <a:spcAft>
+              <a:spcPct val="35000"/>
+            </a:spcAft>
+            <a:buNone/>
+          </a:pPr>
+          <a:r>
+            <a:rPr lang="en-US" sz="1600" kern="1200" dirty="0">
+              <a:latin typeface="Trebuchet MS" panose="020B0603020202020204" pitchFamily="34" charset="0"/>
+            </a:rPr>
+            <a:t>“Planned” Retirement -</a:t>
+          </a:r>
+          <a:r>
+            <a:rPr lang="en-US" sz="1600" b="1" kern="1200" dirty="0">
+              <a:latin typeface="Trebuchet MS" panose="020B0603020202020204" pitchFamily="34" charset="0"/>
+            </a:rPr>
+            <a:t>2023</a:t>
+          </a:r>
+        </a:p>
+      </dsp:txBody>
+      <dsp:txXfrm>
+        <a:off x="3715642" y="0"/>
+        <a:ext cx="1768078" cy="1378235"/>
+      </dsp:txXfrm>
+    </dsp:sp>
+    <dsp:sp modelId="{AB342BD0-562B-4E9E-809D-29555924ABAD}">
+      <dsp:nvSpPr>
+        <dsp:cNvPr id="0" name=""/>
+        <dsp:cNvSpPr/>
+      </dsp:nvSpPr>
+      <dsp:spPr>
+        <a:xfrm>
+          <a:off x="4427402" y="1550514"/>
+          <a:ext cx="344558" cy="344558"/>
+        </a:xfrm>
+        <a:prstGeom prst="ellipse">
+          <a:avLst/>
+        </a:prstGeom>
+        <a:solidFill>
+          <a:schemeClr val="accent1">
+            <a:hueOff val="0"/>
+            <a:satOff val="0"/>
+            <a:lumOff val="0"/>
+            <a:alphaOff val="0"/>
+          </a:schemeClr>
+        </a:solidFill>
+        <a:ln w="25400" cap="flat" cmpd="sng" algn="ctr">
+          <a:solidFill>
+            <a:schemeClr val="lt1">
+              <a:hueOff val="0"/>
+              <a:satOff val="0"/>
+              <a:lumOff val="0"/>
+              <a:alphaOff val="0"/>
+            </a:schemeClr>
+          </a:solidFill>
+          <a:prstDash val="solid"/>
+        </a:ln>
+        <a:effectLst/>
+      </dsp:spPr>
+      <dsp:style>
+        <a:lnRef idx="2">
+          <a:scrgbClr r="0" g="0" b="0"/>
+        </a:lnRef>
+        <a:fillRef idx="1">
+          <a:scrgbClr r="0" g="0" b="0"/>
+        </a:fillRef>
+        <a:effectRef idx="0">
+          <a:scrgbClr r="0" g="0" b="0"/>
+        </a:effectRef>
+        <a:fontRef idx="minor">
+          <a:schemeClr val="lt1"/>
+        </a:fontRef>
+      </dsp:style>
+    </dsp:sp>
+  </dsp:spTree>
+</dsp:drawing>
+</file>
+
+<file path=ppt/diagrams/drawing2.xml><?xml version="1.0" encoding="utf-8"?>
 <dsp:drawing xmlns:dgm="http://schemas.openxmlformats.org/drawingml/2006/diagram" xmlns:dsp="http://schemas.microsoft.com/office/drawing/2008/diagram" xmlns:a="http://schemas.openxmlformats.org/drawingml/2006/main">
   <dsp:spTree>
     <dsp:nvGrpSpPr>
@@ -1849,7 +3279,1313 @@
 </dgm:layoutDef>
 </file>
 
+<file path=ppt/diagrams/layout2.xml><?xml version="1.0" encoding="utf-8"?>
+<dgm:layoutDef xmlns:dgm="http://schemas.openxmlformats.org/drawingml/2006/diagram" xmlns:a="http://schemas.openxmlformats.org/drawingml/2006/main" uniqueId="urn:microsoft.com/office/officeart/2005/8/layout/hProcess11">
+  <dgm:title val=""/>
+  <dgm:desc val=""/>
+  <dgm:catLst>
+    <dgm:cat type="process" pri="8000"/>
+    <dgm:cat type="convert" pri="14000"/>
+  </dgm:catLst>
+  <dgm:sampData useDef="1">
+    <dgm:dataModel>
+      <dgm:ptLst/>
+      <dgm:bg/>
+      <dgm:whole/>
+    </dgm:dataModel>
+  </dgm:sampData>
+  <dgm:styleData>
+    <dgm:dataModel>
+      <dgm:ptLst>
+        <dgm:pt modelId="0" type="doc"/>
+        <dgm:pt modelId="1"/>
+        <dgm:pt modelId="2"/>
+      </dgm:ptLst>
+      <dgm:cxnLst>
+        <dgm:cxn modelId="4" srcId="0" destId="1" srcOrd="0" destOrd="0"/>
+        <dgm:cxn modelId="5" srcId="0" destId="2" srcOrd="1" destOrd="0"/>
+      </dgm:cxnLst>
+      <dgm:bg/>
+      <dgm:whole/>
+    </dgm:dataModel>
+  </dgm:styleData>
+  <dgm:clrData>
+    <dgm:dataModel>
+      <dgm:ptLst>
+        <dgm:pt modelId="0" type="doc"/>
+        <dgm:pt modelId="1"/>
+        <dgm:pt modelId="2"/>
+        <dgm:pt modelId="3"/>
+        <dgm:pt modelId="4"/>
+      </dgm:ptLst>
+      <dgm:cxnLst>
+        <dgm:cxn modelId="5" srcId="0" destId="1" srcOrd="0" destOrd="0"/>
+        <dgm:cxn modelId="6" srcId="0" destId="2" srcOrd="1" destOrd="0"/>
+        <dgm:cxn modelId="7" srcId="0" destId="3" srcOrd="2" destOrd="0"/>
+        <dgm:cxn modelId="8" srcId="0" destId="4" srcOrd="3" destOrd="0"/>
+      </dgm:cxnLst>
+      <dgm:bg/>
+      <dgm:whole/>
+    </dgm:dataModel>
+  </dgm:clrData>
+  <dgm:layoutNode name="Name0">
+    <dgm:varLst>
+      <dgm:dir/>
+      <dgm:resizeHandles val="exact"/>
+    </dgm:varLst>
+    <dgm:alg type="composite"/>
+    <dgm:shape xmlns:r="http://schemas.openxmlformats.org/officeDocument/2006/relationships" r:blip="">
+      <dgm:adjLst/>
+    </dgm:shape>
+    <dgm:presOf/>
+    <dgm:choose name="Name1">
+      <dgm:if name="Name2" func="var" arg="dir" op="equ" val="norm">
+        <dgm:constrLst>
+          <dgm:constr type="w" for="ch" forName="arrow" refType="w"/>
+          <dgm:constr type="h" for="ch" forName="arrow" refType="h" fact="0.4"/>
+          <dgm:constr type="ctrY" for="ch" forName="arrow" refType="h" fact="0.5"/>
+          <dgm:constr type="l" for="ch" forName="arrow"/>
+          <dgm:constr type="w" for="ch" forName="points" refType="w" fact="0.9"/>
+          <dgm:constr type="h" for="ch" forName="points" refType="h"/>
+          <dgm:constr type="t" for="ch" forName="points"/>
+          <dgm:constr type="l" for="ch" forName="points"/>
+        </dgm:constrLst>
+      </dgm:if>
+      <dgm:else name="Name3">
+        <dgm:constrLst>
+          <dgm:constr type="w" for="ch" forName="arrow" refType="w"/>
+          <dgm:constr type="h" for="ch" forName="arrow" refType="h" fact="0.4"/>
+          <dgm:constr type="ctrY" for="ch" forName="arrow" refType="h" fact="0.5"/>
+          <dgm:constr type="r" for="ch" forName="arrow" refType="w"/>
+          <dgm:constr type="w" for="ch" forName="points" refType="w" fact="0.9"/>
+          <dgm:constr type="h" for="ch" forName="points" refType="h"/>
+          <dgm:constr type="t" for="ch" forName="points"/>
+          <dgm:constr type="r" for="ch" forName="points" refType="w"/>
+        </dgm:constrLst>
+      </dgm:else>
+    </dgm:choose>
+    <dgm:ruleLst/>
+    <dgm:layoutNode name="arrow" styleLbl="bgShp">
+      <dgm:alg type="sp"/>
+      <dgm:choose name="Name4">
+        <dgm:if name="Name5" func="var" arg="dir" op="equ" val="norm">
+          <dgm:shape xmlns:r="http://schemas.openxmlformats.org/officeDocument/2006/relationships" type="notchedRightArrow" r:blip="">
+            <dgm:adjLst/>
+          </dgm:shape>
+        </dgm:if>
+        <dgm:else name="Name6">
+          <dgm:shape xmlns:r="http://schemas.openxmlformats.org/officeDocument/2006/relationships" rot="180" type="notchedRightArrow" r:blip="">
+            <dgm:adjLst/>
+          </dgm:shape>
+        </dgm:else>
+      </dgm:choose>
+      <dgm:presOf/>
+      <dgm:constrLst/>
+      <dgm:ruleLst/>
+    </dgm:layoutNode>
+    <dgm:layoutNode name="points">
+      <dgm:choose name="Name7">
+        <dgm:if name="Name8" func="var" arg="dir" op="equ" val="norm">
+          <dgm:alg type="lin">
+            <dgm:param type="linDir" val="fromL"/>
+          </dgm:alg>
+        </dgm:if>
+        <dgm:else name="Name9">
+          <dgm:alg type="lin">
+            <dgm:param type="linDir" val="fromR"/>
+          </dgm:alg>
+        </dgm:else>
+      </dgm:choose>
+      <dgm:shape xmlns:r="http://schemas.openxmlformats.org/officeDocument/2006/relationships" r:blip="">
+        <dgm:adjLst/>
+      </dgm:shape>
+      <dgm:presOf/>
+      <dgm:constrLst>
+        <dgm:constr type="w" for="ch" forName="compositeA" refType="w"/>
+        <dgm:constr type="h" for="ch" forName="compositeA" refType="h"/>
+        <dgm:constr type="w" for="ch" forName="compositeB" refType="w" refFor="ch" refForName="compositeA" op="equ"/>
+        <dgm:constr type="h" for="ch" forName="compositeB" refType="h" refFor="ch" refForName="compositeA" op="equ"/>
+        <dgm:constr type="primFontSz" for="des" ptType="node" op="equ" val="65"/>
+        <dgm:constr type="w" for="ch" forName="space" refType="w" refFor="ch" refForName="compositeA" op="equ" fact="0.05"/>
+      </dgm:constrLst>
+      <dgm:ruleLst/>
+      <dgm:forEach name="Name10" axis="ch" ptType="node">
+        <dgm:choose name="Name11">
+          <dgm:if name="Name12" axis="self" ptType="node" func="posOdd" op="equ" val="1">
+            <dgm:layoutNode name="compositeA">
+              <dgm:alg type="composite"/>
+              <dgm:shape xmlns:r="http://schemas.openxmlformats.org/officeDocument/2006/relationships" r:blip="">
+                <dgm:adjLst/>
+              </dgm:shape>
+              <dgm:presOf/>
+              <dgm:constrLst>
+                <dgm:constr type="w" for="ch" forName="textA" refType="w"/>
+                <dgm:constr type="h" for="ch" forName="textA" refType="h" fact="0.4"/>
+                <dgm:constr type="t" for="ch" forName="textA"/>
+                <dgm:constr type="l" for="ch" forName="textA"/>
+                <dgm:constr type="h" for="ch" forName="circleA" refType="h" fact="0.1"/>
+                <dgm:constr type="h" for="ch" forName="circleA" refType="w" op="lte"/>
+                <dgm:constr type="w" for="ch" forName="circleA" refType="h" refFor="ch" refForName="circleA" op="equ"/>
+                <dgm:constr type="ctrY" for="ch" forName="circleA" refType="h" fact="0.5"/>
+                <dgm:constr type="ctrX" for="ch" forName="circleA" refType="w" refFor="ch" refForName="textA" fact="0.5"/>
+                <dgm:constr type="w" for="ch" forName="spaceA" refType="w"/>
+                <dgm:constr type="h" for="ch" forName="spaceA" refType="h" fact="0.4"/>
+                <dgm:constr type="b" for="ch" forName="spaceA" refType="h"/>
+                <dgm:constr type="l" for="ch" forName="spaceA"/>
+              </dgm:constrLst>
+              <dgm:ruleLst/>
+              <dgm:layoutNode name="textA" styleLbl="revTx">
+                <dgm:varLst>
+                  <dgm:bulletEnabled val="1"/>
+                </dgm:varLst>
+                <dgm:alg type="tx">
+                  <dgm:param type="txAnchorVert" val="b"/>
+                  <dgm:param type="txAnchorVertCh" val="b"/>
+                  <dgm:param type="txAnchorHorzCh" val="ctr"/>
+                </dgm:alg>
+                <dgm:shape xmlns:r="http://schemas.openxmlformats.org/officeDocument/2006/relationships" type="rect" r:blip="">
+                  <dgm:adjLst/>
+                </dgm:shape>
+                <dgm:presOf axis="desOrSelf" ptType="node"/>
+                <dgm:constrLst/>
+                <dgm:ruleLst>
+                  <dgm:rule type="primFontSz" val="5" fact="NaN" max="NaN"/>
+                </dgm:ruleLst>
+              </dgm:layoutNode>
+              <dgm:layoutNode name="circleA">
+                <dgm:alg type="sp"/>
+                <dgm:shape xmlns:r="http://schemas.openxmlformats.org/officeDocument/2006/relationships" type="ellipse" r:blip="">
+                  <dgm:adjLst/>
+                </dgm:shape>
+                <dgm:presOf/>
+                <dgm:constrLst/>
+                <dgm:ruleLst/>
+              </dgm:layoutNode>
+              <dgm:layoutNode name="spaceA">
+                <dgm:alg type="sp"/>
+                <dgm:shape xmlns:r="http://schemas.openxmlformats.org/officeDocument/2006/relationships" r:blip="">
+                  <dgm:adjLst/>
+                </dgm:shape>
+                <dgm:presOf/>
+                <dgm:constrLst/>
+                <dgm:ruleLst/>
+              </dgm:layoutNode>
+            </dgm:layoutNode>
+          </dgm:if>
+          <dgm:else name="Name13">
+            <dgm:layoutNode name="compositeB">
+              <dgm:alg type="composite"/>
+              <dgm:shape xmlns:r="http://schemas.openxmlformats.org/officeDocument/2006/relationships" r:blip="">
+                <dgm:adjLst/>
+              </dgm:shape>
+              <dgm:presOf/>
+              <dgm:constrLst>
+                <dgm:constr type="w" for="ch" forName="textB" refType="w"/>
+                <dgm:constr type="h" for="ch" forName="textB" refType="h" fact="0.4"/>
+                <dgm:constr type="b" for="ch" forName="textB" refType="h"/>
+                <dgm:constr type="l" for="ch" forName="textB"/>
+                <dgm:constr type="h" for="ch" forName="circleB" refType="h" fact="0.1"/>
+                <dgm:constr type="w" for="ch" forName="circleB" refType="h" refFor="ch" refForName="circleB" op="equ"/>
+                <dgm:constr type="h" for="ch" forName="circleB" refType="w" op="lte"/>
+                <dgm:constr type="ctrY" for="ch" forName="circleB" refType="h" fact="0.5"/>
+                <dgm:constr type="ctrX" for="ch" forName="circleB" refType="w" refFor="ch" refForName="textB" fact="0.5"/>
+                <dgm:constr type="w" for="ch" forName="spaceB" refType="w"/>
+                <dgm:constr type="h" for="ch" forName="spaceB" refType="h" fact="0.4"/>
+                <dgm:constr type="t" for="ch" forName="spaceB"/>
+                <dgm:constr type="l" for="ch" forName="spaceB"/>
+              </dgm:constrLst>
+              <dgm:ruleLst/>
+              <dgm:layoutNode name="textB" styleLbl="revTx">
+                <dgm:varLst>
+                  <dgm:bulletEnabled val="1"/>
+                </dgm:varLst>
+                <dgm:alg type="tx">
+                  <dgm:param type="txAnchorVert" val="t"/>
+                  <dgm:param type="txAnchorVertCh" val="t"/>
+                  <dgm:param type="txAnchorHorzCh" val="ctr"/>
+                </dgm:alg>
+                <dgm:shape xmlns:r="http://schemas.openxmlformats.org/officeDocument/2006/relationships" type="rect" r:blip="">
+                  <dgm:adjLst/>
+                </dgm:shape>
+                <dgm:presOf axis="desOrSelf" ptType="node"/>
+                <dgm:constrLst/>
+                <dgm:ruleLst>
+                  <dgm:rule type="primFontSz" val="5" fact="NaN" max="NaN"/>
+                </dgm:ruleLst>
+              </dgm:layoutNode>
+              <dgm:layoutNode name="circleB">
+                <dgm:alg type="sp"/>
+                <dgm:shape xmlns:r="http://schemas.openxmlformats.org/officeDocument/2006/relationships" type="ellipse" r:blip="">
+                  <dgm:adjLst/>
+                </dgm:shape>
+                <dgm:presOf/>
+                <dgm:constrLst/>
+                <dgm:ruleLst/>
+              </dgm:layoutNode>
+              <dgm:layoutNode name="spaceB">
+                <dgm:alg type="sp"/>
+                <dgm:shape xmlns:r="http://schemas.openxmlformats.org/officeDocument/2006/relationships" r:blip="">
+                  <dgm:adjLst/>
+                </dgm:shape>
+                <dgm:presOf/>
+                <dgm:constrLst/>
+                <dgm:ruleLst/>
+              </dgm:layoutNode>
+            </dgm:layoutNode>
+          </dgm:else>
+        </dgm:choose>
+        <dgm:forEach name="Name14" axis="followSib" ptType="sibTrans" cnt="1">
+          <dgm:layoutNode name="space">
+            <dgm:alg type="sp"/>
+            <dgm:shape xmlns:r="http://schemas.openxmlformats.org/officeDocument/2006/relationships" r:blip="">
+              <dgm:adjLst/>
+            </dgm:shape>
+            <dgm:presOf/>
+            <dgm:constrLst/>
+            <dgm:ruleLst/>
+          </dgm:layoutNode>
+        </dgm:forEach>
+      </dgm:forEach>
+    </dgm:layoutNode>
+  </dgm:layoutNode>
+</dgm:layoutDef>
+</file>
+
 <file path=ppt/diagrams/quickStyle1.xml><?xml version="1.0" encoding="utf-8"?>
+<dgm:styleDef xmlns:dgm="http://schemas.openxmlformats.org/drawingml/2006/diagram" xmlns:a="http://schemas.openxmlformats.org/drawingml/2006/main" uniqueId="urn:microsoft.com/office/officeart/2005/8/quickstyle/simple1">
+  <dgm:title val=""/>
+  <dgm:desc val=""/>
+  <dgm:catLst>
+    <dgm:cat type="simple" pri="10100"/>
+  </dgm:catLst>
+  <dgm:scene3d>
+    <a:camera prst="orthographicFront"/>
+    <a:lightRig rig="threePt" dir="t"/>
+  </dgm:scene3d>
+  <dgm:styleLbl name="node0">
+    <dgm:scene3d>
+      <a:camera prst="orthographicFront"/>
+      <a:lightRig rig="threePt" dir="t"/>
+    </dgm:scene3d>
+    <dgm:sp3d/>
+    <dgm:txPr/>
+    <dgm:style>
+      <a:lnRef idx="2">
+        <a:scrgbClr r="0" g="0" b="0"/>
+      </a:lnRef>
+      <a:fillRef idx="1">
+        <a:scrgbClr r="0" g="0" b="0"/>
+      </a:fillRef>
+      <a:effectRef idx="0">
+        <a:scrgbClr r="0" g="0" b="0"/>
+      </a:effectRef>
+      <a:fontRef idx="minor">
+        <a:schemeClr val="lt1"/>
+      </a:fontRef>
+    </dgm:style>
+  </dgm:styleLbl>
+  <dgm:styleLbl name="lnNode1">
+    <dgm:scene3d>
+      <a:camera prst="orthographicFront"/>
+      <a:lightRig rig="threePt" dir="t"/>
+    </dgm:scene3d>
+    <dgm:sp3d/>
+    <dgm:txPr/>
+    <dgm:style>
+      <a:lnRef idx="2">
+        <a:scrgbClr r="0" g="0" b="0"/>
+      </a:lnRef>
+      <a:fillRef idx="1">
+        <a:scrgbClr r="0" g="0" b="0"/>
+      </a:fillRef>
+      <a:effectRef idx="0">
+        <a:scrgbClr r="0" g="0" b="0"/>
+      </a:effectRef>
+      <a:fontRef idx="minor">
+        <a:schemeClr val="lt1"/>
+      </a:fontRef>
+    </dgm:style>
+  </dgm:styleLbl>
+  <dgm:styleLbl name="vennNode1">
+    <dgm:scene3d>
+      <a:camera prst="orthographicFront"/>
+      <a:lightRig rig="threePt" dir="t"/>
+    </dgm:scene3d>
+    <dgm:sp3d/>
+    <dgm:txPr/>
+    <dgm:style>
+      <a:lnRef idx="2">
+        <a:scrgbClr r="0" g="0" b="0"/>
+      </a:lnRef>
+      <a:fillRef idx="1">
+        <a:scrgbClr r="0" g="0" b="0"/>
+      </a:fillRef>
+      <a:effectRef idx="0">
+        <a:scrgbClr r="0" g="0" b="0"/>
+      </a:effectRef>
+      <a:fontRef idx="minor">
+        <a:schemeClr val="tx1"/>
+      </a:fontRef>
+    </dgm:style>
+  </dgm:styleLbl>
+  <dgm:styleLbl name="alignNode1">
+    <dgm:scene3d>
+      <a:camera prst="orthographicFront"/>
+      <a:lightRig rig="threePt" dir="t"/>
+    </dgm:scene3d>
+    <dgm:sp3d/>
+    <dgm:txPr/>
+    <dgm:style>
+      <a:lnRef idx="2">
+        <a:scrgbClr r="0" g="0" b="0"/>
+      </a:lnRef>
+      <a:fillRef idx="1">
+        <a:scrgbClr r="0" g="0" b="0"/>
+      </a:fillRef>
+      <a:effectRef idx="0">
+        <a:scrgbClr r="0" g="0" b="0"/>
+      </a:effectRef>
+      <a:fontRef idx="minor">
+        <a:schemeClr val="lt1"/>
+      </a:fontRef>
+    </dgm:style>
+  </dgm:styleLbl>
+  <dgm:styleLbl name="node1">
+    <dgm:scene3d>
+      <a:camera prst="orthographicFront"/>
+      <a:lightRig rig="threePt" dir="t"/>
+    </dgm:scene3d>
+    <dgm:sp3d/>
+    <dgm:txPr/>
+    <dgm:style>
+      <a:lnRef idx="2">
+        <a:scrgbClr r="0" g="0" b="0"/>
+      </a:lnRef>
+      <a:fillRef idx="1">
+        <a:scrgbClr r="0" g="0" b="0"/>
+      </a:fillRef>
+      <a:effectRef idx="0">
+        <a:scrgbClr r="0" g="0" b="0"/>
+      </a:effectRef>
+      <a:fontRef idx="minor">
+        <a:schemeClr val="lt1"/>
+      </a:fontRef>
+    </dgm:style>
+  </dgm:styleLbl>
+  <dgm:styleLbl name="node2">
+    <dgm:scene3d>
+      <a:camera prst="orthographicFront"/>
+      <a:lightRig rig="threePt" dir="t"/>
+    </dgm:scene3d>
+    <dgm:sp3d/>
+    <dgm:txPr/>
+    <dgm:style>
+      <a:lnRef idx="2">
+        <a:scrgbClr r="0" g="0" b="0"/>
+      </a:lnRef>
+      <a:fillRef idx="1">
+        <a:scrgbClr r="0" g="0" b="0"/>
+      </a:fillRef>
+      <a:effectRef idx="0">
+        <a:scrgbClr r="0" g="0" b="0"/>
+      </a:effectRef>
+      <a:fontRef idx="minor">
+        <a:schemeClr val="lt1"/>
+      </a:fontRef>
+    </dgm:style>
+  </dgm:styleLbl>
+  <dgm:styleLbl name="node3">
+    <dgm:scene3d>
+      <a:camera prst="orthographicFront"/>
+      <a:lightRig rig="threePt" dir="t"/>
+    </dgm:scene3d>
+    <dgm:sp3d/>
+    <dgm:txPr/>
+    <dgm:style>
+      <a:lnRef idx="2">
+        <a:scrgbClr r="0" g="0" b="0"/>
+      </a:lnRef>
+      <a:fillRef idx="1">
+        <a:scrgbClr r="0" g="0" b="0"/>
+      </a:fillRef>
+      <a:effectRef idx="0">
+        <a:scrgbClr r="0" g="0" b="0"/>
+      </a:effectRef>
+      <a:fontRef idx="minor">
+        <a:schemeClr val="lt1"/>
+      </a:fontRef>
+    </dgm:style>
+  </dgm:styleLbl>
+  <dgm:styleLbl name="node4">
+    <dgm:scene3d>
+      <a:camera prst="orthographicFront"/>
+      <a:lightRig rig="threePt" dir="t"/>
+    </dgm:scene3d>
+    <dgm:sp3d/>
+    <dgm:txPr/>
+    <dgm:style>
+      <a:lnRef idx="2">
+        <a:scrgbClr r="0" g="0" b="0"/>
+      </a:lnRef>
+      <a:fillRef idx="1">
+        <a:scrgbClr r="0" g="0" b="0"/>
+      </a:fillRef>
+      <a:effectRef idx="0">
+        <a:scrgbClr r="0" g="0" b="0"/>
+      </a:effectRef>
+      <a:fontRef idx="minor">
+        <a:schemeClr val="lt1"/>
+      </a:fontRef>
+    </dgm:style>
+  </dgm:styleLbl>
+  <dgm:styleLbl name="fgImgPlace1">
+    <dgm:scene3d>
+      <a:camera prst="orthographicFront"/>
+      <a:lightRig rig="threePt" dir="t"/>
+    </dgm:scene3d>
+    <dgm:sp3d/>
+    <dgm:txPr/>
+    <dgm:style>
+      <a:lnRef idx="2">
+        <a:scrgbClr r="0" g="0" b="0"/>
+      </a:lnRef>
+      <a:fillRef idx="1">
+        <a:scrgbClr r="0" g="0" b="0"/>
+      </a:fillRef>
+      <a:effectRef idx="0">
+        <a:scrgbClr r="0" g="0" b="0"/>
+      </a:effectRef>
+      <a:fontRef idx="minor"/>
+    </dgm:style>
+  </dgm:styleLbl>
+  <dgm:styleLbl name="alignImgPlace1">
+    <dgm:scene3d>
+      <a:camera prst="orthographicFront"/>
+      <a:lightRig rig="threePt" dir="t"/>
+    </dgm:scene3d>
+    <dgm:sp3d/>
+    <dgm:txPr/>
+    <dgm:style>
+      <a:lnRef idx="2">
+        <a:scrgbClr r="0" g="0" b="0"/>
+      </a:lnRef>
+      <a:fillRef idx="1">
+        <a:scrgbClr r="0" g="0" b="0"/>
+      </a:fillRef>
+      <a:effectRef idx="0">
+        <a:scrgbClr r="0" g="0" b="0"/>
+      </a:effectRef>
+      <a:fontRef idx="minor"/>
+    </dgm:style>
+  </dgm:styleLbl>
+  <dgm:styleLbl name="bgImgPlace1">
+    <dgm:scene3d>
+      <a:camera prst="orthographicFront"/>
+      <a:lightRig rig="threePt" dir="t"/>
+    </dgm:scene3d>
+    <dgm:sp3d/>
+    <dgm:txPr/>
+    <dgm:style>
+      <a:lnRef idx="2">
+        <a:scrgbClr r="0" g="0" b="0"/>
+      </a:lnRef>
+      <a:fillRef idx="1">
+        <a:scrgbClr r="0" g="0" b="0"/>
+      </a:fillRef>
+      <a:effectRef idx="0">
+        <a:scrgbClr r="0" g="0" b="0"/>
+      </a:effectRef>
+      <a:fontRef idx="minor"/>
+    </dgm:style>
+  </dgm:styleLbl>
+  <dgm:styleLbl name="sibTrans2D1">
+    <dgm:scene3d>
+      <a:camera prst="orthographicFront"/>
+      <a:lightRig rig="threePt" dir="t"/>
+    </dgm:scene3d>
+    <dgm:sp3d/>
+    <dgm:txPr/>
+    <dgm:style>
+      <a:lnRef idx="0">
+        <a:scrgbClr r="0" g="0" b="0"/>
+      </a:lnRef>
+      <a:fillRef idx="1">
+        <a:scrgbClr r="0" g="0" b="0"/>
+      </a:fillRef>
+      <a:effectRef idx="0">
+        <a:scrgbClr r="0" g="0" b="0"/>
+      </a:effectRef>
+      <a:fontRef idx="minor">
+        <a:schemeClr val="lt1"/>
+      </a:fontRef>
+    </dgm:style>
+  </dgm:styleLbl>
+  <dgm:styleLbl name="fgSibTrans2D1">
+    <dgm:scene3d>
+      <a:camera prst="orthographicFront"/>
+      <a:lightRig rig="threePt" dir="t"/>
+    </dgm:scene3d>
+    <dgm:sp3d/>
+    <dgm:txPr/>
+    <dgm:style>
+      <a:lnRef idx="0">
+        <a:scrgbClr r="0" g="0" b="0"/>
+      </a:lnRef>
+      <a:fillRef idx="1">
+        <a:scrgbClr r="0" g="0" b="0"/>
+      </a:fillRef>
+      <a:effectRef idx="0">
+        <a:scrgbClr r="0" g="0" b="0"/>
+      </a:effectRef>
+      <a:fontRef idx="minor">
+        <a:schemeClr val="lt1"/>
+      </a:fontRef>
+    </dgm:style>
+  </dgm:styleLbl>
+  <dgm:styleLbl name="bgSibTrans2D1">
+    <dgm:scene3d>
+      <a:camera prst="orthographicFront"/>
+      <a:lightRig rig="threePt" dir="t"/>
+    </dgm:scene3d>
+    <dgm:sp3d/>
+    <dgm:txPr/>
+    <dgm:style>
+      <a:lnRef idx="0">
+        <a:scrgbClr r="0" g="0" b="0"/>
+      </a:lnRef>
+      <a:fillRef idx="1">
+        <a:scrgbClr r="0" g="0" b="0"/>
+      </a:fillRef>
+      <a:effectRef idx="0">
+        <a:scrgbClr r="0" g="0" b="0"/>
+      </a:effectRef>
+      <a:fontRef idx="minor">
+        <a:schemeClr val="lt1"/>
+      </a:fontRef>
+    </dgm:style>
+  </dgm:styleLbl>
+  <dgm:styleLbl name="sibTrans1D1">
+    <dgm:scene3d>
+      <a:camera prst="orthographicFront"/>
+      <a:lightRig rig="threePt" dir="t"/>
+    </dgm:scene3d>
+    <dgm:sp3d/>
+    <dgm:txPr/>
+    <dgm:style>
+      <a:lnRef idx="1">
+        <a:scrgbClr r="0" g="0" b="0"/>
+      </a:lnRef>
+      <a:fillRef idx="0">
+        <a:scrgbClr r="0" g="0" b="0"/>
+      </a:fillRef>
+      <a:effectRef idx="0">
+        <a:scrgbClr r="0" g="0" b="0"/>
+      </a:effectRef>
+      <a:fontRef idx="minor"/>
+    </dgm:style>
+  </dgm:styleLbl>
+  <dgm:styleLbl name="callout">
+    <dgm:scene3d>
+      <a:camera prst="orthographicFront"/>
+      <a:lightRig rig="threePt" dir="t"/>
+    </dgm:scene3d>
+    <dgm:sp3d/>
+    <dgm:txPr/>
+    <dgm:style>
+      <a:lnRef idx="2">
+        <a:scrgbClr r="0" g="0" b="0"/>
+      </a:lnRef>
+      <a:fillRef idx="1">
+        <a:scrgbClr r="0" g="0" b="0"/>
+      </a:fillRef>
+      <a:effectRef idx="0">
+        <a:scrgbClr r="0" g="0" b="0"/>
+      </a:effectRef>
+      <a:fontRef idx="minor"/>
+    </dgm:style>
+  </dgm:styleLbl>
+  <dgm:styleLbl name="asst0">
+    <dgm:scene3d>
+      <a:camera prst="orthographicFront"/>
+      <a:lightRig rig="threePt" dir="t"/>
+    </dgm:scene3d>
+    <dgm:sp3d/>
+    <dgm:txPr/>
+    <dgm:style>
+      <a:lnRef idx="2">
+        <a:scrgbClr r="0" g="0" b="0"/>
+      </a:lnRef>
+      <a:fillRef idx="1">
+        <a:scrgbClr r="0" g="0" b="0"/>
+      </a:fillRef>
+      <a:effectRef idx="0">
+        <a:scrgbClr r="0" g="0" b="0"/>
+      </a:effectRef>
+      <a:fontRef idx="minor">
+        <a:schemeClr val="lt1"/>
+      </a:fontRef>
+    </dgm:style>
+  </dgm:styleLbl>
+  <dgm:styleLbl name="asst1">
+    <dgm:scene3d>
+      <a:camera prst="orthographicFront"/>
+      <a:lightRig rig="threePt" dir="t"/>
+    </dgm:scene3d>
+    <dgm:sp3d/>
+    <dgm:txPr/>
+    <dgm:style>
+      <a:lnRef idx="2">
+        <a:scrgbClr r="0" g="0" b="0"/>
+      </a:lnRef>
+      <a:fillRef idx="1">
+        <a:scrgbClr r="0" g="0" b="0"/>
+      </a:fillRef>
+      <a:effectRef idx="0">
+        <a:scrgbClr r="0" g="0" b="0"/>
+      </a:effectRef>
+      <a:fontRef idx="minor">
+        <a:schemeClr val="lt1"/>
+      </a:fontRef>
+    </dgm:style>
+  </dgm:styleLbl>
+  <dgm:styleLbl name="asst2">
+    <dgm:scene3d>
+      <a:camera prst="orthographicFront"/>
+      <a:lightRig rig="threePt" dir="t"/>
+    </dgm:scene3d>
+    <dgm:sp3d/>
+    <dgm:txPr/>
+    <dgm:style>
+      <a:lnRef idx="2">
+        <a:scrgbClr r="0" g="0" b="0"/>
+      </a:lnRef>
+      <a:fillRef idx="1">
+        <a:scrgbClr r="0" g="0" b="0"/>
+      </a:fillRef>
+      <a:effectRef idx="0">
+        <a:scrgbClr r="0" g="0" b="0"/>
+      </a:effectRef>
+      <a:fontRef idx="minor">
+        <a:schemeClr val="lt1"/>
+      </a:fontRef>
+    </dgm:style>
+  </dgm:styleLbl>
+  <dgm:styleLbl name="asst3">
+    <dgm:scene3d>
+      <a:camera prst="orthographicFront"/>
+      <a:lightRig rig="threePt" dir="t"/>
+    </dgm:scene3d>
+    <dgm:sp3d/>
+    <dgm:txPr/>
+    <dgm:style>
+      <a:lnRef idx="2">
+        <a:scrgbClr r="0" g="0" b="0"/>
+      </a:lnRef>
+      <a:fillRef idx="1">
+        <a:scrgbClr r="0" g="0" b="0"/>
+      </a:fillRef>
+      <a:effectRef idx="0">
+        <a:scrgbClr r="0" g="0" b="0"/>
+      </a:effectRef>
+      <a:fontRef idx="minor">
+        <a:schemeClr val="lt1"/>
+      </a:fontRef>
+    </dgm:style>
+  </dgm:styleLbl>
+  <dgm:styleLbl name="asst4">
+    <dgm:scene3d>
+      <a:camera prst="orthographicFront"/>
+      <a:lightRig rig="threePt" dir="t"/>
+    </dgm:scene3d>
+    <dgm:sp3d/>
+    <dgm:txPr/>
+    <dgm:style>
+      <a:lnRef idx="2">
+        <a:scrgbClr r="0" g="0" b="0"/>
+      </a:lnRef>
+      <a:fillRef idx="1">
+        <a:scrgbClr r="0" g="0" b="0"/>
+      </a:fillRef>
+      <a:effectRef idx="0">
+        <a:scrgbClr r="0" g="0" b="0"/>
+      </a:effectRef>
+      <a:fontRef idx="minor">
+        <a:schemeClr val="lt1"/>
+      </a:fontRef>
+    </dgm:style>
+  </dgm:styleLbl>
+  <dgm:styleLbl name="parChTrans2D1">
+    <dgm:scene3d>
+      <a:camera prst="orthographicFront"/>
+      <a:lightRig rig="threePt" dir="t"/>
+    </dgm:scene3d>
+    <dgm:sp3d/>
+    <dgm:txPr/>
+    <dgm:style>
+      <a:lnRef idx="2">
+        <a:scrgbClr r="0" g="0" b="0"/>
+      </a:lnRef>
+      <a:fillRef idx="1">
+        <a:scrgbClr r="0" g="0" b="0"/>
+      </a:fillRef>
+      <a:effectRef idx="0">
+        <a:scrgbClr r="0" g="0" b="0"/>
+      </a:effectRef>
+      <a:fontRef idx="minor">
+        <a:schemeClr val="lt1"/>
+      </a:fontRef>
+    </dgm:style>
+  </dgm:styleLbl>
+  <dgm:styleLbl name="parChTrans2D2">
+    <dgm:scene3d>
+      <a:camera prst="orthographicFront"/>
+      <a:lightRig rig="threePt" dir="t"/>
+    </dgm:scene3d>
+    <dgm:sp3d/>
+    <dgm:txPr/>
+    <dgm:style>
+      <a:lnRef idx="2">
+        <a:scrgbClr r="0" g="0" b="0"/>
+      </a:lnRef>
+      <a:fillRef idx="1">
+        <a:scrgbClr r="0" g="0" b="0"/>
+      </a:fillRef>
+      <a:effectRef idx="0">
+        <a:scrgbClr r="0" g="0" b="0"/>
+      </a:effectRef>
+      <a:fontRef idx="minor">
+        <a:schemeClr val="lt1"/>
+      </a:fontRef>
+    </dgm:style>
+  </dgm:styleLbl>
+  <dgm:styleLbl name="parChTrans2D3">
+    <dgm:scene3d>
+      <a:camera prst="orthographicFront"/>
+      <a:lightRig rig="threePt" dir="t"/>
+    </dgm:scene3d>
+    <dgm:sp3d/>
+    <dgm:txPr/>
+    <dgm:style>
+      <a:lnRef idx="2">
+        <a:scrgbClr r="0" g="0" b="0"/>
+      </a:lnRef>
+      <a:fillRef idx="1">
+        <a:scrgbClr r="0" g="0" b="0"/>
+      </a:fillRef>
+      <a:effectRef idx="0">
+        <a:scrgbClr r="0" g="0" b="0"/>
+      </a:effectRef>
+      <a:fontRef idx="minor">
+        <a:schemeClr val="lt1"/>
+      </a:fontRef>
+    </dgm:style>
+  </dgm:styleLbl>
+  <dgm:styleLbl name="parChTrans2D4">
+    <dgm:scene3d>
+      <a:camera prst="orthographicFront"/>
+      <a:lightRig rig="threePt" dir="t"/>
+    </dgm:scene3d>
+    <dgm:sp3d/>
+    <dgm:txPr/>
+    <dgm:style>
+      <a:lnRef idx="2">
+        <a:scrgbClr r="0" g="0" b="0"/>
+      </a:lnRef>
+      <a:fillRef idx="1">
+        <a:scrgbClr r="0" g="0" b="0"/>
+      </a:fillRef>
+      <a:effectRef idx="0">
+        <a:scrgbClr r="0" g="0" b="0"/>
+      </a:effectRef>
+      <a:fontRef idx="minor">
+        <a:schemeClr val="lt1"/>
+      </a:fontRef>
+    </dgm:style>
+  </dgm:styleLbl>
+  <dgm:styleLbl name="parChTrans1D1">
+    <dgm:scene3d>
+      <a:camera prst="orthographicFront"/>
+      <a:lightRig rig="threePt" dir="t"/>
+    </dgm:scene3d>
+    <dgm:sp3d/>
+    <dgm:txPr/>
+    <dgm:style>
+      <a:lnRef idx="2">
+        <a:scrgbClr r="0" g="0" b="0"/>
+      </a:lnRef>
+      <a:fillRef idx="0">
+        <a:scrgbClr r="0" g="0" b="0"/>
+      </a:fillRef>
+      <a:effectRef idx="0">
+        <a:scrgbClr r="0" g="0" b="0"/>
+      </a:effectRef>
+      <a:fontRef idx="minor"/>
+    </dgm:style>
+  </dgm:styleLbl>
+  <dgm:styleLbl name="parChTrans1D2">
+    <dgm:scene3d>
+      <a:camera prst="orthographicFront"/>
+      <a:lightRig rig="threePt" dir="t"/>
+    </dgm:scene3d>
+    <dgm:sp3d/>
+    <dgm:txPr/>
+    <dgm:style>
+      <a:lnRef idx="2">
+        <a:scrgbClr r="0" g="0" b="0"/>
+      </a:lnRef>
+      <a:fillRef idx="0">
+        <a:scrgbClr r="0" g="0" b="0"/>
+      </a:fillRef>
+      <a:effectRef idx="0">
+        <a:scrgbClr r="0" g="0" b="0"/>
+      </a:effectRef>
+      <a:fontRef idx="minor"/>
+    </dgm:style>
+  </dgm:styleLbl>
+  <dgm:styleLbl name="parChTrans1D3">
+    <dgm:scene3d>
+      <a:camera prst="orthographicFront"/>
+      <a:lightRig rig="threePt" dir="t"/>
+    </dgm:scene3d>
+    <dgm:sp3d/>
+    <dgm:txPr/>
+    <dgm:style>
+      <a:lnRef idx="2">
+        <a:scrgbClr r="0" g="0" b="0"/>
+      </a:lnRef>
+      <a:fillRef idx="0">
+        <a:scrgbClr r="0" g="0" b="0"/>
+      </a:fillRef>
+      <a:effectRef idx="0">
+        <a:scrgbClr r="0" g="0" b="0"/>
+      </a:effectRef>
+      <a:fontRef idx="minor"/>
+    </dgm:style>
+  </dgm:styleLbl>
+  <dgm:styleLbl name="parChTrans1D4">
+    <dgm:scene3d>
+      <a:camera prst="orthographicFront"/>
+      <a:lightRig rig="threePt" dir="t"/>
+    </dgm:scene3d>
+    <dgm:sp3d/>
+    <dgm:txPr/>
+    <dgm:style>
+      <a:lnRef idx="2">
+        <a:scrgbClr r="0" g="0" b="0"/>
+      </a:lnRef>
+      <a:fillRef idx="0">
+        <a:scrgbClr r="0" g="0" b="0"/>
+      </a:fillRef>
+      <a:effectRef idx="0">
+        <a:scrgbClr r="0" g="0" b="0"/>
+      </a:effectRef>
+      <a:fontRef idx="minor"/>
+    </dgm:style>
+  </dgm:styleLbl>
+  <dgm:styleLbl name="fgAcc1">
+    <dgm:scene3d>
+      <a:camera prst="orthographicFront"/>
+      <a:lightRig rig="threePt" dir="t"/>
+    </dgm:scene3d>
+    <dgm:sp3d/>
+    <dgm:txPr/>
+    <dgm:style>
+      <a:lnRef idx="2">
+        <a:scrgbClr r="0" g="0" b="0"/>
+      </a:lnRef>
+      <a:fillRef idx="1">
+        <a:scrgbClr r="0" g="0" b="0"/>
+      </a:fillRef>
+      <a:effectRef idx="0">
+        <a:scrgbClr r="0" g="0" b="0"/>
+      </a:effectRef>
+      <a:fontRef idx="minor"/>
+    </dgm:style>
+  </dgm:styleLbl>
+  <dgm:styleLbl name="conFgAcc1">
+    <dgm:scene3d>
+      <a:camera prst="orthographicFront"/>
+      <a:lightRig rig="threePt" dir="t"/>
+    </dgm:scene3d>
+    <dgm:sp3d/>
+    <dgm:txPr/>
+    <dgm:style>
+      <a:lnRef idx="2">
+        <a:scrgbClr r="0" g="0" b="0"/>
+      </a:lnRef>
+      <a:fillRef idx="1">
+        <a:scrgbClr r="0" g="0" b="0"/>
+      </a:fillRef>
+      <a:effectRef idx="0">
+        <a:scrgbClr r="0" g="0" b="0"/>
+      </a:effectRef>
+      <a:fontRef idx="minor"/>
+    </dgm:style>
+  </dgm:styleLbl>
+  <dgm:styleLbl name="alignAcc1">
+    <dgm:scene3d>
+      <a:camera prst="orthographicFront"/>
+      <a:lightRig rig="threePt" dir="t"/>
+    </dgm:scene3d>
+    <dgm:sp3d/>
+    <dgm:txPr/>
+    <dgm:style>
+      <a:lnRef idx="2">
+        <a:scrgbClr r="0" g="0" b="0"/>
+      </a:lnRef>
+      <a:fillRef idx="1">
+        <a:scrgbClr r="0" g="0" b="0"/>
+      </a:fillRef>
+      <a:effectRef idx="0">
+        <a:scrgbClr r="0" g="0" b="0"/>
+      </a:effectRef>
+      <a:fontRef idx="minor"/>
+    </dgm:style>
+  </dgm:styleLbl>
+  <dgm:styleLbl name="trAlignAcc1">
+    <dgm:scene3d>
+      <a:camera prst="orthographicFront"/>
+      <a:lightRig rig="threePt" dir="t"/>
+    </dgm:scene3d>
+    <dgm:sp3d/>
+    <dgm:txPr/>
+    <dgm:style>
+      <a:lnRef idx="1">
+        <a:scrgbClr r="0" g="0" b="0"/>
+      </a:lnRef>
+      <a:fillRef idx="1">
+        <a:scrgbClr r="0" g="0" b="0"/>
+      </a:fillRef>
+      <a:effectRef idx="0">
+        <a:scrgbClr r="0" g="0" b="0"/>
+      </a:effectRef>
+      <a:fontRef idx="minor"/>
+    </dgm:style>
+  </dgm:styleLbl>
+  <dgm:styleLbl name="bgAcc1">
+    <dgm:scene3d>
+      <a:camera prst="orthographicFront"/>
+      <a:lightRig rig="threePt" dir="t"/>
+    </dgm:scene3d>
+    <dgm:sp3d/>
+    <dgm:txPr/>
+    <dgm:style>
+      <a:lnRef idx="2">
+        <a:scrgbClr r="0" g="0" b="0"/>
+      </a:lnRef>
+      <a:fillRef idx="1">
+        <a:scrgbClr r="0" g="0" b="0"/>
+      </a:fillRef>
+      <a:effectRef idx="0">
+        <a:scrgbClr r="0" g="0" b="0"/>
+      </a:effectRef>
+      <a:fontRef idx="minor"/>
+    </dgm:style>
+  </dgm:styleLbl>
+  <dgm:styleLbl name="solidFgAcc1">
+    <dgm:scene3d>
+      <a:camera prst="orthographicFront"/>
+      <a:lightRig rig="threePt" dir="t"/>
+    </dgm:scene3d>
+    <dgm:sp3d/>
+    <dgm:txPr/>
+    <dgm:style>
+      <a:lnRef idx="2">
+        <a:scrgbClr r="0" g="0" b="0"/>
+      </a:lnRef>
+      <a:fillRef idx="1">
+        <a:scrgbClr r="0" g="0" b="0"/>
+      </a:fillRef>
+      <a:effectRef idx="0">
+        <a:scrgbClr r="0" g="0" b="0"/>
+      </a:effectRef>
+      <a:fontRef idx="minor"/>
+    </dgm:style>
+  </dgm:styleLbl>
+  <dgm:styleLbl name="solidAlignAcc1">
+    <dgm:scene3d>
+      <a:camera prst="orthographicFront"/>
+      <a:lightRig rig="threePt" dir="t"/>
+    </dgm:scene3d>
+    <dgm:sp3d/>
+    <dgm:txPr/>
+    <dgm:style>
+      <a:lnRef idx="2">
+        <a:scrgbClr r="0" g="0" b="0"/>
+      </a:lnRef>
+      <a:fillRef idx="1">
+        <a:scrgbClr r="0" g="0" b="0"/>
+      </a:fillRef>
+      <a:effectRef idx="0">
+        <a:scrgbClr r="0" g="0" b="0"/>
+      </a:effectRef>
+      <a:fontRef idx="minor"/>
+    </dgm:style>
+  </dgm:styleLbl>
+  <dgm:styleLbl name="solidBgAcc1">
+    <dgm:scene3d>
+      <a:camera prst="orthographicFront"/>
+      <a:lightRig rig="threePt" dir="t"/>
+    </dgm:scene3d>
+    <dgm:sp3d/>
+    <dgm:txPr/>
+    <dgm:style>
+      <a:lnRef idx="2">
+        <a:scrgbClr r="0" g="0" b="0"/>
+      </a:lnRef>
+      <a:fillRef idx="1">
+        <a:scrgbClr r="0" g="0" b="0"/>
+      </a:fillRef>
+      <a:effectRef idx="0">
+        <a:scrgbClr r="0" g="0" b="0"/>
+      </a:effectRef>
+      <a:fontRef idx="minor"/>
+    </dgm:style>
+  </dgm:styleLbl>
+  <dgm:styleLbl name="fgAccFollowNode1">
+    <dgm:scene3d>
+      <a:camera prst="orthographicFront"/>
+      <a:lightRig rig="threePt" dir="t"/>
+    </dgm:scene3d>
+    <dgm:sp3d/>
+    <dgm:txPr/>
+    <dgm:style>
+      <a:lnRef idx="2">
+        <a:scrgbClr r="0" g="0" b="0"/>
+      </a:lnRef>
+      <a:fillRef idx="1">
+        <a:scrgbClr r="0" g="0" b="0"/>
+      </a:fillRef>
+      <a:effectRef idx="0">
+        <a:scrgbClr r="0" g="0" b="0"/>
+      </a:effectRef>
+      <a:fontRef idx="minor"/>
+    </dgm:style>
+  </dgm:styleLbl>
+  <dgm:styleLbl name="alignAccFollowNode1">
+    <dgm:scene3d>
+      <a:camera prst="orthographicFront"/>
+      <a:lightRig rig="threePt" dir="t"/>
+    </dgm:scene3d>
+    <dgm:sp3d/>
+    <dgm:txPr/>
+    <dgm:style>
+      <a:lnRef idx="2">
+        <a:scrgbClr r="0" g="0" b="0"/>
+      </a:lnRef>
+      <a:fillRef idx="1">
+        <a:scrgbClr r="0" g="0" b="0"/>
+      </a:fillRef>
+      <a:effectRef idx="0">
+        <a:scrgbClr r="0" g="0" b="0"/>
+      </a:effectRef>
+      <a:fontRef idx="minor"/>
+    </dgm:style>
+  </dgm:styleLbl>
+  <dgm:styleLbl name="bgAccFollowNode1">
+    <dgm:scene3d>
+      <a:camera prst="orthographicFront"/>
+      <a:lightRig rig="threePt" dir="t"/>
+    </dgm:scene3d>
+    <dgm:sp3d/>
+    <dgm:txPr/>
+    <dgm:style>
+      <a:lnRef idx="2">
+        <a:scrgbClr r="0" g="0" b="0"/>
+      </a:lnRef>
+      <a:fillRef idx="1">
+        <a:scrgbClr r="0" g="0" b="0"/>
+      </a:fillRef>
+      <a:effectRef idx="0">
+        <a:scrgbClr r="0" g="0" b="0"/>
+      </a:effectRef>
+      <a:fontRef idx="minor"/>
+    </dgm:style>
+  </dgm:styleLbl>
+  <dgm:styleLbl name="fgAcc0">
+    <dgm:scene3d>
+      <a:camera prst="orthographicFront"/>
+      <a:lightRig rig="threePt" dir="t"/>
+    </dgm:scene3d>
+    <dgm:sp3d/>
+    <dgm:txPr/>
+    <dgm:style>
+      <a:lnRef idx="2">
+        <a:scrgbClr r="0" g="0" b="0"/>
+      </a:lnRef>
+      <a:fillRef idx="1">
+        <a:scrgbClr r="0" g="0" b="0"/>
+      </a:fillRef>
+      <a:effectRef idx="0">
+        <a:scrgbClr r="0" g="0" b="0"/>
+      </a:effectRef>
+      <a:fontRef idx="minor"/>
+    </dgm:style>
+  </dgm:styleLbl>
+  <dgm:styleLbl name="fgAcc2">
+    <dgm:scene3d>
+      <a:camera prst="orthographicFront"/>
+      <a:lightRig rig="threePt" dir="t"/>
+    </dgm:scene3d>
+    <dgm:sp3d/>
+    <dgm:txPr/>
+    <dgm:style>
+      <a:lnRef idx="2">
+        <a:scrgbClr r="0" g="0" b="0"/>
+      </a:lnRef>
+      <a:fillRef idx="1">
+        <a:scrgbClr r="0" g="0" b="0"/>
+      </a:fillRef>
+      <a:effectRef idx="0">
+        <a:scrgbClr r="0" g="0" b="0"/>
+      </a:effectRef>
+      <a:fontRef idx="minor"/>
+    </dgm:style>
+  </dgm:styleLbl>
+  <dgm:styleLbl name="fgAcc3">
+    <dgm:scene3d>
+      <a:camera prst="orthographicFront"/>
+      <a:lightRig rig="threePt" dir="t"/>
+    </dgm:scene3d>
+    <dgm:sp3d/>
+    <dgm:txPr/>
+    <dgm:style>
+      <a:lnRef idx="2">
+        <a:scrgbClr r="0" g="0" b="0"/>
+      </a:lnRef>
+      <a:fillRef idx="1">
+        <a:scrgbClr r="0" g="0" b="0"/>
+      </a:fillRef>
+      <a:effectRef idx="0">
+        <a:scrgbClr r="0" g="0" b="0"/>
+      </a:effectRef>
+      <a:fontRef idx="minor"/>
+    </dgm:style>
+  </dgm:styleLbl>
+  <dgm:styleLbl name="fgAcc4">
+    <dgm:scene3d>
+      <a:camera prst="orthographicFront"/>
+      <a:lightRig rig="threePt" dir="t"/>
+    </dgm:scene3d>
+    <dgm:sp3d/>
+    <dgm:txPr/>
+    <dgm:style>
+      <a:lnRef idx="2">
+        <a:scrgbClr r="0" g="0" b="0"/>
+      </a:lnRef>
+      <a:fillRef idx="1">
+        <a:scrgbClr r="0" g="0" b="0"/>
+      </a:fillRef>
+      <a:effectRef idx="0">
+        <a:scrgbClr r="0" g="0" b="0"/>
+      </a:effectRef>
+      <a:fontRef idx="minor"/>
+    </dgm:style>
+  </dgm:styleLbl>
+  <dgm:styleLbl name="bgShp">
+    <dgm:scene3d>
+      <a:camera prst="orthographicFront"/>
+      <a:lightRig rig="threePt" dir="t"/>
+    </dgm:scene3d>
+    <dgm:sp3d/>
+    <dgm:txPr/>
+    <dgm:style>
+      <a:lnRef idx="0">
+        <a:scrgbClr r="0" g="0" b="0"/>
+      </a:lnRef>
+      <a:fillRef idx="1">
+        <a:scrgbClr r="0" g="0" b="0"/>
+      </a:fillRef>
+      <a:effectRef idx="0">
+        <a:scrgbClr r="0" g="0" b="0"/>
+      </a:effectRef>
+      <a:fontRef idx="minor"/>
+    </dgm:style>
+  </dgm:styleLbl>
+  <dgm:styleLbl name="dkBgShp">
+    <dgm:scene3d>
+      <a:camera prst="orthographicFront"/>
+      <a:lightRig rig="threePt" dir="t"/>
+    </dgm:scene3d>
+    <dgm:sp3d/>
+    <dgm:txPr/>
+    <dgm:style>
+      <a:lnRef idx="0">
+        <a:scrgbClr r="0" g="0" b="0"/>
+      </a:lnRef>
+      <a:fillRef idx="1">
+        <a:scrgbClr r="0" g="0" b="0"/>
+      </a:fillRef>
+      <a:effectRef idx="0">
+        <a:scrgbClr r="0" g="0" b="0"/>
+      </a:effectRef>
+      <a:fontRef idx="minor"/>
+    </dgm:style>
+  </dgm:styleLbl>
+  <dgm:styleLbl name="trBgShp">
+    <dgm:scene3d>
+      <a:camera prst="orthographicFront"/>
+      <a:lightRig rig="threePt" dir="t"/>
+    </dgm:scene3d>
+    <dgm:sp3d/>
+    <dgm:txPr/>
+    <dgm:style>
+      <a:lnRef idx="0">
+        <a:scrgbClr r="0" g="0" b="0"/>
+      </a:lnRef>
+      <a:fillRef idx="1">
+        <a:scrgbClr r="0" g="0" b="0"/>
+      </a:fillRef>
+      <a:effectRef idx="0">
+        <a:scrgbClr r="0" g="0" b="0"/>
+      </a:effectRef>
+      <a:fontRef idx="minor"/>
+    </dgm:style>
+  </dgm:styleLbl>
+  <dgm:styleLbl name="fgShp">
+    <dgm:scene3d>
+      <a:camera prst="orthographicFront"/>
+      <a:lightRig rig="threePt" dir="t"/>
+    </dgm:scene3d>
+    <dgm:sp3d/>
+    <dgm:txPr/>
+    <dgm:style>
+      <a:lnRef idx="2">
+        <a:scrgbClr r="0" g="0" b="0"/>
+      </a:lnRef>
+      <a:fillRef idx="1">
+        <a:scrgbClr r="0" g="0" b="0"/>
+      </a:fillRef>
+      <a:effectRef idx="0">
+        <a:scrgbClr r="0" g="0" b="0"/>
+      </a:effectRef>
+      <a:fontRef idx="minor"/>
+    </dgm:style>
+  </dgm:styleLbl>
+  <dgm:styleLbl name="revTx">
+    <dgm:scene3d>
+      <a:camera prst="orthographicFront"/>
+      <a:lightRig rig="threePt" dir="t"/>
+    </dgm:scene3d>
+    <dgm:sp3d/>
+    <dgm:txPr/>
+    <dgm:style>
+      <a:lnRef idx="0">
+        <a:scrgbClr r="0" g="0" b="0"/>
+      </a:lnRef>
+      <a:fillRef idx="0">
+        <a:scrgbClr r="0" g="0" b="0"/>
+      </a:fillRef>
+      <a:effectRef idx="0">
+        <a:scrgbClr r="0" g="0" b="0"/>
+      </a:effectRef>
+      <a:fontRef idx="minor"/>
+    </dgm:style>
+  </dgm:styleLbl>
+</dgm:styleDef>
+</file>
+
+<file path=ppt/diagrams/quickStyle2.xml><?xml version="1.0" encoding="utf-8"?>
 <dgm:styleDef xmlns:dgm="http://schemas.openxmlformats.org/drawingml/2006/diagram" xmlns:a="http://schemas.openxmlformats.org/drawingml/2006/main" uniqueId="urn:microsoft.com/office/officeart/2005/8/quickstyle/simple1">
   <dgm:title val=""/>
   <dgm:desc val=""/>
@@ -2965,7 +5701,7 @@
           <a:p>
             <a:fld id="{DD4B4FC3-663B-4837-BE3C-9748504111CD}" type="datetimeFigureOut">
               <a:rPr lang="en-US" smtClean="0"/>
-              <a:t>7/19/2023</a:t>
+              <a:t>7/20/2023</a:t>
             </a:fld>
             <a:endParaRPr lang="en-US"/>
           </a:p>
@@ -3130,7 +5866,7 @@
           <a:p>
             <a:fld id="{4739E05F-45CD-4689-845F-4C80707953D1}" type="datetimeFigureOut">
               <a:rPr lang="en-US" smtClean="0"/>
-              <a:t>7/19/2023</a:t>
+              <a:t>7/20/2023</a:t>
             </a:fld>
             <a:endParaRPr lang="en-US" dirty="0"/>
           </a:p>
@@ -3472,6 +6208,90 @@
     <p:extLst>
       <p:ext uri="{BB962C8B-B14F-4D97-AF65-F5344CB8AC3E}">
         <p14:creationId xmlns:p14="http://schemas.microsoft.com/office/powerpoint/2010/main" val="813552089"/>
+      </p:ext>
+    </p:extLst>
+  </p:cSld>
+  <p:clrMapOvr>
+    <a:masterClrMapping/>
+  </p:clrMapOvr>
+</p:notes>
+</file>
+
+<file path=ppt/notesSlides/notesSlide2.xml><?xml version="1.0" encoding="utf-8"?>
+<p:notes xmlns:a="http://schemas.openxmlformats.org/drawingml/2006/main" xmlns:r="http://schemas.openxmlformats.org/officeDocument/2006/relationships" xmlns:p="http://schemas.openxmlformats.org/presentationml/2006/main">
+  <p:cSld>
+    <p:spTree>
+      <p:nvGrpSpPr>
+        <p:cNvPr id="1" name=""/>
+        <p:cNvGrpSpPr/>
+        <p:nvPr/>
+      </p:nvGrpSpPr>
+      <p:grpSpPr>
+        <a:xfrm>
+          <a:off x="0" y="0"/>
+          <a:ext cx="0" cy="0"/>
+          <a:chOff x="0" y="0"/>
+          <a:chExt cx="0" cy="0"/>
+        </a:xfrm>
+      </p:grpSpPr>
+      <p:sp>
+        <p:nvSpPr>
+          <p:cNvPr id="2" name="Slide Image Placeholder 1"/>
+          <p:cNvSpPr>
+            <a:spLocks noGrp="1" noRot="1" noChangeAspect="1"/>
+          </p:cNvSpPr>
+          <p:nvPr>
+            <p:ph type="sldImg"/>
+          </p:nvPr>
+        </p:nvSpPr>
+        <p:spPr/>
+      </p:sp>
+      <p:sp>
+        <p:nvSpPr>
+          <p:cNvPr id="3" name="Notes Placeholder 2"/>
+          <p:cNvSpPr>
+            <a:spLocks noGrp="1"/>
+          </p:cNvSpPr>
+          <p:nvPr>
+            <p:ph type="body" idx="1"/>
+          </p:nvPr>
+        </p:nvSpPr>
+        <p:spPr/>
+        <p:txBody>
+          <a:bodyPr/>
+          <a:lstStyle/>
+          <a:p>
+            <a:endParaRPr lang="en-US" sz="2800" dirty="0"/>
+          </a:p>
+        </p:txBody>
+      </p:sp>
+      <p:sp>
+        <p:nvSpPr>
+          <p:cNvPr id="4" name="Slide Number Placeholder 3"/>
+          <p:cNvSpPr>
+            <a:spLocks noGrp="1"/>
+          </p:cNvSpPr>
+          <p:nvPr>
+            <p:ph type="sldNum" sz="quarter" idx="10"/>
+          </p:nvPr>
+        </p:nvSpPr>
+        <p:spPr/>
+        <p:txBody>
+          <a:bodyPr/>
+          <a:lstStyle/>
+          <a:p>
+            <a:fld id="{BEDBCE3A-CC44-4697-B56C-044F163EB01C}" type="slidenum">
+              <a:rPr lang="en-US" smtClean="0"/>
+              <a:t>5</a:t>
+            </a:fld>
+            <a:endParaRPr lang="en-US" dirty="0"/>
+          </a:p>
+        </p:txBody>
+      </p:sp>
+    </p:spTree>
+    <p:extLst>
+      <p:ext uri="{BB962C8B-B14F-4D97-AF65-F5344CB8AC3E}">
+        <p14:creationId xmlns:p14="http://schemas.microsoft.com/office/powerpoint/2010/main" val="1280077974"/>
       </p:ext>
     </p:extLst>
   </p:cSld>
@@ -8729,7 +11549,7 @@
               <a:rPr lang="en-US" sz="2400" dirty="0">
                 <a:cs typeface="Arial" panose="020B0604020202020204" pitchFamily="34" charset="0"/>
               </a:rPr>
-              <a:t>Moving away from excel based tool to new automated Python</a:t>
+              <a:t>Moving away from legacy excel based tool to new automated Python</a:t>
             </a:r>
             <a:endParaRPr lang="en-US" sz="2400" dirty="0"/>
           </a:p>
@@ -8816,7 +11636,7 @@
           <p:nvPr>
             <p:extLst>
               <p:ext uri="{D42A27DB-BD31-4B8C-83A1-F6EECF244321}">
-                <p14:modId xmlns:p14="http://schemas.microsoft.com/office/powerpoint/2010/main" val="408419029"/>
+                <p14:modId xmlns:p14="http://schemas.microsoft.com/office/powerpoint/2010/main" val="2289029954"/>
               </p:ext>
             </p:extLst>
           </p:nvPr>
@@ -8969,7 +11789,7 @@
                           <a:effectLst/>
                           <a:latin typeface="Trebuchet MS" panose="020B0603020202020204" pitchFamily="34" charset="0"/>
                         </a:rPr>
-                        <a:t>Non-existent documentation</a:t>
+                        <a:t>Minimal documentation</a:t>
                       </a:r>
                       <a:endParaRPr lang="en-US" sz="1200" b="0" i="0" u="none" strike="noStrike" dirty="0">
                         <a:solidFill>
@@ -9049,7 +11869,7 @@
                           <a:ea typeface="+mn-ea"/>
                           <a:cs typeface="+mn-cs"/>
                         </a:rPr>
-                        <a:t>Detailed emailing</a:t>
+                        <a:t>Detailed email</a:t>
                       </a:r>
                       <a:r>
                         <a:rPr lang="en-US" sz="1200" b="0" i="0" u="none" strike="noStrike" kern="1200" baseline="0" dirty="0">
@@ -9646,6 +12466,682 @@
 <file path=ppt/slides/slide5.xml><?xml version="1.0" encoding="utf-8"?>
 <p:sld xmlns:a="http://schemas.openxmlformats.org/drawingml/2006/main" xmlns:r="http://schemas.openxmlformats.org/officeDocument/2006/relationships" xmlns:p="http://schemas.openxmlformats.org/presentationml/2006/main">
   <p:cSld>
+    <p:bg>
+      <p:bgRef idx="1001">
+        <a:schemeClr val="bg1"/>
+      </p:bgRef>
+    </p:bg>
+    <p:spTree>
+      <p:nvGrpSpPr>
+        <p:cNvPr id="1" name=""/>
+        <p:cNvGrpSpPr/>
+        <p:nvPr/>
+      </p:nvGrpSpPr>
+      <p:grpSpPr>
+        <a:xfrm>
+          <a:off x="0" y="0"/>
+          <a:ext cx="0" cy="0"/>
+          <a:chOff x="0" y="0"/>
+          <a:chExt cx="0" cy="0"/>
+        </a:xfrm>
+      </p:grpSpPr>
+      <p:sp>
+        <p:nvSpPr>
+          <p:cNvPr id="3" name="Content Placeholder 2"/>
+          <p:cNvSpPr>
+            <a:spLocks noGrp="1"/>
+          </p:cNvSpPr>
+          <p:nvPr>
+            <p:ph idx="1"/>
+          </p:nvPr>
+        </p:nvSpPr>
+        <p:spPr>
+          <a:xfrm>
+            <a:off x="0" y="896938"/>
+            <a:ext cx="9144000" cy="5634037"/>
+          </a:xfrm>
+        </p:spPr>
+        <p:txBody>
+          <a:bodyPr>
+            <a:normAutofit/>
+          </a:bodyPr>
+          <a:lstStyle/>
+          <a:p>
+            <a:r>
+              <a:rPr lang="en-US" sz="2200" dirty="0">
+                <a:solidFill>
+                  <a:srgbClr val="000000"/>
+                </a:solidFill>
+              </a:rPr>
+              <a:t>Evolution of MIS downloads (market data downloads)</a:t>
+            </a:r>
+          </a:p>
+          <a:p>
+            <a:pPr marL="293687" lvl="1" indent="0">
+              <a:buNone/>
+            </a:pPr>
+            <a:endParaRPr lang="en-US" sz="1800" dirty="0">
+              <a:solidFill>
+                <a:srgbClr val="000000"/>
+              </a:solidFill>
+            </a:endParaRPr>
+          </a:p>
+          <a:p>
+            <a:pPr lvl="1"/>
+            <a:endParaRPr lang="en-US" sz="1400" dirty="0">
+              <a:solidFill>
+                <a:srgbClr val="000000"/>
+              </a:solidFill>
+            </a:endParaRPr>
+          </a:p>
+          <a:p>
+            <a:pPr marL="293687" lvl="1" indent="0">
+              <a:buNone/>
+            </a:pPr>
+            <a:endParaRPr lang="en-US" sz="1400" dirty="0">
+              <a:solidFill>
+                <a:srgbClr val="000000"/>
+              </a:solidFill>
+            </a:endParaRPr>
+          </a:p>
+          <a:p>
+            <a:pPr marL="0" indent="0">
+              <a:buNone/>
+            </a:pPr>
+            <a:endParaRPr lang="en-US" sz="1800" dirty="0"/>
+          </a:p>
+          <a:p>
+            <a:endParaRPr lang="en-US" sz="1800" dirty="0"/>
+          </a:p>
+          <a:p>
+            <a:pPr marL="0" indent="0">
+              <a:buNone/>
+            </a:pPr>
+            <a:endParaRPr lang="en-US" sz="1800" dirty="0">
+              <a:solidFill>
+                <a:srgbClr val="000000"/>
+              </a:solidFill>
+            </a:endParaRPr>
+          </a:p>
+          <a:p>
+            <a:pPr marL="0" indent="0">
+              <a:buNone/>
+            </a:pPr>
+            <a:endParaRPr lang="en-US" sz="1800" dirty="0">
+              <a:solidFill>
+                <a:srgbClr val="000000"/>
+              </a:solidFill>
+            </a:endParaRPr>
+          </a:p>
+          <a:p>
+            <a:pPr marL="0" indent="0">
+              <a:buNone/>
+            </a:pPr>
+            <a:endParaRPr lang="en-US" sz="1800" dirty="0">
+              <a:solidFill>
+                <a:srgbClr val="000000"/>
+              </a:solidFill>
+            </a:endParaRPr>
+          </a:p>
+          <a:p>
+            <a:pPr marL="0" indent="0">
+              <a:buNone/>
+            </a:pPr>
+            <a:endParaRPr lang="en-US" sz="1800" dirty="0">
+              <a:solidFill>
+                <a:srgbClr val="000000"/>
+              </a:solidFill>
+            </a:endParaRPr>
+          </a:p>
+          <a:p>
+            <a:r>
+              <a:rPr lang="en-US" sz="1800" dirty="0">
+                <a:solidFill>
+                  <a:srgbClr val="000000"/>
+                </a:solidFill>
+              </a:rPr>
+              <a:t>Objective </a:t>
+            </a:r>
+          </a:p>
+          <a:p>
+            <a:pPr lvl="1"/>
+            <a:endParaRPr lang="en-US" sz="1400" dirty="0">
+              <a:solidFill>
+                <a:srgbClr val="000000"/>
+              </a:solidFill>
+            </a:endParaRPr>
+          </a:p>
+          <a:p>
+            <a:pPr marL="0" indent="0">
+              <a:buNone/>
+            </a:pPr>
+            <a:endParaRPr lang="en-US" sz="1800" dirty="0">
+              <a:solidFill>
+                <a:srgbClr val="000000"/>
+              </a:solidFill>
+            </a:endParaRPr>
+          </a:p>
+          <a:p>
+            <a:pPr marL="0" indent="0">
+              <a:buNone/>
+            </a:pPr>
+            <a:endParaRPr lang="en-US" sz="1800" dirty="0">
+              <a:solidFill>
+                <a:srgbClr val="000000"/>
+              </a:solidFill>
+            </a:endParaRPr>
+          </a:p>
+        </p:txBody>
+      </p:sp>
+      <p:sp>
+        <p:nvSpPr>
+          <p:cNvPr id="2" name="Title 1"/>
+          <p:cNvSpPr>
+            <a:spLocks noGrp="1"/>
+          </p:cNvSpPr>
+          <p:nvPr>
+            <p:ph type="title"/>
+          </p:nvPr>
+        </p:nvSpPr>
+        <p:spPr/>
+        <p:txBody>
+          <a:bodyPr/>
+          <a:lstStyle/>
+          <a:p>
+            <a:r>
+              <a:rPr lang="en-US" sz="2400" dirty="0">
+                <a:cs typeface="Arial" panose="020B0604020202020204" pitchFamily="34" charset="0"/>
+              </a:rPr>
+              <a:t>Interactive Report : Real Time Constraint Impact</a:t>
+            </a:r>
+            <a:endParaRPr lang="en-US" sz="2400" dirty="0"/>
+          </a:p>
+        </p:txBody>
+      </p:sp>
+      <p:sp>
+        <p:nvSpPr>
+          <p:cNvPr id="4" name="Slide Number Placeholder 3"/>
+          <p:cNvSpPr>
+            <a:spLocks noGrp="1"/>
+          </p:cNvSpPr>
+          <p:nvPr>
+            <p:ph type="sldNum" sz="quarter" idx="4294967295"/>
+          </p:nvPr>
+        </p:nvSpPr>
+        <p:spPr>
+          <a:xfrm>
+            <a:off x="7010400" y="6530975"/>
+            <a:ext cx="2133600" cy="276225"/>
+          </a:xfrm>
+        </p:spPr>
+        <p:txBody>
+          <a:bodyPr/>
+          <a:lstStyle/>
+          <a:p>
+            <a:pPr>
+              <a:defRPr/>
+            </a:pPr>
+            <a:r>
+              <a:rPr lang="en-US" sz="800" dirty="0">
+                <a:solidFill>
+                  <a:srgbClr val="C00000"/>
+                </a:solidFill>
+              </a:rPr>
+              <a:t>HIGHLY CONFIDENTIAL </a:t>
+            </a:r>
+            <a:fld id="{EC4D6EA5-BC0F-4B07-ABF1-A957CA1E5A93}" type="slidenum">
+              <a:rPr lang="en-US" smtClean="0">
+                <a:solidFill>
+                  <a:prstClr val="black"/>
+                </a:solidFill>
+              </a:rPr>
+              <a:pPr>
+                <a:defRPr/>
+              </a:pPr>
+              <a:t>5</a:t>
+            </a:fld>
+            <a:endParaRPr lang="en-US" dirty="0">
+              <a:solidFill>
+                <a:prstClr val="black"/>
+              </a:solidFill>
+            </a:endParaRPr>
+          </a:p>
+        </p:txBody>
+      </p:sp>
+      <p:graphicFrame>
+        <p:nvGraphicFramePr>
+          <p:cNvPr id="6" name="Diagram 5"/>
+          <p:cNvGraphicFramePr/>
+          <p:nvPr/>
+        </p:nvGraphicFramePr>
+        <p:xfrm>
+          <a:off x="1393372" y="706535"/>
+          <a:ext cx="6096000" cy="3445588"/>
+        </p:xfrm>
+        <a:graphic>
+          <a:graphicData uri="http://schemas.openxmlformats.org/drawingml/2006/diagram">
+            <dgm:relIds xmlns:dgm="http://schemas.openxmlformats.org/drawingml/2006/diagram" xmlns:r="http://schemas.openxmlformats.org/officeDocument/2006/relationships" r:dm="rId4" r:lo="rId5" r:qs="rId6" r:cs="rId7"/>
+          </a:graphicData>
+        </a:graphic>
+      </p:graphicFrame>
+      <p:graphicFrame>
+        <p:nvGraphicFramePr>
+          <p:cNvPr id="13" name="Table 12"/>
+          <p:cNvGraphicFramePr>
+            <a:graphicFrameLocks noGrp="1"/>
+          </p:cNvGraphicFramePr>
+          <p:nvPr/>
+        </p:nvGraphicFramePr>
+        <p:xfrm>
+          <a:off x="2048393" y="3826614"/>
+          <a:ext cx="5047213" cy="2565648"/>
+        </p:xfrm>
+        <a:graphic>
+          <a:graphicData uri="http://schemas.openxmlformats.org/drawingml/2006/table">
+            <a:tbl>
+              <a:tblPr>
+                <a:tableStyleId>{5C22544A-7EE6-4342-B048-85BDC9FD1C3A}</a:tableStyleId>
+              </a:tblPr>
+              <a:tblGrid>
+                <a:gridCol w="2713911">
+                  <a:extLst>
+                    <a:ext uri="{9D8B030D-6E8A-4147-A177-3AD203B41FA5}">
+                      <a16:colId xmlns:a16="http://schemas.microsoft.com/office/drawing/2014/main" val="4021030062"/>
+                    </a:ext>
+                  </a:extLst>
+                </a:gridCol>
+                <a:gridCol w="2333302">
+                  <a:extLst>
+                    <a:ext uri="{9D8B030D-6E8A-4147-A177-3AD203B41FA5}">
+                      <a16:colId xmlns:a16="http://schemas.microsoft.com/office/drawing/2014/main" val="1831113682"/>
+                    </a:ext>
+                  </a:extLst>
+                </a:gridCol>
+              </a:tblGrid>
+              <a:tr h="376747">
+                <a:tc>
+                  <a:txBody>
+                    <a:bodyPr/>
+                    <a:lstStyle/>
+                    <a:p>
+                      <a:pPr algn="ctr" fontAlgn="b"/>
+                      <a:r>
+                        <a:rPr lang="en-US" sz="1600" b="1" u="none" strike="noStrike" dirty="0">
+                          <a:effectLst/>
+                          <a:latin typeface="Trebuchet MS" panose="020B0603020202020204" pitchFamily="34" charset="0"/>
+                        </a:rPr>
+                        <a:t>Current State</a:t>
+                      </a:r>
+                      <a:endParaRPr lang="en-US" sz="1600" b="1" i="0" u="none" strike="noStrike" dirty="0">
+                        <a:solidFill>
+                          <a:srgbClr val="000000"/>
+                        </a:solidFill>
+                        <a:effectLst/>
+                        <a:latin typeface="Trebuchet MS" panose="020B0603020202020204" pitchFamily="34" charset="0"/>
+                      </a:endParaRPr>
+                    </a:p>
+                  </a:txBody>
+                  <a:tcPr marL="9525" marR="9525" marT="9525" marB="0" anchor="ctr"/>
+                </a:tc>
+                <a:tc>
+                  <a:txBody>
+                    <a:bodyPr/>
+                    <a:lstStyle/>
+                    <a:p>
+                      <a:pPr algn="ctr" fontAlgn="b"/>
+                      <a:r>
+                        <a:rPr lang="en-US" sz="1600" b="1" u="none" strike="noStrike" dirty="0">
+                          <a:effectLst/>
+                          <a:latin typeface="Trebuchet MS" panose="020B0603020202020204" pitchFamily="34" charset="0"/>
+                        </a:rPr>
+                        <a:t>Proposed State</a:t>
+                      </a:r>
+                      <a:endParaRPr lang="en-US" sz="1600" b="1" i="0" u="none" strike="noStrike" dirty="0">
+                        <a:solidFill>
+                          <a:srgbClr val="000000"/>
+                        </a:solidFill>
+                        <a:effectLst/>
+                        <a:latin typeface="Trebuchet MS" panose="020B0603020202020204" pitchFamily="34" charset="0"/>
+                      </a:endParaRPr>
+                    </a:p>
+                  </a:txBody>
+                  <a:tcPr marL="9525" marR="9525" marT="9525" marB="0" anchor="ctr"/>
+                </a:tc>
+                <a:extLst>
+                  <a:ext uri="{0D108BD9-81ED-4DB2-BD59-A6C34878D82A}">
+                    <a16:rowId xmlns:a16="http://schemas.microsoft.com/office/drawing/2014/main" val="4100947857"/>
+                  </a:ext>
+                </a:extLst>
+              </a:tr>
+              <a:tr h="376747">
+                <a:tc>
+                  <a:txBody>
+                    <a:bodyPr/>
+                    <a:lstStyle/>
+                    <a:p>
+                      <a:pPr algn="ctr" fontAlgn="b"/>
+                      <a:r>
+                        <a:rPr lang="en-US" sz="1200" u="none" strike="noStrike" dirty="0">
+                          <a:effectLst/>
+                          <a:latin typeface="Trebuchet MS" panose="020B0603020202020204" pitchFamily="34" charset="0"/>
+                        </a:rPr>
+                        <a:t>Excel VBA Based</a:t>
+                      </a:r>
+                      <a:endParaRPr lang="en-US" sz="1200" b="0" i="0" u="none" strike="noStrike" dirty="0">
+                        <a:solidFill>
+                          <a:srgbClr val="000000"/>
+                        </a:solidFill>
+                        <a:effectLst/>
+                        <a:latin typeface="Trebuchet MS" panose="020B0603020202020204" pitchFamily="34" charset="0"/>
+                      </a:endParaRPr>
+                    </a:p>
+                  </a:txBody>
+                  <a:tcPr marL="9525" marR="9525" marT="9525" marB="0" anchor="ctr"/>
+                </a:tc>
+                <a:tc>
+                  <a:txBody>
+                    <a:bodyPr/>
+                    <a:lstStyle/>
+                    <a:p>
+                      <a:pPr algn="ctr" fontAlgn="b"/>
+                      <a:r>
+                        <a:rPr lang="en-US" sz="1200" u="none" strike="noStrike" dirty="0">
+                          <a:effectLst/>
+                          <a:latin typeface="Trebuchet MS" panose="020B0603020202020204" pitchFamily="34" charset="0"/>
+                        </a:rPr>
+                        <a:t>Python Based</a:t>
+                      </a:r>
+                      <a:endParaRPr lang="en-US" sz="1200" b="0" i="0" u="none" strike="noStrike" dirty="0">
+                        <a:solidFill>
+                          <a:srgbClr val="000000"/>
+                        </a:solidFill>
+                        <a:effectLst/>
+                        <a:latin typeface="Trebuchet MS" panose="020B0603020202020204" pitchFamily="34" charset="0"/>
+                      </a:endParaRPr>
+                    </a:p>
+                  </a:txBody>
+                  <a:tcPr marL="9525" marR="9525" marT="9525" marB="0" anchor="ctr"/>
+                </a:tc>
+                <a:extLst>
+                  <a:ext uri="{0D108BD9-81ED-4DB2-BD59-A6C34878D82A}">
+                    <a16:rowId xmlns:a16="http://schemas.microsoft.com/office/drawing/2014/main" val="3422968935"/>
+                  </a:ext>
+                </a:extLst>
+              </a:tr>
+              <a:tr h="376747">
+                <a:tc>
+                  <a:txBody>
+                    <a:bodyPr/>
+                    <a:lstStyle/>
+                    <a:p>
+                      <a:pPr algn="ctr" fontAlgn="b"/>
+                      <a:r>
+                        <a:rPr lang="en-US" sz="1200" u="none" strike="noStrike" dirty="0">
+                          <a:effectLst/>
+                          <a:latin typeface="Trebuchet MS" panose="020B0603020202020204" pitchFamily="34" charset="0"/>
+                        </a:rPr>
+                        <a:t>Minimal documentation</a:t>
+                      </a:r>
+                      <a:endParaRPr lang="en-US" sz="1200" b="0" i="0" u="none" strike="noStrike" dirty="0">
+                        <a:solidFill>
+                          <a:srgbClr val="000000"/>
+                        </a:solidFill>
+                        <a:effectLst/>
+                        <a:latin typeface="Trebuchet MS" panose="020B0603020202020204" pitchFamily="34" charset="0"/>
+                      </a:endParaRPr>
+                    </a:p>
+                  </a:txBody>
+                  <a:tcPr marL="9525" marR="9525" marT="9525" marB="0" anchor="ctr"/>
+                </a:tc>
+                <a:tc>
+                  <a:txBody>
+                    <a:bodyPr/>
+                    <a:lstStyle/>
+                    <a:p>
+                      <a:pPr algn="ctr" fontAlgn="b"/>
+                      <a:r>
+                        <a:rPr lang="en-US" sz="1200" u="none" strike="noStrike" dirty="0">
+                          <a:effectLst/>
+                          <a:latin typeface="Trebuchet MS" panose="020B0603020202020204" pitchFamily="34" charset="0"/>
+                        </a:rPr>
+                        <a:t>Detailed Documentation</a:t>
+                      </a:r>
+                      <a:endParaRPr lang="en-US" sz="1200" b="0" i="0" u="none" strike="noStrike" dirty="0">
+                        <a:solidFill>
+                          <a:srgbClr val="000000"/>
+                        </a:solidFill>
+                        <a:effectLst/>
+                        <a:latin typeface="Trebuchet MS" panose="020B0603020202020204" pitchFamily="34" charset="0"/>
+                      </a:endParaRPr>
+                    </a:p>
+                  </a:txBody>
+                  <a:tcPr marL="9525" marR="9525" marT="9525" marB="0" anchor="ctr"/>
+                </a:tc>
+                <a:extLst>
+                  <a:ext uri="{0D108BD9-81ED-4DB2-BD59-A6C34878D82A}">
+                    <a16:rowId xmlns:a16="http://schemas.microsoft.com/office/drawing/2014/main" val="3726928969"/>
+                  </a:ext>
+                </a:extLst>
+              </a:tr>
+              <a:tr h="681913">
+                <a:tc>
+                  <a:txBody>
+                    <a:bodyPr/>
+                    <a:lstStyle/>
+                    <a:p>
+                      <a:pPr algn="ctr" fontAlgn="b"/>
+                      <a:r>
+                        <a:rPr lang="en-US" sz="1200" b="0" i="0" u="none" strike="noStrike" dirty="0">
+                          <a:solidFill>
+                            <a:srgbClr val="000000"/>
+                          </a:solidFill>
+                          <a:effectLst/>
+                          <a:latin typeface="Trebuchet MS" panose="020B0603020202020204" pitchFamily="34" charset="0"/>
+                        </a:rPr>
+                        <a:t>Non-existent logging </a:t>
+                      </a:r>
+                    </a:p>
+                  </a:txBody>
+                  <a:tcPr marL="9525" marR="9525" marT="9525" marB="0" anchor="ctr"/>
+                </a:tc>
+                <a:tc>
+                  <a:txBody>
+                    <a:bodyPr/>
+                    <a:lstStyle/>
+                    <a:p>
+                      <a:pPr algn="ctr" fontAlgn="b"/>
+                      <a:r>
+                        <a:rPr lang="en-US" sz="1200" b="0" i="0" u="none" strike="noStrike" kern="1200" dirty="0">
+                          <a:solidFill>
+                            <a:srgbClr val="000000"/>
+                          </a:solidFill>
+                          <a:effectLst/>
+                          <a:latin typeface="Trebuchet MS" panose="020B0603020202020204" pitchFamily="34" charset="0"/>
+                          <a:ea typeface="+mn-ea"/>
+                          <a:cs typeface="+mn-cs"/>
+                        </a:rPr>
+                        <a:t>Detailed email</a:t>
+                      </a:r>
+                      <a:r>
+                        <a:rPr lang="en-US" sz="1200" b="0" i="0" u="none" strike="noStrike" kern="1200" baseline="0" dirty="0">
+                          <a:solidFill>
+                            <a:srgbClr val="000000"/>
+                          </a:solidFill>
+                          <a:effectLst/>
+                          <a:latin typeface="Trebuchet MS" panose="020B0603020202020204" pitchFamily="34" charset="0"/>
+                          <a:ea typeface="+mn-ea"/>
+                          <a:cs typeface="+mn-cs"/>
+                        </a:rPr>
+                        <a:t> capability</a:t>
+                      </a:r>
+                      <a:r>
+                        <a:rPr lang="en-US" sz="1200" b="0" i="0" u="none" strike="noStrike" kern="1200" dirty="0">
+                          <a:solidFill>
+                            <a:srgbClr val="000000"/>
+                          </a:solidFill>
+                          <a:effectLst/>
+                          <a:latin typeface="Trebuchet MS" panose="020B0603020202020204" pitchFamily="34" charset="0"/>
+                          <a:ea typeface="+mn-ea"/>
+                          <a:cs typeface="+mn-cs"/>
+                        </a:rPr>
+                        <a:t> to help with troubleshooting</a:t>
+                      </a:r>
+                    </a:p>
+                  </a:txBody>
+                  <a:tcPr marL="9525" marR="9525" marT="9525" marB="0" anchor="ctr"/>
+                </a:tc>
+                <a:extLst>
+                  <a:ext uri="{0D108BD9-81ED-4DB2-BD59-A6C34878D82A}">
+                    <a16:rowId xmlns:a16="http://schemas.microsoft.com/office/drawing/2014/main" val="559179352"/>
+                  </a:ext>
+                </a:extLst>
+              </a:tr>
+              <a:tr h="376747">
+                <a:tc>
+                  <a:txBody>
+                    <a:bodyPr/>
+                    <a:lstStyle/>
+                    <a:p>
+                      <a:pPr algn="ctr" fontAlgn="b"/>
+                      <a:r>
+                        <a:rPr lang="en-US" sz="1200" b="0" i="0" u="none" strike="noStrike" dirty="0">
+                          <a:solidFill>
+                            <a:srgbClr val="000000"/>
+                          </a:solidFill>
+                          <a:effectLst/>
+                          <a:latin typeface="Trebuchet MS" panose="020B0603020202020204" pitchFamily="34" charset="0"/>
+                        </a:rPr>
+                        <a:t>Doesn’t work for many folders</a:t>
+                      </a:r>
+                    </a:p>
+                  </a:txBody>
+                  <a:tcPr marL="9525" marR="9525" marT="9525" marB="0" anchor="ctr"/>
+                </a:tc>
+                <a:tc>
+                  <a:txBody>
+                    <a:bodyPr/>
+                    <a:lstStyle/>
+                    <a:p>
+                      <a:pPr algn="ctr" fontAlgn="b"/>
+                      <a:r>
+                        <a:rPr lang="en-US" sz="1200" b="0" i="0" u="none" strike="noStrike" dirty="0">
+                          <a:solidFill>
+                            <a:srgbClr val="000000"/>
+                          </a:solidFill>
+                          <a:effectLst/>
+                          <a:latin typeface="Trebuchet MS" panose="020B0603020202020204" pitchFamily="34" charset="0"/>
+                        </a:rPr>
+                        <a:t>Should</a:t>
+                      </a:r>
+                      <a:r>
+                        <a:rPr lang="en-US" sz="1200" b="0" i="0" u="none" strike="noStrike" baseline="0" dirty="0">
+                          <a:solidFill>
+                            <a:srgbClr val="000000"/>
+                          </a:solidFill>
+                          <a:effectLst/>
+                          <a:latin typeface="Trebuchet MS" panose="020B0603020202020204" pitchFamily="34" charset="0"/>
+                        </a:rPr>
+                        <a:t> work for all folders with available data</a:t>
+                      </a:r>
+                      <a:endParaRPr lang="en-US" sz="1200" b="0" i="0" u="none" strike="noStrike" dirty="0">
+                        <a:solidFill>
+                          <a:srgbClr val="000000"/>
+                        </a:solidFill>
+                        <a:effectLst/>
+                        <a:latin typeface="Trebuchet MS" panose="020B0603020202020204" pitchFamily="34" charset="0"/>
+                      </a:endParaRPr>
+                    </a:p>
+                  </a:txBody>
+                  <a:tcPr marL="9525" marR="9525" marT="9525" marB="0" anchor="ctr"/>
+                </a:tc>
+                <a:extLst>
+                  <a:ext uri="{0D108BD9-81ED-4DB2-BD59-A6C34878D82A}">
+                    <a16:rowId xmlns:a16="http://schemas.microsoft.com/office/drawing/2014/main" val="4127091782"/>
+                  </a:ext>
+                </a:extLst>
+              </a:tr>
+              <a:tr h="376747">
+                <a:tc>
+                  <a:txBody>
+                    <a:bodyPr/>
+                    <a:lstStyle/>
+                    <a:p>
+                      <a:pPr algn="ctr" fontAlgn="b"/>
+                      <a:r>
+                        <a:rPr lang="en-US" sz="1200" u="none" strike="noStrike" dirty="0">
+                          <a:effectLst/>
+                          <a:latin typeface="Trebuchet MS" panose="020B0603020202020204" pitchFamily="34" charset="0"/>
+                        </a:rPr>
+                        <a:t>Slow: Takes up to an hour</a:t>
+                      </a:r>
+                      <a:endParaRPr lang="en-US" sz="1200" b="0" i="0" u="none" strike="noStrike" dirty="0">
+                        <a:solidFill>
+                          <a:srgbClr val="000000"/>
+                        </a:solidFill>
+                        <a:effectLst/>
+                        <a:latin typeface="Trebuchet MS" panose="020B0603020202020204" pitchFamily="34" charset="0"/>
+                      </a:endParaRPr>
+                    </a:p>
+                  </a:txBody>
+                  <a:tcPr marL="9525" marR="9525" marT="9525" marB="0" anchor="ctr"/>
+                </a:tc>
+                <a:tc>
+                  <a:txBody>
+                    <a:bodyPr/>
+                    <a:lstStyle/>
+                    <a:p>
+                      <a:pPr algn="ctr" fontAlgn="b"/>
+                      <a:r>
+                        <a:rPr lang="en-US" sz="1200" u="none" strike="noStrike" dirty="0">
+                          <a:effectLst/>
+                          <a:latin typeface="Trebuchet MS" panose="020B0603020202020204" pitchFamily="34" charset="0"/>
+                        </a:rPr>
+                        <a:t>Fast: Aim</a:t>
+                      </a:r>
+                      <a:r>
+                        <a:rPr lang="en-US" sz="1200" u="none" strike="noStrike" baseline="0" dirty="0">
+                          <a:effectLst/>
+                          <a:latin typeface="Trebuchet MS" panose="020B0603020202020204" pitchFamily="34" charset="0"/>
+                        </a:rPr>
+                        <a:t> for 7-8x Speedups</a:t>
+                      </a:r>
+                      <a:endParaRPr lang="en-US" sz="1200" b="0" i="0" u="none" strike="noStrike" dirty="0">
+                        <a:solidFill>
+                          <a:srgbClr val="000000"/>
+                        </a:solidFill>
+                        <a:effectLst/>
+                        <a:latin typeface="Trebuchet MS" panose="020B0603020202020204" pitchFamily="34" charset="0"/>
+                      </a:endParaRPr>
+                    </a:p>
+                  </a:txBody>
+                  <a:tcPr marL="9525" marR="9525" marT="9525" marB="0" anchor="ctr"/>
+                </a:tc>
+                <a:extLst>
+                  <a:ext uri="{0D108BD9-81ED-4DB2-BD59-A6C34878D82A}">
+                    <a16:rowId xmlns:a16="http://schemas.microsoft.com/office/drawing/2014/main" val="1851623448"/>
+                  </a:ext>
+                </a:extLst>
+              </a:tr>
+            </a:tbl>
+          </a:graphicData>
+        </a:graphic>
+      </p:graphicFrame>
+    </p:spTree>
+    <p:extLst>
+      <p:ext uri="{BB962C8B-B14F-4D97-AF65-F5344CB8AC3E}">
+        <p14:creationId xmlns:p14="http://schemas.microsoft.com/office/powerpoint/2010/main" val="4049979746"/>
+      </p:ext>
+    </p:extLst>
+  </p:cSld>
+  <p:clrMapOvr>
+    <a:overrideClrMapping bg1="lt1" tx1="dk1" bg2="lt2" tx2="dk2" accent1="accent1" accent2="accent2" accent3="accent3" accent4="accent4" accent5="accent5" accent6="accent6" hlink="hlink" folHlink="folHlink"/>
+  </p:clrMapOvr>
+</p:sld>
+</file>
+
+<file path=ppt/slides/slide6.xml><?xml version="1.0" encoding="utf-8"?>
+<p:sld xmlns:a="http://schemas.openxmlformats.org/drawingml/2006/main" xmlns:r="http://schemas.openxmlformats.org/officeDocument/2006/relationships" xmlns:p="http://schemas.openxmlformats.org/presentationml/2006/main">
+  <p:cSld>
     <p:spTree>
       <p:nvGrpSpPr>
         <p:cNvPr id="1" name=""/>
@@ -9717,7 +13213,7 @@
               <a:pPr>
                 <a:defRPr/>
               </a:pPr>
-              <a:t>5</a:t>
+              <a:t>6</a:t>
             </a:fld>
             <a:endParaRPr lang="en-US" dirty="0">
               <a:solidFill>
@@ -9743,7 +13239,7 @@
         </p:blipFill>
         <p:spPr>
           <a:xfrm>
-            <a:off x="5886038" y="1078236"/>
+            <a:off x="2757356" y="912966"/>
             <a:ext cx="2655447" cy="5353235"/>
           </a:xfrm>
           <a:prstGeom prst="rect">
@@ -9754,7 +13250,7 @@
     </p:spTree>
     <p:extLst>
       <p:ext uri="{BB962C8B-B14F-4D97-AF65-F5344CB8AC3E}">
-        <p14:creationId xmlns:p14="http://schemas.microsoft.com/office/powerpoint/2010/main" val="375268835"/>
+        <p14:creationId xmlns:p14="http://schemas.microsoft.com/office/powerpoint/2010/main" val="2381708936"/>
       </p:ext>
     </p:extLst>
   </p:cSld>
@@ -11034,4 +14530,47 @@
     </a:folHlink>
   </a:clrScheme>
 </a:themeOverride>
+</file>
+
+<file path=ppt/theme/themeOverride2.xml><?xml version="1.0" encoding="utf-8"?>
+<a:themeOverride xmlns:a="http://schemas.openxmlformats.org/drawingml/2006/main">
+  <a:clrScheme name="Custom 3">
+    <a:dk1>
+      <a:srgbClr val="000000"/>
+    </a:dk1>
+    <a:lt1>
+      <a:sysClr val="window" lastClr="FFFFFF"/>
+    </a:lt1>
+    <a:dk2>
+      <a:srgbClr val="419424"/>
+    </a:dk2>
+    <a:lt2>
+      <a:srgbClr val="124C78"/>
+    </a:lt2>
+    <a:accent1>
+      <a:srgbClr val="124C78"/>
+    </a:accent1>
+    <a:accent2>
+      <a:srgbClr val="419424"/>
+    </a:accent2>
+    <a:accent3>
+      <a:srgbClr val="2595CD"/>
+    </a:accent3>
+    <a:accent4>
+      <a:srgbClr val="FFC000"/>
+    </a:accent4>
+    <a:accent5>
+      <a:srgbClr val="2FB3B0"/>
+    </a:accent5>
+    <a:accent6>
+      <a:srgbClr val="AC2927"/>
+    </a:accent6>
+    <a:hlink>
+      <a:srgbClr val="2595CD"/>
+    </a:hlink>
+    <a:folHlink>
+      <a:srgbClr val="2FB3B0"/>
+    </a:folHlink>
+  </a:clrScheme>
+</a:themeOverride>
 </file>
</xml_diff>

<commit_message>
comparison improvements, parameter tweaks
</commit_message>
<xml_diff>
--- a/Bi-weekly Update  07192023 SX.pptx
+++ b/Bi-weekly Update  07192023 SX.pptx
@@ -17,8 +17,8 @@
     <p:sldId id="428" r:id="rId5"/>
     <p:sldId id="429" r:id="rId6"/>
     <p:sldId id="432" r:id="rId7"/>
-    <p:sldId id="433" r:id="rId8"/>
-    <p:sldId id="431" r:id="rId9"/>
+    <p:sldId id="431" r:id="rId8"/>
+    <p:sldId id="433" r:id="rId9"/>
   </p:sldIdLst>
   <p:sldSz cx="9144000" cy="6858000" type="screen4x3"/>
   <p:notesSz cx="7019925" cy="9305925"/>
@@ -1074,6 +1074,13 @@
         </dgm:presLayoutVars>
       </dgm:prSet>
       <dgm:spPr/>
+      <dgm:t>
+        <a:bodyPr/>
+        <a:lstStyle/>
+        <a:p>
+          <a:endParaRPr lang="en-US"/>
+        </a:p>
+      </dgm:t>
     </dgm:pt>
     <dgm:pt modelId="{F60AE307-2D68-47F5-B72E-6174DF7F5509}" type="pres">
       <dgm:prSet presAssocID="{0BD5331F-1879-479A-A5B8-E9779065EED2}" presName="circleA" presStyleLbl="node1" presStyleIdx="0" presStyleCnt="3"/>
@@ -1098,6 +1105,13 @@
         </dgm:presLayoutVars>
       </dgm:prSet>
       <dgm:spPr/>
+      <dgm:t>
+        <a:bodyPr/>
+        <a:lstStyle/>
+        <a:p>
+          <a:endParaRPr lang="en-US"/>
+        </a:p>
+      </dgm:t>
     </dgm:pt>
     <dgm:pt modelId="{76306022-DAAF-4268-BE0B-ACA354089ABA}" type="pres">
       <dgm:prSet presAssocID="{BC4136A3-3915-40FE-8D36-F121C7AE9960}" presName="circleB" presStyleLbl="node1" presStyleIdx="1" presStyleCnt="3"/>
@@ -1122,6 +1136,13 @@
         </dgm:presLayoutVars>
       </dgm:prSet>
       <dgm:spPr/>
+      <dgm:t>
+        <a:bodyPr/>
+        <a:lstStyle/>
+        <a:p>
+          <a:endParaRPr lang="en-US"/>
+        </a:p>
+      </dgm:t>
     </dgm:pt>
     <dgm:pt modelId="{AB342BD0-562B-4E9E-809D-29555924ABAD}" type="pres">
       <dgm:prSet presAssocID="{13D7A595-F8F5-4BCC-BF7E-02301C828D5E}" presName="circleA" presStyleLbl="node1" presStyleIdx="2" presStyleCnt="3"/>
@@ -1133,13 +1154,13 @@
     </dgm:pt>
   </dgm:ptLst>
   <dgm:cxnLst>
+    <dgm:cxn modelId="{0DEFA5DA-3054-4018-8273-E8D31CF3B61C}" type="presOf" srcId="{13D7A595-F8F5-4BCC-BF7E-02301C828D5E}" destId="{CC79A4F8-9686-42B2-A197-B45E7FB9E4F1}" srcOrd="0" destOrd="0" presId="urn:microsoft.com/office/officeart/2005/8/layout/hProcess11"/>
+    <dgm:cxn modelId="{3BD271AA-0843-4791-B8BA-12D016E84E18}" type="presOf" srcId="{BC4136A3-3915-40FE-8D36-F121C7AE9960}" destId="{CBFF8D98-0F9E-43BC-BAAB-FE88DC9967D7}" srcOrd="0" destOrd="0" presId="urn:microsoft.com/office/officeart/2005/8/layout/hProcess11"/>
+    <dgm:cxn modelId="{B4573157-1355-4F7B-9CBF-03FEA16B1461}" type="presOf" srcId="{0BD5331F-1879-479A-A5B8-E9779065EED2}" destId="{9BA723B8-E2EF-4250-AF5E-30E01DFA5C2B}" srcOrd="0" destOrd="0" presId="urn:microsoft.com/office/officeart/2005/8/layout/hProcess11"/>
     <dgm:cxn modelId="{E51D171A-8D5D-4EE1-8853-47E3C1CAD6E5}" srcId="{64A5F292-70D5-4147-B758-4ABE9957B6FD}" destId="{13D7A595-F8F5-4BCC-BF7E-02301C828D5E}" srcOrd="2" destOrd="0" parTransId="{64D1CB0C-3B1E-4A2E-9D4B-FA6A7D082DCA}" sibTransId="{11FA5B42-F43D-44CB-B77B-BF8EA1F566AB}"/>
+    <dgm:cxn modelId="{D67CD6D4-A468-45FE-AAAD-FBE69CBC8F38}" srcId="{64A5F292-70D5-4147-B758-4ABE9957B6FD}" destId="{0BD5331F-1879-479A-A5B8-E9779065EED2}" srcOrd="0" destOrd="0" parTransId="{B5C1231D-1630-4F85-B35C-77A4825C9A00}" sibTransId="{F8E59EE5-39BC-41A3-A68D-240288A7772A}"/>
     <dgm:cxn modelId="{995D7C3D-6A8A-445D-B38F-F870F8066B11}" srcId="{64A5F292-70D5-4147-B758-4ABE9957B6FD}" destId="{BC4136A3-3915-40FE-8D36-F121C7AE9960}" srcOrd="1" destOrd="0" parTransId="{FCE8B248-925D-448C-AE6B-0708A2298DB4}" sibTransId="{21B1216E-E356-49CD-8D57-D8D33C384550}"/>
-    <dgm:cxn modelId="{B4573157-1355-4F7B-9CBF-03FEA16B1461}" type="presOf" srcId="{0BD5331F-1879-479A-A5B8-E9779065EED2}" destId="{9BA723B8-E2EF-4250-AF5E-30E01DFA5C2B}" srcOrd="0" destOrd="0" presId="urn:microsoft.com/office/officeart/2005/8/layout/hProcess11"/>
-    <dgm:cxn modelId="{3BD271AA-0843-4791-B8BA-12D016E84E18}" type="presOf" srcId="{BC4136A3-3915-40FE-8D36-F121C7AE9960}" destId="{CBFF8D98-0F9E-43BC-BAAB-FE88DC9967D7}" srcOrd="0" destOrd="0" presId="urn:microsoft.com/office/officeart/2005/8/layout/hProcess11"/>
     <dgm:cxn modelId="{434EE1C5-B599-496F-9F6E-F0491C7714BD}" type="presOf" srcId="{64A5F292-70D5-4147-B758-4ABE9957B6FD}" destId="{87C2BDE4-7880-44B7-A59C-FEB2EB47A340}" srcOrd="0" destOrd="0" presId="urn:microsoft.com/office/officeart/2005/8/layout/hProcess11"/>
-    <dgm:cxn modelId="{D67CD6D4-A468-45FE-AAAD-FBE69CBC8F38}" srcId="{64A5F292-70D5-4147-B758-4ABE9957B6FD}" destId="{0BD5331F-1879-479A-A5B8-E9779065EED2}" srcOrd="0" destOrd="0" parTransId="{B5C1231D-1630-4F85-B35C-77A4825C9A00}" sibTransId="{F8E59EE5-39BC-41A3-A68D-240288A7772A}"/>
-    <dgm:cxn modelId="{0DEFA5DA-3054-4018-8273-E8D31CF3B61C}" type="presOf" srcId="{13D7A595-F8F5-4BCC-BF7E-02301C828D5E}" destId="{CC79A4F8-9686-42B2-A197-B45E7FB9E4F1}" srcOrd="0" destOrd="0" presId="urn:microsoft.com/office/officeart/2005/8/layout/hProcess11"/>
     <dgm:cxn modelId="{CFF3F9E6-2A82-4BAF-B48C-2BDFCAA41B8A}" type="presParOf" srcId="{87C2BDE4-7880-44B7-A59C-FEB2EB47A340}" destId="{3E50CD98-D3A9-4957-BEDF-A6D1D7AC3063}" srcOrd="0" destOrd="0" presId="urn:microsoft.com/office/officeart/2005/8/layout/hProcess11"/>
     <dgm:cxn modelId="{83F8B323-FD4F-4AE6-9E7D-7B469743A3F4}" type="presParOf" srcId="{87C2BDE4-7880-44B7-A59C-FEB2EB47A340}" destId="{02D26E23-9729-4712-8169-CC1D020E8538}" srcOrd="1" destOrd="0" presId="urn:microsoft.com/office/officeart/2005/8/layout/hProcess11"/>
     <dgm:cxn modelId="{6FDEDECA-6F7B-49A6-AEBE-8E2F183B7EDE}" type="presParOf" srcId="{02D26E23-9729-4712-8169-CC1D020E8538}" destId="{C0757234-4347-45C1-9042-964F298E2E7B}" srcOrd="0" destOrd="0" presId="urn:microsoft.com/office/officeart/2005/8/layout/hProcess11"/>
@@ -1252,7 +1273,7 @@
         </a:bodyPr>
         <a:lstStyle/>
         <a:p>
-          <a:pPr marL="0" lvl="0" indent="0" algn="l" defTabSz="711200">
+          <a:pPr lvl="0" algn="l" defTabSz="711200">
             <a:lnSpc>
               <a:spcPct val="90000"/>
             </a:lnSpc>
@@ -1262,7 +1283,6 @@
             <a:spcAft>
               <a:spcPct val="35000"/>
             </a:spcAft>
-            <a:buNone/>
           </a:pPr>
           <a:r>
             <a:rPr lang="en-US" sz="1600" kern="1200" dirty="0">
@@ -1378,7 +1398,7 @@
         </a:bodyPr>
         <a:lstStyle/>
         <a:p>
-          <a:pPr marL="0" lvl="0" indent="0" algn="ctr" defTabSz="711200">
+          <a:pPr lvl="0" algn="ctr" defTabSz="711200">
             <a:lnSpc>
               <a:spcPct val="90000"/>
             </a:lnSpc>
@@ -1388,7 +1408,6 @@
             <a:spcAft>
               <a:spcPct val="35000"/>
             </a:spcAft>
-            <a:buNone/>
           </a:pPr>
           <a:r>
             <a:rPr lang="en-US" sz="1600" kern="1200" dirty="0">
@@ -1495,7 +1514,7 @@
         </a:bodyPr>
         <a:lstStyle/>
         <a:p>
-          <a:pPr marL="0" lvl="0" indent="0" algn="ctr" defTabSz="711200">
+          <a:pPr lvl="0" algn="ctr" defTabSz="711200">
             <a:lnSpc>
               <a:spcPct val="90000"/>
             </a:lnSpc>
@@ -1505,7 +1524,6 @@
             <a:spcAft>
               <a:spcPct val="35000"/>
             </a:spcAft>
-            <a:buNone/>
           </a:pPr>
           <a:r>
             <a:rPr lang="en-US" sz="1600" kern="1200" dirty="0">
@@ -2967,7 +2985,7 @@
           <a:p>
             <a:fld id="{DD4B4FC3-663B-4837-BE3C-9748504111CD}" type="datetimeFigureOut">
               <a:rPr lang="en-US" smtClean="0"/>
-              <a:t>7/20/2023</a:t>
+              <a:t>7/21/2023</a:t>
             </a:fld>
             <a:endParaRPr lang="en-US"/>
           </a:p>
@@ -3132,7 +3150,7 @@
           <a:p>
             <a:fld id="{4739E05F-45CD-4689-845F-4C80707953D1}" type="datetimeFigureOut">
               <a:rPr lang="en-US" smtClean="0"/>
-              <a:t>7/20/2023</a:t>
+              <a:t>7/21/2023</a:t>
             </a:fld>
             <a:endParaRPr lang="en-US" dirty="0"/>
           </a:p>
@@ -3632,7 +3650,7 @@
           <a:p>
             <a:fld id="{BEDBCE3A-CC44-4697-B56C-044F163EB01C}" type="slidenum">
               <a:rPr lang="en-US" smtClean="0"/>
-              <a:t>6</a:t>
+              <a:t>7</a:t>
             </a:fld>
             <a:endParaRPr lang="en-US" dirty="0"/>
           </a:p>
@@ -8646,9 +8664,10 @@
           <a:lstStyle/>
           <a:p>
             <a:r>
-              <a:rPr lang="en-US" dirty="0"/>
-              <a:t>07/19/2023</a:t>
-            </a:r>
+              <a:rPr lang="en-US" dirty="0" smtClean="0"/>
+              <a:t>07/26/2023</a:t>
+            </a:r>
+            <a:endParaRPr lang="en-US" dirty="0"/>
           </a:p>
         </p:txBody>
       </p:sp>
@@ -8760,7 +8779,23 @@
                   <a:srgbClr val="000000"/>
                 </a:solidFill>
               </a:rPr>
-              <a:t>Evolution of MIS downloads (market data downloads)</a:t>
+              <a:t>Evolution of MIS downloads </a:t>
+            </a:r>
+            <a:r>
+              <a:rPr lang="en-US" sz="2200" dirty="0" smtClean="0">
+                <a:solidFill>
+                  <a:srgbClr val="000000"/>
+                </a:solidFill>
+              </a:rPr>
+              <a:t>(ERCOT market </a:t>
+            </a:r>
+            <a:r>
+              <a:rPr lang="en-US" sz="2200" dirty="0">
+                <a:solidFill>
+                  <a:srgbClr val="000000"/>
+                </a:solidFill>
+              </a:rPr>
+              <a:t>data downloads)</a:t>
             </a:r>
           </a:p>
           <a:p>
@@ -9436,9 +9471,10 @@
           <a:lstStyle/>
           <a:p>
             <a:r>
-              <a:rPr lang="en-US" dirty="0"/>
-              <a:t>New Proposed Download Workflow</a:t>
-            </a:r>
+              <a:rPr lang="en-US" sz="2400" dirty="0" smtClean="0"/>
+              <a:t>Concurrent downloading , summary report and advanced error handling</a:t>
+            </a:r>
+            <a:endParaRPr lang="en-US" sz="2400" dirty="0"/>
           </a:p>
         </p:txBody>
       </p:sp>
@@ -9509,14 +9545,53 @@
         </p:blipFill>
         <p:spPr>
           <a:xfrm>
-            <a:off x="976544" y="847984"/>
-            <a:ext cx="7830104" cy="5773463"/>
+            <a:off x="1580224" y="1338802"/>
+            <a:ext cx="6747029" cy="4974867"/>
           </a:xfrm>
           <a:prstGeom prst="rect">
             <a:avLst/>
           </a:prstGeom>
         </p:spPr>
       </p:pic>
+      <p:sp>
+        <p:nvSpPr>
+          <p:cNvPr id="2" name="Rectangle 1"/>
+          <p:cNvSpPr/>
+          <p:nvPr/>
+        </p:nvSpPr>
+        <p:spPr>
+          <a:xfrm>
+            <a:off x="146482" y="936468"/>
+            <a:ext cx="8738932" cy="338554"/>
+          </a:xfrm>
+          <a:prstGeom prst="rect">
+            <a:avLst/>
+          </a:prstGeom>
+        </p:spPr>
+        <p:txBody>
+          <a:bodyPr wrap="square">
+            <a:spAutoFit/>
+          </a:bodyPr>
+          <a:lstStyle/>
+          <a:p>
+            <a:r>
+              <a:rPr lang="en-US" sz="1600" dirty="0" smtClean="0">
+                <a:solidFill>
+                  <a:srgbClr val="000000"/>
+                </a:solidFill>
+                <a:latin typeface="Trebuchet MS" panose="020B0603020202020204" pitchFamily="34" charset="0"/>
+              </a:rPr>
+              <a:t>Downloads around 100 reports , includes everything from 5 min data to planning reports</a:t>
+            </a:r>
+            <a:endParaRPr lang="en-US" sz="1600" dirty="0">
+              <a:solidFill>
+                <a:srgbClr val="000000"/>
+              </a:solidFill>
+              <a:latin typeface="Trebuchet MS" panose="020B0603020202020204" pitchFamily="34" charset="0"/>
+            </a:endParaRPr>
+          </a:p>
+        </p:txBody>
+      </p:sp>
     </p:spTree>
     <p:extLst>
       <p:ext uri="{BB962C8B-B14F-4D97-AF65-F5344CB8AC3E}">
@@ -9565,12 +9640,17 @@
         </p:blipFill>
         <p:spPr>
           <a:xfrm>
-            <a:off x="381024" y="1114996"/>
-            <a:ext cx="4993964" cy="4915933"/>
+            <a:off x="381024" y="1532246"/>
+            <a:ext cx="4821291" cy="4915933"/>
           </a:xfrm>
           <a:prstGeom prst="rect">
             <a:avLst/>
           </a:prstGeom>
+          <a:ln>
+            <a:solidFill>
+              <a:schemeClr val="tx1"/>
+            </a:solidFill>
+          </a:ln>
         </p:spPr>
       </p:pic>
       <p:sp>
@@ -9589,9 +9669,14 @@
           <a:lstStyle/>
           <a:p>
             <a:r>
-              <a:rPr lang="en-US" dirty="0"/>
-              <a:t>Error Checking Report Layout</a:t>
-            </a:r>
+              <a:rPr lang="en-US" sz="2400" dirty="0" smtClean="0"/>
+              <a:t>Detailed Summary reports, </a:t>
+            </a:r>
+            <a:r>
+              <a:rPr lang="en-US" sz="2400" dirty="0" smtClean="0"/>
+              <a:t>tips for troubleshooting errors</a:t>
+            </a:r>
+            <a:endParaRPr lang="en-US" sz="2400" dirty="0"/>
           </a:p>
         </p:txBody>
       </p:sp>
@@ -9648,7 +9733,7 @@
         </p:nvSpPr>
         <p:spPr>
           <a:xfrm>
-            <a:off x="5050260" y="1617655"/>
+            <a:off x="5202315" y="1617655"/>
             <a:ext cx="3835154" cy="3910613"/>
           </a:xfrm>
           <a:prstGeom prst="rect">
@@ -9669,11 +9754,14 @@
               <a:buChar char="•"/>
             </a:pPr>
             <a:r>
-              <a:rPr lang="en-US" sz="1600" dirty="0">
+              <a:rPr lang="en-US" sz="1600" dirty="0" smtClean="0">
                 <a:latin typeface="Trebuchet MS" panose="020B0603020202020204" pitchFamily="34" charset="0"/>
               </a:rPr>
-              <a:t>Automated to send immediately after the data gets downloaded (roughly 6:25 AM)</a:t>
-            </a:r>
+              <a:t>Detailed summary email </a:t>
+            </a:r>
+            <a:endParaRPr lang="en-US" sz="1600" dirty="0">
+              <a:latin typeface="Trebuchet MS" panose="020B0603020202020204" pitchFamily="34" charset="0"/>
+            </a:endParaRPr>
           </a:p>
           <a:p>
             <a:pPr marL="285750" indent="-285750">
@@ -9683,72 +9771,9 @@
               <a:buFont typeface="Arial" panose="020B0604020202020204" pitchFamily="34" charset="0"/>
               <a:buChar char="•"/>
             </a:pPr>
-            <a:r>
-              <a:rPr lang="en-US" sz="1600" dirty="0">
-                <a:latin typeface="Trebuchet MS" panose="020B0603020202020204" pitchFamily="34" charset="0"/>
-              </a:rPr>
-              <a:t>Summarizes the following:</a:t>
-            </a:r>
-          </a:p>
-          <a:p>
-            <a:pPr marL="742950" lvl="1" indent="-285750">
-              <a:buClr>
-                <a:schemeClr val="bg2"/>
-              </a:buClr>
-              <a:buFont typeface="Arial" panose="020B0604020202020204" pitchFamily="34" charset="0"/>
-              <a:buChar char="•"/>
-            </a:pPr>
-            <a:r>
-              <a:rPr lang="en-US" sz="1400" dirty="0">
-                <a:latin typeface="Trebuchet MS" panose="020B0603020202020204" pitchFamily="34" charset="0"/>
-              </a:rPr>
-              <a:t>Lower and upper bounds for date queries</a:t>
-            </a:r>
-          </a:p>
-          <a:p>
-            <a:pPr marL="742950" lvl="1" indent="-285750">
-              <a:buClr>
-                <a:schemeClr val="bg2"/>
-              </a:buClr>
-              <a:buFont typeface="Arial" panose="020B0604020202020204" pitchFamily="34" charset="0"/>
-              <a:buChar char="•"/>
-            </a:pPr>
-            <a:r>
-              <a:rPr lang="en-US" sz="1400" dirty="0">
-                <a:latin typeface="Trebuchet MS" panose="020B0603020202020204" pitchFamily="34" charset="0"/>
-              </a:rPr>
-              <a:t>Total download time recorded</a:t>
-            </a:r>
-          </a:p>
-          <a:p>
-            <a:pPr marL="742950" lvl="1" indent="-285750">
-              <a:buClr>
-                <a:schemeClr val="bg2"/>
-              </a:buClr>
-              <a:buFont typeface="Arial" panose="020B0604020202020204" pitchFamily="34" charset="0"/>
-              <a:buChar char="•"/>
-            </a:pPr>
-            <a:r>
-              <a:rPr lang="en-US" sz="1400" dirty="0">
-                <a:latin typeface="Trebuchet MS" panose="020B0603020202020204" pitchFamily="34" charset="0"/>
-              </a:rPr>
-              <a:t>Identifies which folders have no available data</a:t>
-            </a:r>
-          </a:p>
-          <a:p>
-            <a:pPr marL="742950" lvl="1" indent="-285750">
-              <a:buClr>
-                <a:schemeClr val="bg2"/>
-              </a:buClr>
-              <a:buFont typeface="Arial" panose="020B0604020202020204" pitchFamily="34" charset="0"/>
-              <a:buChar char="•"/>
-            </a:pPr>
-            <a:r>
-              <a:rPr lang="en-US" sz="1400" dirty="0">
-                <a:latin typeface="Trebuchet MS" panose="020B0603020202020204" pitchFamily="34" charset="0"/>
-              </a:rPr>
-              <a:t>Notes which folders were not successfully downloaded to</a:t>
-            </a:r>
+            <a:endParaRPr lang="en-US" sz="1600" dirty="0" smtClean="0">
+              <a:latin typeface="Trebuchet MS" panose="020B0603020202020204" pitchFamily="34" charset="0"/>
+            </a:endParaRPr>
           </a:p>
           <a:p>
             <a:pPr marL="285750" indent="-285750">
@@ -9758,12 +9783,9 @@
               <a:buFont typeface="Arial" panose="020B0604020202020204" pitchFamily="34" charset="0"/>
               <a:buChar char="•"/>
             </a:pPr>
-            <a:r>
-              <a:rPr lang="en-US" sz="1600" dirty="0">
-                <a:latin typeface="Trebuchet MS" panose="020B0603020202020204" pitchFamily="34" charset="0"/>
-              </a:rPr>
-              <a:t>Offers an easy solution via the Command Line to manually download missing data</a:t>
-            </a:r>
+            <a:endParaRPr lang="en-US" sz="1600" dirty="0">
+              <a:latin typeface="Trebuchet MS" panose="020B0603020202020204" pitchFamily="34" charset="0"/>
+            </a:endParaRPr>
           </a:p>
           <a:p>
             <a:pPr marL="285750" indent="-285750">
@@ -9773,28 +9795,197 @@
               <a:buFont typeface="Arial" panose="020B0604020202020204" pitchFamily="34" charset="0"/>
               <a:buChar char="•"/>
             </a:pPr>
+            <a:endParaRPr lang="en-US" sz="1600" dirty="0" smtClean="0">
+              <a:latin typeface="Trebuchet MS" panose="020B0603020202020204" pitchFamily="34" charset="0"/>
+            </a:endParaRPr>
+          </a:p>
+          <a:p>
+            <a:pPr marL="285750" indent="-285750">
+              <a:buClr>
+                <a:schemeClr val="bg2"/>
+              </a:buClr>
+              <a:buFont typeface="Arial" panose="020B0604020202020204" pitchFamily="34" charset="0"/>
+              <a:buChar char="•"/>
+            </a:pPr>
+            <a:endParaRPr lang="en-US" sz="1600" dirty="0">
+              <a:latin typeface="Trebuchet MS" panose="020B0603020202020204" pitchFamily="34" charset="0"/>
+            </a:endParaRPr>
+          </a:p>
+          <a:p>
+            <a:pPr marL="285750" indent="-285750">
+              <a:buClr>
+                <a:schemeClr val="bg2"/>
+              </a:buClr>
+              <a:buFont typeface="Arial" panose="020B0604020202020204" pitchFamily="34" charset="0"/>
+              <a:buChar char="•"/>
+            </a:pPr>
+            <a:endParaRPr lang="en-US" sz="1600" dirty="0" smtClean="0">
+              <a:latin typeface="Trebuchet MS" panose="020B0603020202020204" pitchFamily="34" charset="0"/>
+            </a:endParaRPr>
+          </a:p>
+          <a:p>
+            <a:pPr marL="285750" indent="-285750">
+              <a:buClr>
+                <a:schemeClr val="bg2"/>
+              </a:buClr>
+              <a:buFont typeface="Arial" panose="020B0604020202020204" pitchFamily="34" charset="0"/>
+              <a:buChar char="•"/>
+            </a:pPr>
+            <a:endParaRPr lang="en-US" sz="1600" dirty="0" smtClean="0">
+              <a:latin typeface="Trebuchet MS" panose="020B0603020202020204" pitchFamily="34" charset="0"/>
+            </a:endParaRPr>
+          </a:p>
+          <a:p>
+            <a:pPr marL="285750" indent="-285750">
+              <a:buClr>
+                <a:schemeClr val="bg2"/>
+              </a:buClr>
+              <a:buFont typeface="Arial" panose="020B0604020202020204" pitchFamily="34" charset="0"/>
+              <a:buChar char="•"/>
+            </a:pPr>
+            <a:r>
+              <a:rPr lang="en-US" sz="1600" dirty="0" smtClean="0">
+                <a:latin typeface="Trebuchet MS" panose="020B0603020202020204" pitchFamily="34" charset="0"/>
+              </a:rPr>
+              <a:t>Provides Useful Troubleshooting </a:t>
+            </a:r>
             <a:r>
               <a:rPr lang="en-US" sz="1600" dirty="0">
                 <a:latin typeface="Trebuchet MS" panose="020B0603020202020204" pitchFamily="34" charset="0"/>
               </a:rPr>
-              <a:t>Provides further Troubleshooting Tips and Tricks</a:t>
-            </a:r>
-          </a:p>
-          <a:p>
-            <a:pPr marL="742950" lvl="1" indent="-285750">
+              <a:t>Tips and Tricks</a:t>
+            </a:r>
+          </a:p>
+          <a:p>
+            <a:pPr marL="285750" indent="-285750">
+              <a:buClr>
+                <a:schemeClr val="bg2"/>
+              </a:buClr>
               <a:buFont typeface="Arial" panose="020B0604020202020204" pitchFamily="34" charset="0"/>
               <a:buChar char="•"/>
             </a:pPr>
-            <a:endParaRPr lang="en-US" sz="1400" dirty="0">
+            <a:endParaRPr lang="en-US" sz="1600" dirty="0" smtClean="0">
               <a:latin typeface="Trebuchet MS" panose="020B0603020202020204" pitchFamily="34" charset="0"/>
             </a:endParaRPr>
           </a:p>
           <a:p>
-            <a:pPr marL="742950" lvl="1" indent="-285750">
+            <a:pPr marL="285750" indent="-285750">
+              <a:buClr>
+                <a:schemeClr val="bg2"/>
+              </a:buClr>
               <a:buFont typeface="Arial" panose="020B0604020202020204" pitchFamily="34" charset="0"/>
               <a:buChar char="•"/>
             </a:pPr>
-            <a:endParaRPr lang="en-US" sz="1400" dirty="0" err="1">
+            <a:endParaRPr lang="en-US" sz="1600" dirty="0">
+              <a:latin typeface="Trebuchet MS" panose="020B0603020202020204" pitchFamily="34" charset="0"/>
+            </a:endParaRPr>
+          </a:p>
+          <a:p>
+            <a:pPr marL="285750" indent="-285750">
+              <a:buClr>
+                <a:schemeClr val="bg2"/>
+              </a:buClr>
+              <a:buFont typeface="Arial" panose="020B0604020202020204" pitchFamily="34" charset="0"/>
+              <a:buChar char="•"/>
+            </a:pPr>
+            <a:endParaRPr lang="en-US" sz="1600" dirty="0" smtClean="0">
+              <a:latin typeface="Trebuchet MS" panose="020B0603020202020204" pitchFamily="34" charset="0"/>
+            </a:endParaRPr>
+          </a:p>
+          <a:p>
+            <a:pPr marL="285750" indent="-285750">
+              <a:buClr>
+                <a:schemeClr val="bg2"/>
+              </a:buClr>
+              <a:buFont typeface="Arial" panose="020B0604020202020204" pitchFamily="34" charset="0"/>
+              <a:buChar char="•"/>
+            </a:pPr>
+            <a:r>
+              <a:rPr lang="en-US" sz="1600" dirty="0" smtClean="0">
+                <a:latin typeface="Trebuchet MS" panose="020B0603020202020204" pitchFamily="34" charset="0"/>
+              </a:rPr>
+              <a:t>Offers </a:t>
+            </a:r>
+            <a:r>
+              <a:rPr lang="en-US" sz="1600" dirty="0">
+                <a:latin typeface="Trebuchet MS" panose="020B0603020202020204" pitchFamily="34" charset="0"/>
+              </a:rPr>
+              <a:t>an easy solution via the Command Line to manually download missing data</a:t>
+            </a:r>
+          </a:p>
+          <a:p>
+            <a:pPr marL="285750" indent="-285750">
+              <a:buClr>
+                <a:schemeClr val="bg2"/>
+              </a:buClr>
+              <a:buFont typeface="Arial" panose="020B0604020202020204" pitchFamily="34" charset="0"/>
+              <a:buChar char="•"/>
+            </a:pPr>
+            <a:endParaRPr lang="en-US" sz="1600" dirty="0" smtClean="0">
+              <a:latin typeface="Trebuchet MS" panose="020B0603020202020204" pitchFamily="34" charset="0"/>
+            </a:endParaRPr>
+          </a:p>
+          <a:p>
+            <a:pPr marL="285750" indent="-285750">
+              <a:buClr>
+                <a:schemeClr val="bg2"/>
+              </a:buClr>
+              <a:buFont typeface="Arial" panose="020B0604020202020204" pitchFamily="34" charset="0"/>
+              <a:buChar char="•"/>
+            </a:pPr>
+            <a:endParaRPr lang="en-US" sz="1600" dirty="0">
+              <a:latin typeface="Trebuchet MS" panose="020B0603020202020204" pitchFamily="34" charset="0"/>
+            </a:endParaRPr>
+          </a:p>
+          <a:p>
+            <a:pPr marL="285750" indent="-285750">
+              <a:buClr>
+                <a:schemeClr val="bg2"/>
+              </a:buClr>
+              <a:buFont typeface="Arial" panose="020B0604020202020204" pitchFamily="34" charset="0"/>
+              <a:buChar char="•"/>
+            </a:pPr>
+            <a:endParaRPr lang="en-US" sz="1600" dirty="0" smtClean="0">
+              <a:latin typeface="Trebuchet MS" panose="020B0603020202020204" pitchFamily="34" charset="0"/>
+            </a:endParaRPr>
+          </a:p>
+        </p:txBody>
+      </p:sp>
+      <p:sp>
+        <p:nvSpPr>
+          <p:cNvPr id="7" name="Rectangle 6"/>
+          <p:cNvSpPr/>
+          <p:nvPr/>
+        </p:nvSpPr>
+        <p:spPr>
+          <a:xfrm>
+            <a:off x="146482" y="936468"/>
+            <a:ext cx="8738932" cy="338554"/>
+          </a:xfrm>
+          <a:prstGeom prst="rect">
+            <a:avLst/>
+          </a:prstGeom>
+        </p:spPr>
+        <p:txBody>
+          <a:bodyPr wrap="square">
+            <a:spAutoFit/>
+          </a:bodyPr>
+          <a:lstStyle/>
+          <a:p>
+            <a:pPr marL="285750" indent="-285750">
+              <a:buClr>
+                <a:schemeClr val="bg2"/>
+              </a:buClr>
+              <a:buFont typeface="Arial" panose="020B0604020202020204" pitchFamily="34" charset="0"/>
+              <a:buChar char="•"/>
+            </a:pPr>
+            <a:r>
+              <a:rPr lang="en-US" sz="1600" dirty="0">
+                <a:latin typeface="Trebuchet MS" panose="020B0603020202020204" pitchFamily="34" charset="0"/>
+              </a:rPr>
+              <a:t>Automated to send immediately after the data gets downloaded (roughly 6:25 AM)</a:t>
+            </a:r>
+            <a:endParaRPr lang="en-US" sz="1600" dirty="0">
               <a:latin typeface="Trebuchet MS" panose="020B0603020202020204" pitchFamily="34" charset="0"/>
             </a:endParaRPr>
           </a:p>
@@ -9880,8 +10071,21 @@
                   <a:srgbClr val="000000"/>
                 </a:solidFill>
               </a:rPr>
-              <a:t>Morning Meeting Question</a:t>
-            </a:r>
+              <a:t>Morning Meeting </a:t>
+            </a:r>
+            <a:r>
+              <a:rPr lang="en-US" sz="2200" dirty="0" smtClean="0">
+                <a:solidFill>
+                  <a:srgbClr val="000000"/>
+                </a:solidFill>
+              </a:rPr>
+              <a:t>Question(s)</a:t>
+            </a:r>
+            <a:endParaRPr lang="en-US" sz="2200" dirty="0">
+              <a:solidFill>
+                <a:srgbClr val="000000"/>
+              </a:solidFill>
+            </a:endParaRPr>
           </a:p>
           <a:p>
             <a:pPr lvl="1"/>
@@ -9891,18 +10095,34 @@
                   <a:srgbClr val="FF0000"/>
                 </a:solidFill>
               </a:rPr>
-              <a:t>Will the basis from yesterday/last 2 days repeat today/tomorrow</a:t>
+              <a:t>Will the basis from yesterday/last 2 days repeat </a:t>
+            </a:r>
+            <a:r>
+              <a:rPr lang="en-US" sz="2300" dirty="0" smtClean="0">
+                <a:solidFill>
+                  <a:srgbClr val="FF0000"/>
+                </a:solidFill>
+              </a:rPr>
+              <a:t>today/tomorrow</a:t>
             </a:r>
           </a:p>
           <a:p>
             <a:pPr lvl="1"/>
+            <a:r>
+              <a:rPr lang="en-US" sz="2300" dirty="0" smtClean="0">
+                <a:solidFill>
+                  <a:srgbClr val="FF0000"/>
+                </a:solidFill>
+              </a:rPr>
+              <a:t>Pricing </a:t>
+            </a:r>
             <a:r>
               <a:rPr lang="en-US" sz="2300" dirty="0">
                 <a:solidFill>
                   <a:srgbClr val="FF0000"/>
                 </a:solidFill>
               </a:rPr>
-              <a:t>Pricing PTP (spread bids)</a:t>
+              <a:t>PTP (spread bids)</a:t>
             </a:r>
           </a:p>
           <a:p>
@@ -10085,13 +10305,13 @@
           <p:nvPr>
             <p:extLst>
               <p:ext uri="{D42A27DB-BD31-4B8C-83A1-F6EECF244321}">
-                <p14:modId xmlns:p14="http://schemas.microsoft.com/office/powerpoint/2010/main" val="2152740849"/>
+                <p14:modId xmlns:p14="http://schemas.microsoft.com/office/powerpoint/2010/main" val="2525269178"/>
               </p:ext>
             </p:extLst>
           </p:nvPr>
         </p:nvGraphicFramePr>
         <p:xfrm>
-          <a:off x="1506069" y="3218656"/>
+          <a:off x="1497193" y="3094604"/>
           <a:ext cx="5316072" cy="1254732"/>
         </p:xfrm>
         <a:graphic>
@@ -10124,12 +10344,12 @@
                     <a:p>
                       <a:pPr algn="ctr" rtl="0" fontAlgn="b"/>
                       <a:r>
-                        <a:rPr lang="en-US" sz="1600" u="none" strike="noStrike">
+                        <a:rPr lang="en-US" sz="1600" u="none" strike="noStrike" dirty="0">
                           <a:effectLst/>
                         </a:rPr>
                         <a:t>Current Process</a:t>
                       </a:r>
-                      <a:endParaRPr lang="en-US" sz="1600" b="1" i="0" u="none" strike="noStrike">
+                      <a:endParaRPr lang="en-US" sz="1600" b="1" i="0" u="none" strike="noStrike" dirty="0">
                         <a:solidFill>
                           <a:srgbClr val="000000"/>
                         </a:solidFill>
@@ -10138,7 +10358,7 @@
                       </a:endParaRPr>
                     </a:p>
                   </a:txBody>
-                  <a:tcPr marL="9525" marR="9525" marT="9525" marB="0" anchor="b"/>
+                  <a:tcPr marL="9525" marR="9525" marT="9525" marB="0" anchor="ctr"/>
                 </a:tc>
                 <a:tc>
                   <a:txBody>
@@ -10147,12 +10367,12 @@
                     <a:p>
                       <a:pPr algn="ctr" rtl="0" fontAlgn="b"/>
                       <a:r>
-                        <a:rPr lang="en-US" sz="1600" u="none" strike="noStrike">
+                        <a:rPr lang="en-US" sz="1600" u="none" strike="noStrike" dirty="0">
                           <a:effectLst/>
                         </a:rPr>
                         <a:t>Changed</a:t>
                       </a:r>
-                      <a:endParaRPr lang="en-US" sz="1600" b="1" i="0" u="none" strike="noStrike">
+                      <a:endParaRPr lang="en-US" sz="1600" b="1" i="0" u="none" strike="noStrike" dirty="0">
                         <a:solidFill>
                           <a:srgbClr val="000000"/>
                         </a:solidFill>
@@ -10161,7 +10381,7 @@
                       </a:endParaRPr>
                     </a:p>
                   </a:txBody>
-                  <a:tcPr marL="9525" marR="9525" marT="9525" marB="0" anchor="b"/>
+                  <a:tcPr marL="9525" marR="9525" marT="9525" marB="0" anchor="ctr"/>
                 </a:tc>
                 <a:extLst>
                   <a:ext uri="{0D108BD9-81ED-4DB2-BD59-A6C34878D82A}">
@@ -10193,19 +10413,41 @@
                   </a:txBody>
                   <a:tcPr marL="9525" marR="9525" marT="9525" marB="0" anchor="ctr"/>
                 </a:tc>
-                <a:tc>
+                <a:tc rowSpan="2">
                   <a:txBody>
                     <a:bodyPr/>
                     <a:lstStyle/>
                     <a:p>
                       <a:pPr algn="ctr" rtl="0" fontAlgn="b"/>
                       <a:r>
-                        <a:rPr lang="en-US" sz="1200" u="none" strike="noStrike">
+                        <a:rPr lang="en-US" sz="1200" u="none" strike="noStrike" dirty="0" smtClean="0">
                           <a:effectLst/>
                         </a:rPr>
-                        <a:t>One Shot Python based scheduled task</a:t>
+                        <a:t>One Shot Fully Automated Python </a:t>
                       </a:r>
-                      <a:endParaRPr lang="en-US" sz="1200" b="0" i="0" u="none" strike="noStrike">
+                      <a:r>
+                        <a:rPr lang="en-US" sz="1200" u="none" strike="noStrike" dirty="0">
+                          <a:effectLst/>
+                        </a:rPr>
+                        <a:t>based scheduled task</a:t>
+                      </a:r>
+                      <a:endParaRPr lang="en-US" sz="1200" b="0" i="0" u="none" strike="noStrike" dirty="0">
+                        <a:solidFill>
+                          <a:srgbClr val="000000"/>
+                        </a:solidFill>
+                        <a:effectLst/>
+                        <a:latin typeface="Trebuchet MS" panose="020B0603020202020204" pitchFamily="34" charset="0"/>
+                      </a:endParaRPr>
+                    </a:p>
+                    <a:p>
+                      <a:pPr algn="ctr" rtl="0" fontAlgn="b"/>
+                      <a:r>
+                        <a:rPr lang="en-US" sz="1200" u="none" strike="noStrike" dirty="0">
+                          <a:effectLst/>
+                        </a:rPr>
+                        <a:t> </a:t>
+                      </a:r>
+                      <a:endParaRPr lang="en-US" sz="1200" b="0" i="0" u="none" strike="noStrike" dirty="0">
                         <a:solidFill>
                           <a:srgbClr val="000000"/>
                         </a:solidFill>
@@ -10246,19 +10488,13 @@
                   </a:txBody>
                   <a:tcPr marL="9525" marR="9525" marT="9525" marB="0" anchor="ctr"/>
                 </a:tc>
-                <a:tc>
+                <a:tc vMerge="1">
                   <a:txBody>
                     <a:bodyPr/>
                     <a:lstStyle/>
                     <a:p>
                       <a:pPr algn="ctr" rtl="0" fontAlgn="b"/>
-                      <a:r>
-                        <a:rPr lang="en-US" sz="1200" u="none" strike="noStrike">
-                          <a:effectLst/>
-                        </a:rPr>
-                        <a:t> </a:t>
-                      </a:r>
-                      <a:endParaRPr lang="en-US" sz="1200" b="0" i="0" u="none" strike="noStrike">
+                      <a:endParaRPr lang="en-US" sz="1200" b="0" i="0" u="none" strike="noStrike" dirty="0">
                         <a:solidFill>
                           <a:srgbClr val="000000"/>
                         </a:solidFill>
@@ -10348,6 +10584,127 @@
 <file path=ppt/slides/slide6.xml><?xml version="1.0" encoding="utf-8"?>
 <p:sld xmlns:a="http://schemas.openxmlformats.org/drawingml/2006/main" xmlns:r="http://schemas.openxmlformats.org/officeDocument/2006/relationships" xmlns:p="http://schemas.openxmlformats.org/presentationml/2006/main">
   <p:cSld>
+    <p:spTree>
+      <p:nvGrpSpPr>
+        <p:cNvPr id="1" name=""/>
+        <p:cNvGrpSpPr/>
+        <p:nvPr/>
+      </p:nvGrpSpPr>
+      <p:grpSpPr>
+        <a:xfrm>
+          <a:off x="0" y="0"/>
+          <a:ext cx="0" cy="0"/>
+          <a:chOff x="0" y="0"/>
+          <a:chExt cx="0" cy="0"/>
+        </a:xfrm>
+      </p:grpSpPr>
+      <p:sp>
+        <p:nvSpPr>
+          <p:cNvPr id="3" name="Title 2"/>
+          <p:cNvSpPr>
+            <a:spLocks noGrp="1"/>
+          </p:cNvSpPr>
+          <p:nvPr>
+            <p:ph type="title"/>
+          </p:nvPr>
+        </p:nvSpPr>
+        <p:spPr/>
+        <p:txBody>
+          <a:bodyPr/>
+          <a:lstStyle/>
+          <a:p>
+            <a:r>
+              <a:rPr lang="en-US" dirty="0"/>
+              <a:t>Delta Table Workflow</a:t>
+            </a:r>
+          </a:p>
+        </p:txBody>
+      </p:sp>
+      <p:sp>
+        <p:nvSpPr>
+          <p:cNvPr id="4" name="Slide Number Placeholder 3"/>
+          <p:cNvSpPr>
+            <a:spLocks noGrp="1"/>
+          </p:cNvSpPr>
+          <p:nvPr>
+            <p:ph type="sldNum" sz="quarter" idx="12"/>
+          </p:nvPr>
+        </p:nvSpPr>
+        <p:spPr/>
+        <p:txBody>
+          <a:bodyPr/>
+          <a:lstStyle/>
+          <a:p>
+            <a:pPr>
+              <a:defRPr/>
+            </a:pPr>
+            <a:r>
+              <a:rPr lang="en-US" sz="800">
+                <a:solidFill>
+                  <a:srgbClr val="C00000"/>
+                </a:solidFill>
+              </a:rPr>
+              <a:t>HIGHLY CONFIDENTIAL </a:t>
+            </a:r>
+            <a:fld id="{EC4D6EA5-BC0F-4B07-ABF1-A957CA1E5A93}" type="slidenum">
+              <a:rPr lang="en-US" smtClean="0">
+                <a:solidFill>
+                  <a:prstClr val="black"/>
+                </a:solidFill>
+              </a:rPr>
+              <a:pPr>
+                <a:defRPr/>
+              </a:pPr>
+              <a:t>6</a:t>
+            </a:fld>
+            <a:endParaRPr lang="en-US" dirty="0">
+              <a:solidFill>
+                <a:prstClr val="black"/>
+              </a:solidFill>
+            </a:endParaRPr>
+          </a:p>
+        </p:txBody>
+      </p:sp>
+      <p:pic>
+        <p:nvPicPr>
+          <p:cNvPr id="7" name="Picture 6"/>
+          <p:cNvPicPr>
+            <a:picLocks noChangeAspect="1"/>
+          </p:cNvPicPr>
+          <p:nvPr/>
+        </p:nvPicPr>
+        <p:blipFill>
+          <a:blip r:embed="rId2"/>
+          <a:stretch>
+            <a:fillRect/>
+          </a:stretch>
+        </p:blipFill>
+        <p:spPr>
+          <a:xfrm>
+            <a:off x="2757356" y="912966"/>
+            <a:ext cx="2655447" cy="5353235"/>
+          </a:xfrm>
+          <a:prstGeom prst="rect">
+            <a:avLst/>
+          </a:prstGeom>
+        </p:spPr>
+      </p:pic>
+    </p:spTree>
+    <p:extLst>
+      <p:ext uri="{BB962C8B-B14F-4D97-AF65-F5344CB8AC3E}">
+        <p14:creationId xmlns:p14="http://schemas.microsoft.com/office/powerpoint/2010/main" val="2381708936"/>
+      </p:ext>
+    </p:extLst>
+  </p:cSld>
+  <p:clrMapOvr>
+    <a:masterClrMapping/>
+  </p:clrMapOvr>
+</p:sld>
+</file>
+
+<file path=ppt/slides/slide7.xml><?xml version="1.0" encoding="utf-8"?>
+<p:sld xmlns:a="http://schemas.openxmlformats.org/drawingml/2006/main" xmlns:r="http://schemas.openxmlformats.org/officeDocument/2006/relationships" xmlns:p="http://schemas.openxmlformats.org/presentationml/2006/main">
+  <p:cSld>
     <p:bg>
       <p:bgRef idx="1001">
         <a:schemeClr val="bg1"/>
@@ -10487,6 +10844,53 @@
             <a:pPr marL="0" indent="0">
               <a:buNone/>
             </a:pPr>
+            <a:endParaRPr lang="en-US" sz="1800" dirty="0" smtClean="0">
+              <a:solidFill>
+                <a:srgbClr val="000000"/>
+              </a:solidFill>
+            </a:endParaRPr>
+          </a:p>
+          <a:p>
+            <a:r>
+              <a:rPr lang="en-US" sz="2000" dirty="0" smtClean="0">
+                <a:solidFill>
+                  <a:srgbClr val="000000"/>
+                </a:solidFill>
+              </a:rPr>
+              <a:t>Next Steps</a:t>
+            </a:r>
+          </a:p>
+          <a:p>
+            <a:pPr lvl="1"/>
+            <a:r>
+              <a:rPr lang="en-US" sz="1600" dirty="0" smtClean="0">
+                <a:solidFill>
+                  <a:srgbClr val="000000"/>
+                </a:solidFill>
+              </a:rPr>
+              <a:t>Replace Generator Code by English Names</a:t>
+            </a:r>
+          </a:p>
+          <a:p>
+            <a:pPr lvl="1"/>
+            <a:r>
+              <a:rPr lang="en-US" sz="1600" dirty="0" smtClean="0">
+                <a:solidFill>
+                  <a:srgbClr val="000000"/>
+                </a:solidFill>
+              </a:rPr>
+              <a:t>Add Size, Fuel Type</a:t>
+            </a:r>
+            <a:endParaRPr lang="en-US" sz="1600" dirty="0">
+              <a:solidFill>
+                <a:srgbClr val="000000"/>
+              </a:solidFill>
+            </a:endParaRPr>
+          </a:p>
+          <a:p>
+            <a:pPr marL="0" indent="0">
+              <a:buNone/>
+            </a:pPr>
             <a:endParaRPr lang="en-US" sz="1800" dirty="0">
               <a:solidFill>
                 <a:srgbClr val="000000"/>
@@ -10560,7 +10964,7 @@
               <a:pPr>
                 <a:defRPr/>
               </a:pPr>
-              <a:t>6</a:t>
+              <a:t>7</a:t>
             </a:fld>
             <a:endParaRPr lang="en-US" dirty="0">
               <a:solidFill>
@@ -10837,127 +11241,6 @@
   </p:cSld>
   <p:clrMapOvr>
     <a:overrideClrMapping bg1="lt1" tx1="dk1" bg2="lt2" tx2="dk2" accent1="accent1" accent2="accent2" accent3="accent3" accent4="accent4" accent5="accent5" accent6="accent6" hlink="hlink" folHlink="folHlink"/>
-  </p:clrMapOvr>
-</p:sld>
-</file>
-
-<file path=ppt/slides/slide7.xml><?xml version="1.0" encoding="utf-8"?>
-<p:sld xmlns:a="http://schemas.openxmlformats.org/drawingml/2006/main" xmlns:r="http://schemas.openxmlformats.org/officeDocument/2006/relationships" xmlns:p="http://schemas.openxmlformats.org/presentationml/2006/main">
-  <p:cSld>
-    <p:spTree>
-      <p:nvGrpSpPr>
-        <p:cNvPr id="1" name=""/>
-        <p:cNvGrpSpPr/>
-        <p:nvPr/>
-      </p:nvGrpSpPr>
-      <p:grpSpPr>
-        <a:xfrm>
-          <a:off x="0" y="0"/>
-          <a:ext cx="0" cy="0"/>
-          <a:chOff x="0" y="0"/>
-          <a:chExt cx="0" cy="0"/>
-        </a:xfrm>
-      </p:grpSpPr>
-      <p:sp>
-        <p:nvSpPr>
-          <p:cNvPr id="3" name="Title 2"/>
-          <p:cNvSpPr>
-            <a:spLocks noGrp="1"/>
-          </p:cNvSpPr>
-          <p:nvPr>
-            <p:ph type="title"/>
-          </p:nvPr>
-        </p:nvSpPr>
-        <p:spPr/>
-        <p:txBody>
-          <a:bodyPr/>
-          <a:lstStyle/>
-          <a:p>
-            <a:r>
-              <a:rPr lang="en-US" dirty="0"/>
-              <a:t>Delta Table Workflow</a:t>
-            </a:r>
-          </a:p>
-        </p:txBody>
-      </p:sp>
-      <p:sp>
-        <p:nvSpPr>
-          <p:cNvPr id="4" name="Slide Number Placeholder 3"/>
-          <p:cNvSpPr>
-            <a:spLocks noGrp="1"/>
-          </p:cNvSpPr>
-          <p:nvPr>
-            <p:ph type="sldNum" sz="quarter" idx="12"/>
-          </p:nvPr>
-        </p:nvSpPr>
-        <p:spPr/>
-        <p:txBody>
-          <a:bodyPr/>
-          <a:lstStyle/>
-          <a:p>
-            <a:pPr>
-              <a:defRPr/>
-            </a:pPr>
-            <a:r>
-              <a:rPr lang="en-US" sz="800">
-                <a:solidFill>
-                  <a:srgbClr val="C00000"/>
-                </a:solidFill>
-              </a:rPr>
-              <a:t>HIGHLY CONFIDENTIAL </a:t>
-            </a:r>
-            <a:fld id="{EC4D6EA5-BC0F-4B07-ABF1-A957CA1E5A93}" type="slidenum">
-              <a:rPr lang="en-US" smtClean="0">
-                <a:solidFill>
-                  <a:prstClr val="black"/>
-                </a:solidFill>
-              </a:rPr>
-              <a:pPr>
-                <a:defRPr/>
-              </a:pPr>
-              <a:t>7</a:t>
-            </a:fld>
-            <a:endParaRPr lang="en-US" dirty="0">
-              <a:solidFill>
-                <a:prstClr val="black"/>
-              </a:solidFill>
-            </a:endParaRPr>
-          </a:p>
-        </p:txBody>
-      </p:sp>
-      <p:pic>
-        <p:nvPicPr>
-          <p:cNvPr id="7" name="Picture 6"/>
-          <p:cNvPicPr>
-            <a:picLocks noChangeAspect="1"/>
-          </p:cNvPicPr>
-          <p:nvPr/>
-        </p:nvPicPr>
-        <p:blipFill>
-          <a:blip r:embed="rId2"/>
-          <a:stretch>
-            <a:fillRect/>
-          </a:stretch>
-        </p:blipFill>
-        <p:spPr>
-          <a:xfrm>
-            <a:off x="2757356" y="912966"/>
-            <a:ext cx="2655447" cy="5353235"/>
-          </a:xfrm>
-          <a:prstGeom prst="rect">
-            <a:avLst/>
-          </a:prstGeom>
-        </p:spPr>
-      </p:pic>
-    </p:spTree>
-    <p:extLst>
-      <p:ext uri="{BB962C8B-B14F-4D97-AF65-F5344CB8AC3E}">
-        <p14:creationId xmlns:p14="http://schemas.microsoft.com/office/powerpoint/2010/main" val="2381708936"/>
-      </p:ext>
-    </p:extLst>
-  </p:cSld>
-  <p:clrMapOvr>
-    <a:masterClrMapping/>
   </p:clrMapOvr>
 </p:sld>
 </file>

</xml_diff>

<commit_message>
more updates. code broken currently, need to find better way to account for tap buses
</commit_message>
<xml_diff>
--- a/Bi-weekly Update  07192023 SX.pptx
+++ b/Bi-weekly Update  07192023 SX.pptx
@@ -6,10 +6,10 @@
     <p:sldMasterId id="2147483677" r:id="rId2"/>
   </p:sldMasterIdLst>
   <p:notesMasterIdLst>
-    <p:notesMasterId r:id="rId10"/>
+    <p:notesMasterId r:id="rId9"/>
   </p:notesMasterIdLst>
   <p:handoutMasterIdLst>
-    <p:handoutMasterId r:id="rId11"/>
+    <p:handoutMasterId r:id="rId10"/>
   </p:handoutMasterIdLst>
   <p:sldIdLst>
     <p:sldId id="388" r:id="rId3"/>
@@ -17,8 +17,7 @@
     <p:sldId id="428" r:id="rId5"/>
     <p:sldId id="429" r:id="rId6"/>
     <p:sldId id="432" r:id="rId7"/>
-    <p:sldId id="431" r:id="rId8"/>
-    <p:sldId id="433" r:id="rId9"/>
+    <p:sldId id="433" r:id="rId8"/>
   </p:sldIdLst>
   <p:sldSz cx="9144000" cy="6858000" type="screen4x3"/>
   <p:notesSz cx="7019925" cy="9305925"/>
@@ -919,7 +918,25 @@
               </a:solidFill>
               <a:latin typeface="Trebuchet MS" panose="020B0603020202020204" pitchFamily="34" charset="0"/>
             </a:rPr>
-            <a:t>Original version created in </a:t>
+            <a:t>Original </a:t>
+          </a:r>
+          <a:r>
+            <a:rPr lang="en-US" sz="1600" dirty="0" smtClean="0">
+              <a:solidFill>
+                <a:srgbClr val="000000"/>
+              </a:solidFill>
+              <a:latin typeface="Trebuchet MS" panose="020B0603020202020204" pitchFamily="34" charset="0"/>
+            </a:rPr>
+            <a:t>version </a:t>
+          </a:r>
+          <a:r>
+            <a:rPr lang="en-US" sz="1600" dirty="0">
+              <a:solidFill>
+                <a:srgbClr val="000000"/>
+              </a:solidFill>
+              <a:latin typeface="Trebuchet MS" panose="020B0603020202020204" pitchFamily="34" charset="0"/>
+            </a:rPr>
+            <a:t>created in </a:t>
           </a:r>
           <a:r>
             <a:rPr lang="en-US" sz="1600" b="1" dirty="0">
@@ -1291,7 +1308,25 @@
               </a:solidFill>
               <a:latin typeface="Trebuchet MS" panose="020B0603020202020204" pitchFamily="34" charset="0"/>
             </a:rPr>
-            <a:t>Original version created in </a:t>
+            <a:t>Original </a:t>
+          </a:r>
+          <a:r>
+            <a:rPr lang="en-US" sz="1600" kern="1200" dirty="0" smtClean="0">
+              <a:solidFill>
+                <a:srgbClr val="000000"/>
+              </a:solidFill>
+              <a:latin typeface="Trebuchet MS" panose="020B0603020202020204" pitchFamily="34" charset="0"/>
+            </a:rPr>
+            <a:t>version </a:t>
+          </a:r>
+          <a:r>
+            <a:rPr lang="en-US" sz="1600" kern="1200" dirty="0">
+              <a:solidFill>
+                <a:srgbClr val="000000"/>
+              </a:solidFill>
+              <a:latin typeface="Trebuchet MS" panose="020B0603020202020204" pitchFamily="34" charset="0"/>
+            </a:rPr>
+            <a:t>created in </a:t>
           </a:r>
           <a:r>
             <a:rPr lang="en-US" sz="1600" b="1" kern="1200" dirty="0">
@@ -3650,7 +3685,7 @@
           <a:p>
             <a:fld id="{BEDBCE3A-CC44-4697-B56C-044F163EB01C}" type="slidenum">
               <a:rPr lang="en-US" smtClean="0"/>
-              <a:t>7</a:t>
+              <a:t>6</a:t>
             </a:fld>
             <a:endParaRPr lang="en-US" dirty="0"/>
           </a:p>
@@ -8726,6 +8761,13 @@
   <p:clrMapOvr>
     <a:masterClrMapping/>
   </p:clrMapOvr>
+  <p:timing>
+    <p:tnLst>
+      <p:par>
+        <p:cTn id="1" dur="indefinite" restart="never" nodeType="tmRoot"/>
+      </p:par>
+    </p:tnLst>
+  </p:timing>
 </p:sld>
 </file>
 
@@ -8779,7 +8821,7 @@
                   <a:srgbClr val="000000"/>
                 </a:solidFill>
               </a:rPr>
-              <a:t>Evolution of MIS downloads </a:t>
+              <a:t>Evolution of </a:t>
             </a:r>
             <a:r>
               <a:rPr lang="en-US" sz="2200" dirty="0" smtClean="0">
@@ -8787,16 +8829,13 @@
                   <a:srgbClr val="000000"/>
                 </a:solidFill>
               </a:rPr>
-              <a:t>(ERCOT market </a:t>
-            </a:r>
-            <a:r>
-              <a:rPr lang="en-US" sz="2200" dirty="0">
-                <a:solidFill>
-                  <a:srgbClr val="000000"/>
-                </a:solidFill>
-              </a:rPr>
-              <a:t>data downloads)</a:t>
-            </a:r>
+              <a:t>ERCOT Market Data Downloads</a:t>
+            </a:r>
+            <a:endParaRPr lang="en-US" sz="2200" dirty="0">
+              <a:solidFill>
+                <a:srgbClr val="000000"/>
+              </a:solidFill>
+            </a:endParaRPr>
           </a:p>
           <a:p>
             <a:pPr marL="293687" lvl="1" indent="0">
@@ -8997,13 +9036,13 @@
           <p:nvPr>
             <p:extLst>
               <p:ext uri="{D42A27DB-BD31-4B8C-83A1-F6EECF244321}">
-                <p14:modId xmlns:p14="http://schemas.microsoft.com/office/powerpoint/2010/main" val="1821900603"/>
+                <p14:modId xmlns:p14="http://schemas.microsoft.com/office/powerpoint/2010/main" val="1415224044"/>
               </p:ext>
             </p:extLst>
           </p:nvPr>
         </p:nvGraphicFramePr>
         <p:xfrm>
-          <a:off x="1393372" y="706535"/>
+          <a:off x="1511085" y="799284"/>
           <a:ext cx="6096000" cy="3445588"/>
         </p:xfrm>
         <a:graphic>
@@ -9430,6 +9469,13 @@
   <p:clrMapOvr>
     <a:overrideClrMapping bg1="lt1" tx1="dk1" bg2="lt2" tx2="dk2" accent1="accent1" accent2="accent2" accent3="accent3" accent4="accent4" accent5="accent5" accent6="accent6" hlink="hlink" folHlink="folHlink"/>
   </p:clrMapOvr>
+  <p:timing>
+    <p:tnLst>
+      <p:par>
+        <p:cTn id="1" dur="indefinite" restart="never" nodeType="tmRoot"/>
+      </p:par>
+    </p:tnLst>
+  </p:timing>
 </p:sld>
 </file>
 
@@ -9462,7 +9508,7 @@
         </p:nvSpPr>
         <p:spPr>
           <a:xfrm>
-            <a:off x="232756" y="87718"/>
+            <a:off x="232756" y="252294"/>
             <a:ext cx="8652658" cy="784970"/>
           </a:xfrm>
         </p:spPr>
@@ -9471,10 +9517,10 @@
           <a:lstStyle/>
           <a:p>
             <a:r>
-              <a:rPr lang="en-US" sz="2400" dirty="0" smtClean="0"/>
-              <a:t>Concurrent downloading , summary report and advanced error handling</a:t>
-            </a:r>
-            <a:endParaRPr lang="en-US" sz="2400" dirty="0"/>
+              <a:rPr lang="en-US" sz="2000" dirty="0" smtClean="0"/>
+              <a:t>Concurrent Downloading , Advanced Error Handling, and Summary Report</a:t>
+            </a:r>
+            <a:endParaRPr lang="en-US" sz="2000" dirty="0"/>
           </a:p>
         </p:txBody>
       </p:sp>
@@ -9523,16 +9569,73 @@
           </a:p>
         </p:txBody>
       </p:sp>
+      <p:sp>
+        <p:nvSpPr>
+          <p:cNvPr id="2" name="Rectangle 1"/>
+          <p:cNvSpPr/>
+          <p:nvPr/>
+        </p:nvSpPr>
+        <p:spPr>
+          <a:xfrm>
+            <a:off x="146482" y="949658"/>
+            <a:ext cx="8738932" cy="338554"/>
+          </a:xfrm>
+          <a:prstGeom prst="rect">
+            <a:avLst/>
+          </a:prstGeom>
+        </p:spPr>
+        <p:txBody>
+          <a:bodyPr wrap="square">
+            <a:spAutoFit/>
+          </a:bodyPr>
+          <a:lstStyle/>
+          <a:p>
+            <a:r>
+              <a:rPr lang="en-US" sz="1600" dirty="0" smtClean="0">
+                <a:solidFill>
+                  <a:srgbClr val="000000"/>
+                </a:solidFill>
+                <a:latin typeface="Trebuchet MS" panose="020B0603020202020204" pitchFamily="34" charset="0"/>
+              </a:rPr>
+              <a:t>Downloads over 100 reports, includes everything from </a:t>
+            </a:r>
+            <a:r>
+              <a:rPr lang="en-US" sz="1600" dirty="0" smtClean="0">
+                <a:solidFill>
+                  <a:srgbClr val="000000"/>
+                </a:solidFill>
+                <a:latin typeface="Trebuchet MS" panose="020B0603020202020204" pitchFamily="34" charset="0"/>
+              </a:rPr>
+              <a:t>5-min </a:t>
+            </a:r>
+            <a:r>
+              <a:rPr lang="en-US" sz="1600" dirty="0" smtClean="0">
+                <a:solidFill>
+                  <a:srgbClr val="000000"/>
+                </a:solidFill>
+                <a:latin typeface="Trebuchet MS" panose="020B0603020202020204" pitchFamily="34" charset="0"/>
+              </a:rPr>
+              <a:t>data to planning reports</a:t>
+            </a:r>
+            <a:endParaRPr lang="en-US" sz="1600" dirty="0">
+              <a:solidFill>
+                <a:srgbClr val="000000"/>
+              </a:solidFill>
+              <a:latin typeface="Trebuchet MS" panose="020B0603020202020204" pitchFamily="34" charset="0"/>
+            </a:endParaRPr>
+          </a:p>
+        </p:txBody>
+      </p:sp>
       <p:pic>
         <p:nvPicPr>
-          <p:cNvPr id="5" name="Picture 4"/>
+          <p:cNvPr id="7" name="Picture 6"/>
           <p:cNvPicPr>
             <a:picLocks noChangeAspect="1"/>
           </p:cNvPicPr>
           <p:nvPr/>
         </p:nvPicPr>
         <p:blipFill>
-          <a:blip r:embed="rId2">
+          <a:blip r:embed="rId2" cstate="print">
             <a:extLst>
               <a:ext uri="{28A0092B-C50C-407E-A947-70E740481C1C}">
                 <a14:useLocalDpi xmlns:a14="http://schemas.microsoft.com/office/drawing/2010/main" val="0"/>
@@ -9545,53 +9648,14 @@
         </p:blipFill>
         <p:spPr>
           <a:xfrm>
-            <a:off x="1580224" y="1338802"/>
-            <a:ext cx="6747029" cy="4974867"/>
+            <a:off x="639192" y="1217348"/>
+            <a:ext cx="7421732" cy="5450258"/>
           </a:xfrm>
           <a:prstGeom prst="rect">
             <a:avLst/>
           </a:prstGeom>
         </p:spPr>
       </p:pic>
-      <p:sp>
-        <p:nvSpPr>
-          <p:cNvPr id="2" name="Rectangle 1"/>
-          <p:cNvSpPr/>
-          <p:nvPr/>
-        </p:nvSpPr>
-        <p:spPr>
-          <a:xfrm>
-            <a:off x="146482" y="936468"/>
-            <a:ext cx="8738932" cy="338554"/>
-          </a:xfrm>
-          <a:prstGeom prst="rect">
-            <a:avLst/>
-          </a:prstGeom>
-        </p:spPr>
-        <p:txBody>
-          <a:bodyPr wrap="square">
-            <a:spAutoFit/>
-          </a:bodyPr>
-          <a:lstStyle/>
-          <a:p>
-            <a:r>
-              <a:rPr lang="en-US" sz="1600" dirty="0" smtClean="0">
-                <a:solidFill>
-                  <a:srgbClr val="000000"/>
-                </a:solidFill>
-                <a:latin typeface="Trebuchet MS" panose="020B0603020202020204" pitchFamily="34" charset="0"/>
-              </a:rPr>
-              <a:t>Downloads around 100 reports , includes everything from 5 min data to planning reports</a:t>
-            </a:r>
-            <a:endParaRPr lang="en-US" sz="1600" dirty="0">
-              <a:solidFill>
-                <a:srgbClr val="000000"/>
-              </a:solidFill>
-              <a:latin typeface="Trebuchet MS" panose="020B0603020202020204" pitchFamily="34" charset="0"/>
-            </a:endParaRPr>
-          </a:p>
-        </p:txBody>
-      </p:sp>
     </p:spTree>
     <p:extLst>
       <p:ext uri="{BB962C8B-B14F-4D97-AF65-F5344CB8AC3E}">
@@ -9602,6 +9666,13 @@
   <p:clrMapOvr>
     <a:masterClrMapping/>
   </p:clrMapOvr>
+  <p:timing>
+    <p:tnLst>
+      <p:par>
+        <p:cTn id="1" dur="indefinite" restart="never" nodeType="tmRoot"/>
+      </p:par>
+    </p:tnLst>
+  </p:timing>
 </p:sld>
 </file>
 
@@ -9670,11 +9741,15 @@
           <a:p>
             <a:r>
               <a:rPr lang="en-US" sz="2400" dirty="0" smtClean="0"/>
-              <a:t>Detailed Summary reports, </a:t>
+              <a:t>Detailed Summary Report, Tips </a:t>
+            </a:r>
+            <a:r>
+              <a:rPr lang="en-US" sz="2400" dirty="0"/>
+              <a:t>F</a:t>
             </a:r>
             <a:r>
               <a:rPr lang="en-US" sz="2400" dirty="0" smtClean="0"/>
-              <a:t>tips for troubleshooting errors</a:t>
+              <a:t>or Troubleshooting</a:t>
             </a:r>
             <a:endParaRPr lang="en-US" sz="2400" dirty="0"/>
           </a:p>
@@ -9733,7 +9808,7 @@
         </p:nvSpPr>
         <p:spPr>
           <a:xfrm>
-            <a:off x="5202315" y="1617655"/>
+            <a:off x="5308846" y="1699274"/>
             <a:ext cx="3835154" cy="3910613"/>
           </a:xfrm>
           <a:prstGeom prst="rect">
@@ -9959,7 +10034,7 @@
         </p:nvSpPr>
         <p:spPr>
           <a:xfrm>
-            <a:off x="146482" y="936468"/>
+            <a:off x="146482" y="1005819"/>
             <a:ext cx="8738932" cy="338554"/>
           </a:xfrm>
           <a:prstGeom prst="rect">
@@ -9985,9 +10060,6 @@
               </a:rPr>
               <a:t>Automated to send immediately after the data gets downloaded (roughly 6:25 AM)</a:t>
             </a:r>
-            <a:endParaRPr lang="en-US" sz="1600" dirty="0">
-              <a:latin typeface="Trebuchet MS" panose="020B0603020202020204" pitchFamily="34" charset="0"/>
-            </a:endParaRPr>
           </a:p>
         </p:txBody>
       </p:sp>
@@ -10001,6 +10073,13 @@
   <p:clrMapOvr>
     <a:masterClrMapping/>
   </p:clrMapOvr>
+  <p:timing>
+    <p:tnLst>
+      <p:par>
+        <p:cTn id="1" dur="indefinite" restart="never" nodeType="tmRoot"/>
+      </p:par>
+    </p:tnLst>
+  </p:timing>
 </p:sld>
 </file>
 
@@ -10054,10 +10133,16 @@
                   <a:srgbClr val="000000"/>
                 </a:solidFill>
               </a:rPr>
-              <a:t>Automated historical constraint analysis for Calpine’s Asset</a:t>
-            </a:r>
-          </a:p>
-          <a:p>
+              <a:t>Automated historical constraint analysis for Calpine’s </a:t>
+            </a:r>
+            <a:r>
+              <a:rPr lang="en-US" sz="2200" dirty="0" smtClean="0">
+                <a:solidFill>
+                  <a:srgbClr val="000000"/>
+                </a:solidFill>
+              </a:rPr>
+              <a:t>Asset</a:t>
+            </a:r>
             <a:endParaRPr lang="en-US" sz="2200" dirty="0">
               <a:solidFill>
                 <a:srgbClr val="000000"/>
@@ -10090,7 +10175,7 @@
           <a:p>
             <a:pPr lvl="1"/>
             <a:r>
-              <a:rPr lang="en-US" sz="2300" dirty="0">
+              <a:rPr lang="en-US" sz="1800" dirty="0">
                 <a:solidFill>
                   <a:srgbClr val="FF0000"/>
                 </a:solidFill>
@@ -10098,7 +10183,7 @@
               <a:t>Will the basis from yesterday/last 2 days repeat </a:t>
             </a:r>
             <a:r>
-              <a:rPr lang="en-US" sz="2300" dirty="0" smtClean="0">
+              <a:rPr lang="en-US" sz="1800" dirty="0" smtClean="0">
                 <a:solidFill>
                   <a:srgbClr val="FF0000"/>
                 </a:solidFill>
@@ -10109,7 +10194,7 @@
           <a:p>
             <a:pPr lvl="1"/>
             <a:r>
-              <a:rPr lang="en-US" sz="2300" dirty="0" smtClean="0">
+              <a:rPr lang="en-US" sz="1800" dirty="0" smtClean="0">
                 <a:solidFill>
                   <a:srgbClr val="FF0000"/>
                 </a:solidFill>
@@ -10117,7 +10202,7 @@
               <a:t>Pricing </a:t>
             </a:r>
             <a:r>
-              <a:rPr lang="en-US" sz="2300" dirty="0">
+              <a:rPr lang="en-US" sz="1800" dirty="0">
                 <a:solidFill>
                   <a:srgbClr val="FF0000"/>
                 </a:solidFill>
@@ -10234,7 +10319,19 @@
               <a:rPr lang="en-US" sz="2400" dirty="0">
                 <a:cs typeface="Arial" panose="020B0604020202020204" pitchFamily="34" charset="0"/>
               </a:rPr>
-              <a:t>Interactive Report : Real Time Constraint Impact</a:t>
+              <a:t>Interactive </a:t>
+            </a:r>
+            <a:r>
+              <a:rPr lang="en-US" sz="2400" dirty="0" smtClean="0">
+                <a:cs typeface="Arial" panose="020B0604020202020204" pitchFamily="34" charset="0"/>
+              </a:rPr>
+              <a:t>Report: </a:t>
+            </a:r>
+            <a:r>
+              <a:rPr lang="en-US" sz="2400" dirty="0">
+                <a:cs typeface="Arial" panose="020B0604020202020204" pitchFamily="34" charset="0"/>
+              </a:rPr>
+              <a:t>Real Time Constraint Impact</a:t>
             </a:r>
             <a:endParaRPr lang="en-US" sz="2400" dirty="0"/>
           </a:p>
@@ -10305,13 +10402,13 @@
           <p:nvPr>
             <p:extLst>
               <p:ext uri="{D42A27DB-BD31-4B8C-83A1-F6EECF244321}">
-                <p14:modId xmlns:p14="http://schemas.microsoft.com/office/powerpoint/2010/main" val="2525269178"/>
+                <p14:modId xmlns:p14="http://schemas.microsoft.com/office/powerpoint/2010/main" val="3132387697"/>
               </p:ext>
             </p:extLst>
           </p:nvPr>
         </p:nvGraphicFramePr>
         <p:xfrm>
-          <a:off x="1497193" y="3094604"/>
+          <a:off x="2056007" y="2393269"/>
           <a:ext cx="5316072" cy="1254732"/>
         </p:xfrm>
         <a:graphic>
@@ -10568,6 +10665,36 @@
           </a:graphicData>
         </a:graphic>
       </p:graphicFrame>
+      <p:pic>
+        <p:nvPicPr>
+          <p:cNvPr id="6" name="Picture 5"/>
+          <p:cNvPicPr>
+            <a:picLocks noChangeAspect="1"/>
+          </p:cNvPicPr>
+          <p:nvPr/>
+        </p:nvPicPr>
+        <p:blipFill>
+          <a:blip r:embed="rId4" cstate="print">
+            <a:extLst>
+              <a:ext uri="{28A0092B-C50C-407E-A947-70E740481C1C}">
+                <a14:useLocalDpi xmlns:a14="http://schemas.microsoft.com/office/drawing/2010/main" val="0"/>
+              </a:ext>
+            </a:extLst>
+          </a:blip>
+          <a:stretch>
+            <a:fillRect/>
+          </a:stretch>
+        </p:blipFill>
+        <p:spPr>
+          <a:xfrm>
+            <a:off x="2601156" y="3898934"/>
+            <a:ext cx="4610135" cy="2458739"/>
+          </a:xfrm>
+          <a:prstGeom prst="rect">
+            <a:avLst/>
+          </a:prstGeom>
+        </p:spPr>
+      </p:pic>
     </p:spTree>
     <p:extLst>
       <p:ext uri="{BB962C8B-B14F-4D97-AF65-F5344CB8AC3E}">
@@ -10578,131 +10705,17 @@
   <p:clrMapOvr>
     <a:overrideClrMapping bg1="lt1" tx1="dk1" bg2="lt2" tx2="dk2" accent1="accent1" accent2="accent2" accent3="accent3" accent4="accent4" accent5="accent5" accent6="accent6" hlink="hlink" folHlink="folHlink"/>
   </p:clrMapOvr>
+  <p:timing>
+    <p:tnLst>
+      <p:par>
+        <p:cTn id="1" dur="indefinite" restart="never" nodeType="tmRoot"/>
+      </p:par>
+    </p:tnLst>
+  </p:timing>
 </p:sld>
 </file>
 
 <file path=ppt/slides/slide6.xml><?xml version="1.0" encoding="utf-8"?>
-<p:sld xmlns:a="http://schemas.openxmlformats.org/drawingml/2006/main" xmlns:r="http://schemas.openxmlformats.org/officeDocument/2006/relationships" xmlns:p="http://schemas.openxmlformats.org/presentationml/2006/main">
-  <p:cSld>
-    <p:spTree>
-      <p:nvGrpSpPr>
-        <p:cNvPr id="1" name=""/>
-        <p:cNvGrpSpPr/>
-        <p:nvPr/>
-      </p:nvGrpSpPr>
-      <p:grpSpPr>
-        <a:xfrm>
-          <a:off x="0" y="0"/>
-          <a:ext cx="0" cy="0"/>
-          <a:chOff x="0" y="0"/>
-          <a:chExt cx="0" cy="0"/>
-        </a:xfrm>
-      </p:grpSpPr>
-      <p:sp>
-        <p:nvSpPr>
-          <p:cNvPr id="3" name="Title 2"/>
-          <p:cNvSpPr>
-            <a:spLocks noGrp="1"/>
-          </p:cNvSpPr>
-          <p:nvPr>
-            <p:ph type="title"/>
-          </p:nvPr>
-        </p:nvSpPr>
-        <p:spPr/>
-        <p:txBody>
-          <a:bodyPr/>
-          <a:lstStyle/>
-          <a:p>
-            <a:r>
-              <a:rPr lang="en-US" dirty="0"/>
-              <a:t>Delta Table Workflow</a:t>
-            </a:r>
-          </a:p>
-        </p:txBody>
-      </p:sp>
-      <p:sp>
-        <p:nvSpPr>
-          <p:cNvPr id="4" name="Slide Number Placeholder 3"/>
-          <p:cNvSpPr>
-            <a:spLocks noGrp="1"/>
-          </p:cNvSpPr>
-          <p:nvPr>
-            <p:ph type="sldNum" sz="quarter" idx="12"/>
-          </p:nvPr>
-        </p:nvSpPr>
-        <p:spPr/>
-        <p:txBody>
-          <a:bodyPr/>
-          <a:lstStyle/>
-          <a:p>
-            <a:pPr>
-              <a:defRPr/>
-            </a:pPr>
-            <a:r>
-              <a:rPr lang="en-US" sz="800">
-                <a:solidFill>
-                  <a:srgbClr val="C00000"/>
-                </a:solidFill>
-              </a:rPr>
-              <a:t>HIGHLY CONFIDENTIAL </a:t>
-            </a:r>
-            <a:fld id="{EC4D6EA5-BC0F-4B07-ABF1-A957CA1E5A93}" type="slidenum">
-              <a:rPr lang="en-US" smtClean="0">
-                <a:solidFill>
-                  <a:prstClr val="black"/>
-                </a:solidFill>
-              </a:rPr>
-              <a:pPr>
-                <a:defRPr/>
-              </a:pPr>
-              <a:t>6</a:t>
-            </a:fld>
-            <a:endParaRPr lang="en-US" dirty="0">
-              <a:solidFill>
-                <a:prstClr val="black"/>
-              </a:solidFill>
-            </a:endParaRPr>
-          </a:p>
-        </p:txBody>
-      </p:sp>
-      <p:pic>
-        <p:nvPicPr>
-          <p:cNvPr id="7" name="Picture 6"/>
-          <p:cNvPicPr>
-            <a:picLocks noChangeAspect="1"/>
-          </p:cNvPicPr>
-          <p:nvPr/>
-        </p:nvPicPr>
-        <p:blipFill>
-          <a:blip r:embed="rId2"/>
-          <a:stretch>
-            <a:fillRect/>
-          </a:stretch>
-        </p:blipFill>
-        <p:spPr>
-          <a:xfrm>
-            <a:off x="2757356" y="912966"/>
-            <a:ext cx="2655447" cy="5353235"/>
-          </a:xfrm>
-          <a:prstGeom prst="rect">
-            <a:avLst/>
-          </a:prstGeom>
-        </p:spPr>
-      </p:pic>
-    </p:spTree>
-    <p:extLst>
-      <p:ext uri="{BB962C8B-B14F-4D97-AF65-F5344CB8AC3E}">
-        <p14:creationId xmlns:p14="http://schemas.microsoft.com/office/powerpoint/2010/main" val="2381708936"/>
-      </p:ext>
-    </p:extLst>
-  </p:cSld>
-  <p:clrMapOvr>
-    <a:masterClrMapping/>
-  </p:clrMapOvr>
-</p:sld>
-</file>
-
-<file path=ppt/slides/slide7.xml><?xml version="1.0" encoding="utf-8"?>
 <p:sld xmlns:a="http://schemas.openxmlformats.org/drawingml/2006/main" xmlns:r="http://schemas.openxmlformats.org/officeDocument/2006/relationships" xmlns:p="http://schemas.openxmlformats.org/presentationml/2006/main">
   <p:cSld>
     <p:bg>
@@ -10964,7 +10977,7 @@
               <a:pPr>
                 <a:defRPr/>
               </a:pPr>
-              <a:t>7</a:t>
+              <a:t>6</a:t>
             </a:fld>
             <a:endParaRPr lang="en-US" dirty="0">
               <a:solidFill>
@@ -11242,6 +11255,13 @@
   <p:clrMapOvr>
     <a:overrideClrMapping bg1="lt1" tx1="dk1" bg2="lt2" tx2="dk2" accent1="accent1" accent2="accent2" accent3="accent3" accent4="accent4" accent5="accent5" accent6="accent6" hlink="hlink" folHlink="folHlink"/>
   </p:clrMapOvr>
+  <p:timing>
+    <p:tnLst>
+      <p:par>
+        <p:cTn id="1" dur="indefinite" restart="never" nodeType="tmRoot"/>
+      </p:par>
+    </p:tnLst>
+  </p:timing>
 </p:sld>
 </file>
 

</xml_diff>